<commit_message>
Removed notes from David Champion's Slides
</commit_message>
<xml_diff>
--- a/58_champion_science_ipta2012.pptx
+++ b/58_champion_science_ipta2012.pptx
@@ -1,40 +1,36 @@
 
 <file path=ppt/presentation.xml><?xml version="1.0" encoding="utf-8"?>
-<p:presentation xmlns:a="http://schemas.openxmlformats.org/drawingml/2006/main" xmlns:r="http://schemas.openxmlformats.org/officeDocument/2006/relationships" xmlns:p="http://schemas.openxmlformats.org/presentationml/2006/main" showSpecialPlsOnTitleSld="0" saveSubsetFonts="1" autoCompressPictures="0">
+<p:presentation xmlns:a="http://schemas.openxmlformats.org/drawingml/2006/main" xmlns:r="http://schemas.openxmlformats.org/officeDocument/2006/relationships" xmlns:mc="http://schemas.openxmlformats.org/markup-compatibility/2006" xmlns:mv="urn:schemas-microsoft-com:mac:vml" xmlns:p="http://schemas.openxmlformats.org/presentationml/2006/main" mc:Ignorable="mv" mc:PreserveAttributes="mv:*" showSpecialPlsOnTitleSld="0" saveSubsetFonts="1" autoCompressPictures="0">
   <p:sldMasterIdLst>
     <p:sldMasterId id="2147483682" r:id="rId1"/>
     <p:sldMasterId id="2147483697" r:id="rId2"/>
     <p:sldMasterId id="2147483699" r:id="rId3"/>
   </p:sldMasterIdLst>
   <p:notesMasterIdLst>
-    <p:notesMasterId r:id="rId26"/>
+    <p:notesMasterId r:id="rId22"/>
   </p:notesMasterIdLst>
   <p:handoutMasterIdLst>
-    <p:handoutMasterId r:id="rId27"/>
+    <p:handoutMasterId r:id="rId23"/>
   </p:handoutMasterIdLst>
   <p:sldIdLst>
-    <p:sldId id="256" r:id="rId4"/>
-    <p:sldId id="277" r:id="rId5"/>
-    <p:sldId id="269" r:id="rId6"/>
-    <p:sldId id="266" r:id="rId7"/>
-    <p:sldId id="273" r:id="rId8"/>
-    <p:sldId id="275" r:id="rId9"/>
-    <p:sldId id="272" r:id="rId10"/>
-    <p:sldId id="258" r:id="rId11"/>
-    <p:sldId id="267" r:id="rId12"/>
-    <p:sldId id="259" r:id="rId13"/>
-    <p:sldId id="268" r:id="rId14"/>
-    <p:sldId id="270" r:id="rId15"/>
-    <p:sldId id="260" r:id="rId16"/>
-    <p:sldId id="261" r:id="rId17"/>
-    <p:sldId id="271" r:id="rId18"/>
-    <p:sldId id="265" r:id="rId19"/>
-    <p:sldId id="263" r:id="rId20"/>
-    <p:sldId id="278" r:id="rId21"/>
-    <p:sldId id="276" r:id="rId22"/>
-    <p:sldId id="262" r:id="rId23"/>
-    <p:sldId id="257" r:id="rId24"/>
-    <p:sldId id="264" r:id="rId25"/>
+    <p:sldId id="277" r:id="rId4"/>
+    <p:sldId id="269" r:id="rId5"/>
+    <p:sldId id="266" r:id="rId6"/>
+    <p:sldId id="273" r:id="rId7"/>
+    <p:sldId id="275" r:id="rId8"/>
+    <p:sldId id="272" r:id="rId9"/>
+    <p:sldId id="258" r:id="rId10"/>
+    <p:sldId id="267" r:id="rId11"/>
+    <p:sldId id="259" r:id="rId12"/>
+    <p:sldId id="268" r:id="rId13"/>
+    <p:sldId id="270" r:id="rId14"/>
+    <p:sldId id="260" r:id="rId15"/>
+    <p:sldId id="261" r:id="rId16"/>
+    <p:sldId id="271" r:id="rId17"/>
+    <p:sldId id="265" r:id="rId18"/>
+    <p:sldId id="263" r:id="rId19"/>
+    <p:sldId id="278" r:id="rId20"/>
+    <p:sldId id="276" r:id="rId21"/>
   </p:sldIdLst>
   <p:sldSz cx="9144000" cy="6858000" type="screen4x3"/>
   <p:notesSz cx="6797675" cy="9926638"/>
@@ -167,7 +163,7 @@
 </file>
 
 <file path=ppt/handoutMasters/handoutMaster1.xml><?xml version="1.0" encoding="utf-8"?>
-<p:handoutMaster xmlns:a="http://schemas.openxmlformats.org/drawingml/2006/main" xmlns:r="http://schemas.openxmlformats.org/officeDocument/2006/relationships" xmlns:p="http://schemas.openxmlformats.org/presentationml/2006/main">
+<p:handoutMaster xmlns:a="http://schemas.openxmlformats.org/drawingml/2006/main" xmlns:r="http://schemas.openxmlformats.org/officeDocument/2006/relationships" xmlns:mc="http://schemas.openxmlformats.org/markup-compatibility/2006" xmlns:mv="urn:schemas-microsoft-com:mac:vml" xmlns:p="http://schemas.openxmlformats.org/presentationml/2006/main" mc:Ignorable="mv" mc:PreserveAttributes="mv:*">
   <p:cSld>
     <p:bg>
       <p:bgRef idx="1001">
@@ -248,7 +244,8 @@
           <a:p>
             <a:fld id="{1DD687E7-C9E6-3F48-B6DD-801D58663632}" type="datetimeFigureOut">
               <a:rPr lang="en-US" smtClean="0"/>
-              <a:t>26.06.12</a:t>
+              <a:pPr/>
+              <a:t>7/10/12</a:t>
             </a:fld>
             <a:endParaRPr lang="en-US"/>
           </a:p>
@@ -314,6 +311,7 @@
           <a:p>
             <a:fld id="{C20B4FD6-63BE-4547-BAC3-7056A53C0221}" type="slidenum">
               <a:rPr lang="en-US" smtClean="0"/>
+              <a:pPr/>
               <a:t>‹#›</a:t>
             </a:fld>
             <a:endParaRPr lang="en-US"/>
@@ -323,7 +321,7 @@
     </p:spTree>
     <p:extLst>
       <p:ext uri="{BB962C8B-B14F-4D97-AF65-F5344CB8AC3E}">
-        <p14:creationId xmlns:p14="http://schemas.microsoft.com/office/powerpoint/2010/main" val="3222334849"/>
+        <p14:creationId xmlns:p14="http://schemas.microsoft.com/office/powerpoint/2010/main" xmlns:p="http://schemas.openxmlformats.org/presentationml/2006/main" xmlns:r="http://schemas.openxmlformats.org/officeDocument/2006/relationships" xmlns:a="http://schemas.openxmlformats.org/drawingml/2006/main" xmlns="" val="3222334849"/>
       </p:ext>
     </p:extLst>
   </p:cSld>
@@ -333,7 +331,7 @@
 </file>
 
 <file path=ppt/notesMasters/notesMaster1.xml><?xml version="1.0" encoding="utf-8"?>
-<p:notesMaster xmlns:a="http://schemas.openxmlformats.org/drawingml/2006/main" xmlns:r="http://schemas.openxmlformats.org/officeDocument/2006/relationships" xmlns:p="http://schemas.openxmlformats.org/presentationml/2006/main">
+<p:notesMaster xmlns:a="http://schemas.openxmlformats.org/drawingml/2006/main" xmlns:r="http://schemas.openxmlformats.org/officeDocument/2006/relationships" xmlns:mc="http://schemas.openxmlformats.org/markup-compatibility/2006" xmlns:mv="urn:schemas-microsoft-com:mac:vml" xmlns:p="http://schemas.openxmlformats.org/presentationml/2006/main" mc:Ignorable="mv" mc:PreserveAttributes="mv:*">
   <p:cSld>
     <p:bg>
       <p:bgPr>
@@ -659,7 +657,7 @@
     </p:spTree>
     <p:extLst>
       <p:ext uri="{BB962C8B-B14F-4D97-AF65-F5344CB8AC3E}">
-        <p14:creationId xmlns:p14="http://schemas.microsoft.com/office/powerpoint/2010/main" val="2175542614"/>
+        <p14:creationId xmlns:p14="http://schemas.microsoft.com/office/powerpoint/2010/main" xmlns:p="http://schemas.openxmlformats.org/presentationml/2006/main" xmlns:r="http://schemas.openxmlformats.org/officeDocument/2006/relationships" xmlns:a="http://schemas.openxmlformats.org/drawingml/2006/main" xmlns="" val="2175542614"/>
       </p:ext>
     </p:extLst>
   </p:cSld>
@@ -791,7 +789,7 @@
 </file>
 
 <file path=ppt/slideLayouts/slideLayout1.xml><?xml version="1.0" encoding="utf-8"?>
-<p:sldLayout xmlns:a="http://schemas.openxmlformats.org/drawingml/2006/main" xmlns:r="http://schemas.openxmlformats.org/officeDocument/2006/relationships" xmlns:p="http://schemas.openxmlformats.org/presentationml/2006/main" type="title" preserve="1">
+<p:sldLayout xmlns:a="http://schemas.openxmlformats.org/drawingml/2006/main" xmlns:r="http://schemas.openxmlformats.org/officeDocument/2006/relationships" xmlns:mc="http://schemas.openxmlformats.org/markup-compatibility/2006" xmlns:mv="urn:schemas-microsoft-com:mac:vml" xmlns:p="http://schemas.openxmlformats.org/presentationml/2006/main" mc:Ignorable="mv" mc:PreserveAttributes="mv:*" type="title" preserve="1">
   <p:cSld name="Title Slide">
     <p:spTree>
       <p:nvGrpSpPr>
@@ -971,7 +969,8 @@
           <a:p>
             <a:fld id="{C2C3429F-8F34-DF49-BC91-10FE3A622728}" type="datetime1">
               <a:rPr lang="de-DE" smtClean="0"/>
-              <a:t>26.06.12</a:t>
+              <a:pPr/>
+              <a:t>7/10/12</a:t>
             </a:fld>
             <a:endParaRPr lang="en-US" dirty="0"/>
           </a:p>
@@ -1033,7 +1032,7 @@
 </file>
 
 <file path=ppt/slideLayouts/slideLayout10.xml><?xml version="1.0" encoding="utf-8"?>
-<p:sldLayout xmlns:a="http://schemas.openxmlformats.org/drawingml/2006/main" xmlns:r="http://schemas.openxmlformats.org/officeDocument/2006/relationships" xmlns:p="http://schemas.openxmlformats.org/presentationml/2006/main" type="vertTx" preserve="1">
+<p:sldLayout xmlns:a="http://schemas.openxmlformats.org/drawingml/2006/main" xmlns:r="http://schemas.openxmlformats.org/officeDocument/2006/relationships" xmlns:mc="http://schemas.openxmlformats.org/markup-compatibility/2006" xmlns:mv="urn:schemas-microsoft-com:mac:vml" xmlns:p="http://schemas.openxmlformats.org/presentationml/2006/main" mc:Ignorable="mv" mc:PreserveAttributes="mv:*" type="vertTx" preserve="1">
   <p:cSld name="Title and Vertical Text">
     <p:spTree>
       <p:nvGrpSpPr>
@@ -1141,7 +1140,8 @@
           <a:p>
             <a:fld id="{C7367BA2-550A-D74A-85A3-8A8F71EA02BD}" type="datetime1">
               <a:rPr lang="de-DE" smtClean="0"/>
-              <a:t>26.06.12</a:t>
+              <a:pPr/>
+              <a:t>7/10/12</a:t>
             </a:fld>
             <a:endParaRPr lang="en-US" dirty="0"/>
           </a:p>
@@ -1214,7 +1214,7 @@
 </file>
 
 <file path=ppt/slideLayouts/slideLayout11.xml><?xml version="1.0" encoding="utf-8"?>
-<p:sldLayout xmlns:a="http://schemas.openxmlformats.org/drawingml/2006/main" xmlns:r="http://schemas.openxmlformats.org/officeDocument/2006/relationships" xmlns:p="http://schemas.openxmlformats.org/presentationml/2006/main" type="vertTitleAndTx" preserve="1">
+<p:sldLayout xmlns:a="http://schemas.openxmlformats.org/drawingml/2006/main" xmlns:r="http://schemas.openxmlformats.org/officeDocument/2006/relationships" xmlns:mc="http://schemas.openxmlformats.org/markup-compatibility/2006" xmlns:mv="urn:schemas-microsoft-com:mac:vml" xmlns:p="http://schemas.openxmlformats.org/presentationml/2006/main" mc:Ignorable="mv" mc:PreserveAttributes="mv:*" type="vertTitleAndTx" preserve="1">
   <p:cSld name="Vertical Title and Text">
     <p:spTree>
       <p:nvGrpSpPr>
@@ -1332,7 +1332,8 @@
           <a:p>
             <a:fld id="{7F1583F5-E0DD-204C-80EE-B5824D9D518D}" type="datetime1">
               <a:rPr lang="de-DE" smtClean="0"/>
-              <a:t>26.06.12</a:t>
+              <a:pPr/>
+              <a:t>7/10/12</a:t>
             </a:fld>
             <a:endParaRPr lang="en-US" dirty="0"/>
           </a:p>
@@ -1405,7 +1406,7 @@
 </file>
 
 <file path=ppt/slideLayouts/slideLayout2.xml><?xml version="1.0" encoding="utf-8"?>
-<p:sldLayout xmlns:a="http://schemas.openxmlformats.org/drawingml/2006/main" xmlns:r="http://schemas.openxmlformats.org/officeDocument/2006/relationships" xmlns:p="http://schemas.openxmlformats.org/presentationml/2006/main" type="obj" preserve="1">
+<p:sldLayout xmlns:a="http://schemas.openxmlformats.org/drawingml/2006/main" xmlns:r="http://schemas.openxmlformats.org/officeDocument/2006/relationships" xmlns:mc="http://schemas.openxmlformats.org/markup-compatibility/2006" xmlns:mv="urn:schemas-microsoft-com:mac:vml" xmlns:p="http://schemas.openxmlformats.org/presentationml/2006/main" mc:Ignorable="mv" mc:PreserveAttributes="mv:*" type="obj" preserve="1">
   <p:cSld name="Title and Content">
     <p:spTree>
       <p:nvGrpSpPr>
@@ -1513,7 +1514,8 @@
           <a:p>
             <a:fld id="{C1E2467A-468C-BB4F-8513-F5A32D4F9690}" type="datetime1">
               <a:rPr lang="de-DE" smtClean="0"/>
-              <a:t>26.06.12</a:t>
+              <a:pPr/>
+              <a:t>7/10/12</a:t>
             </a:fld>
             <a:endParaRPr lang="en-US" dirty="0"/>
           </a:p>
@@ -1586,7 +1588,7 @@
 </file>
 
 <file path=ppt/slideLayouts/slideLayout3.xml><?xml version="1.0" encoding="utf-8"?>
-<p:sldLayout xmlns:a="http://schemas.openxmlformats.org/drawingml/2006/main" xmlns:r="http://schemas.openxmlformats.org/officeDocument/2006/relationships" xmlns:p="http://schemas.openxmlformats.org/presentationml/2006/main" type="secHead" preserve="1">
+<p:sldLayout xmlns:a="http://schemas.openxmlformats.org/drawingml/2006/main" xmlns:r="http://schemas.openxmlformats.org/officeDocument/2006/relationships" xmlns:mc="http://schemas.openxmlformats.org/markup-compatibility/2006" xmlns:mv="urn:schemas-microsoft-com:mac:vml" xmlns:p="http://schemas.openxmlformats.org/presentationml/2006/main" mc:Ignorable="mv" mc:PreserveAttributes="mv:*" type="secHead" preserve="1">
   <p:cSld name="Section Header">
     <p:spTree>
       <p:nvGrpSpPr>
@@ -1770,7 +1772,8 @@
           <a:p>
             <a:fld id="{F0EEC0C8-BFB9-4548-802E-A846AF00E4F0}" type="datetime1">
               <a:rPr lang="de-DE" smtClean="0"/>
-              <a:t>26.06.12</a:t>
+              <a:pPr/>
+              <a:t>7/10/12</a:t>
             </a:fld>
             <a:endParaRPr lang="en-US" dirty="0"/>
           </a:p>
@@ -1843,7 +1846,7 @@
 </file>
 
 <file path=ppt/slideLayouts/slideLayout4.xml><?xml version="1.0" encoding="utf-8"?>
-<p:sldLayout xmlns:a="http://schemas.openxmlformats.org/drawingml/2006/main" xmlns:r="http://schemas.openxmlformats.org/officeDocument/2006/relationships" xmlns:p="http://schemas.openxmlformats.org/presentationml/2006/main" type="twoObj" preserve="1">
+<p:sldLayout xmlns:a="http://schemas.openxmlformats.org/drawingml/2006/main" xmlns:r="http://schemas.openxmlformats.org/officeDocument/2006/relationships" xmlns:mc="http://schemas.openxmlformats.org/markup-compatibility/2006" xmlns:mv="urn:schemas-microsoft-com:mac:vml" xmlns:p="http://schemas.openxmlformats.org/presentationml/2006/main" mc:Ignorable="mv" mc:PreserveAttributes="mv:*" type="twoObj" preserve="1">
   <p:cSld name="Two Content">
     <p:spTree>
       <p:nvGrpSpPr>
@@ -2069,7 +2072,8 @@
           <a:p>
             <a:fld id="{8A3B3C2A-60BA-9349-A3FC-833320638D76}" type="datetime1">
               <a:rPr lang="de-DE" smtClean="0"/>
-              <a:t>26.06.12</a:t>
+              <a:pPr/>
+              <a:t>7/10/12</a:t>
             </a:fld>
             <a:endParaRPr lang="en-US" dirty="0"/>
           </a:p>
@@ -2142,7 +2146,7 @@
 </file>
 
 <file path=ppt/slideLayouts/slideLayout5.xml><?xml version="1.0" encoding="utf-8"?>
-<p:sldLayout xmlns:a="http://schemas.openxmlformats.org/drawingml/2006/main" xmlns:r="http://schemas.openxmlformats.org/officeDocument/2006/relationships" xmlns:p="http://schemas.openxmlformats.org/presentationml/2006/main" type="twoTxTwoObj" preserve="1">
+<p:sldLayout xmlns:a="http://schemas.openxmlformats.org/drawingml/2006/main" xmlns:r="http://schemas.openxmlformats.org/officeDocument/2006/relationships" xmlns:mc="http://schemas.openxmlformats.org/markup-compatibility/2006" xmlns:mv="urn:schemas-microsoft-com:mac:vml" xmlns:p="http://schemas.openxmlformats.org/presentationml/2006/main" mc:Ignorable="mv" mc:PreserveAttributes="mv:*" type="twoTxTwoObj" preserve="1">
   <p:cSld name="Comparison">
     <p:spTree>
       <p:nvGrpSpPr>
@@ -2502,7 +2506,8 @@
           <a:p>
             <a:fld id="{6EE535F4-8EA9-174C-B4C8-28F4C8CF2436}" type="datetime1">
               <a:rPr lang="de-DE" smtClean="0"/>
-              <a:t>26.06.12</a:t>
+              <a:pPr/>
+              <a:t>7/10/12</a:t>
             </a:fld>
             <a:endParaRPr lang="en-US" dirty="0"/>
           </a:p>
@@ -2575,7 +2580,7 @@
 </file>
 
 <file path=ppt/slideLayouts/slideLayout6.xml><?xml version="1.0" encoding="utf-8"?>
-<p:sldLayout xmlns:a="http://schemas.openxmlformats.org/drawingml/2006/main" xmlns:r="http://schemas.openxmlformats.org/officeDocument/2006/relationships" xmlns:p="http://schemas.openxmlformats.org/presentationml/2006/main" type="titleOnly" preserve="1">
+<p:sldLayout xmlns:a="http://schemas.openxmlformats.org/drawingml/2006/main" xmlns:r="http://schemas.openxmlformats.org/officeDocument/2006/relationships" xmlns:mc="http://schemas.openxmlformats.org/markup-compatibility/2006" xmlns:mv="urn:schemas-microsoft-com:mac:vml" xmlns:p="http://schemas.openxmlformats.org/presentationml/2006/main" mc:Ignorable="mv" mc:PreserveAttributes="mv:*" type="titleOnly" preserve="1">
   <p:cSld name="Title Only">
     <p:spTree>
       <p:nvGrpSpPr>
@@ -2631,7 +2636,8 @@
           <a:p>
             <a:fld id="{687C3B21-AA4E-6A44-B26F-03E30F0E1AC7}" type="datetime1">
               <a:rPr lang="de-DE" smtClean="0"/>
-              <a:t>26.06.12</a:t>
+              <a:pPr/>
+              <a:t>7/10/12</a:t>
             </a:fld>
             <a:endParaRPr lang="en-US" dirty="0"/>
           </a:p>
@@ -2704,7 +2710,7 @@
 </file>
 
 <file path=ppt/slideLayouts/slideLayout7.xml><?xml version="1.0" encoding="utf-8"?>
-<p:sldLayout xmlns:a="http://schemas.openxmlformats.org/drawingml/2006/main" xmlns:r="http://schemas.openxmlformats.org/officeDocument/2006/relationships" xmlns:p="http://schemas.openxmlformats.org/presentationml/2006/main" type="blank" preserve="1">
+<p:sldLayout xmlns:a="http://schemas.openxmlformats.org/drawingml/2006/main" xmlns:r="http://schemas.openxmlformats.org/officeDocument/2006/relationships" xmlns:mc="http://schemas.openxmlformats.org/markup-compatibility/2006" xmlns:mv="urn:schemas-microsoft-com:mac:vml" xmlns:p="http://schemas.openxmlformats.org/presentationml/2006/main" mc:Ignorable="mv" mc:PreserveAttributes="mv:*" type="blank" preserve="1">
   <p:cSld name="Blank">
     <p:spTree>
       <p:nvGrpSpPr>
@@ -2737,7 +2743,8 @@
           <a:p>
             <a:fld id="{E2673A80-1BF4-6744-BBB1-0F4F03950794}" type="datetime1">
               <a:rPr lang="de-DE" smtClean="0"/>
-              <a:t>26.06.12</a:t>
+              <a:pPr/>
+              <a:t>7/10/12</a:t>
             </a:fld>
             <a:endParaRPr lang="en-US" dirty="0"/>
           </a:p>
@@ -2810,7 +2817,7 @@
 </file>
 
 <file path=ppt/slideLayouts/slideLayout8.xml><?xml version="1.0" encoding="utf-8"?>
-<p:sldLayout xmlns:a="http://schemas.openxmlformats.org/drawingml/2006/main" xmlns:r="http://schemas.openxmlformats.org/officeDocument/2006/relationships" xmlns:p="http://schemas.openxmlformats.org/presentationml/2006/main" type="objTx" preserve="1">
+<p:sldLayout xmlns:a="http://schemas.openxmlformats.org/drawingml/2006/main" xmlns:r="http://schemas.openxmlformats.org/officeDocument/2006/relationships" xmlns:mc="http://schemas.openxmlformats.org/markup-compatibility/2006" xmlns:mv="urn:schemas-microsoft-com:mac:vml" xmlns:p="http://schemas.openxmlformats.org/presentationml/2006/main" mc:Ignorable="mv" mc:PreserveAttributes="mv:*" type="objTx" preserve="1">
   <p:cSld name="Content with Caption">
     <p:spTree>
       <p:nvGrpSpPr>
@@ -3025,7 +3032,8 @@
           <a:p>
             <a:fld id="{CEB7882B-CB66-3744-A1C1-192223C8FD5E}" type="datetime1">
               <a:rPr lang="de-DE" smtClean="0"/>
-              <a:t>26.06.12</a:t>
+              <a:pPr/>
+              <a:t>7/10/12</a:t>
             </a:fld>
             <a:endParaRPr lang="en-US" dirty="0"/>
           </a:p>
@@ -3098,7 +3106,7 @@
 </file>
 
 <file path=ppt/slideLayouts/slideLayout9.xml><?xml version="1.0" encoding="utf-8"?>
-<p:sldLayout xmlns:a="http://schemas.openxmlformats.org/drawingml/2006/main" xmlns:r="http://schemas.openxmlformats.org/officeDocument/2006/relationships" xmlns:p="http://schemas.openxmlformats.org/presentationml/2006/main" type="picTx" preserve="1">
+<p:sldLayout xmlns:a="http://schemas.openxmlformats.org/drawingml/2006/main" xmlns:r="http://schemas.openxmlformats.org/officeDocument/2006/relationships" xmlns:mc="http://schemas.openxmlformats.org/markup-compatibility/2006" xmlns:mv="urn:schemas-microsoft-com:mac:vml" xmlns:p="http://schemas.openxmlformats.org/presentationml/2006/main" mc:Ignorable="mv" mc:PreserveAttributes="mv:*" type="picTx" preserve="1">
   <p:cSld name="Picture with Caption">
     <p:spTree>
       <p:nvGrpSpPr>
@@ -3289,7 +3297,8 @@
           <a:p>
             <a:fld id="{902D1A11-A0C9-C242-A94C-8C2E587DE2E3}" type="datetime1">
               <a:rPr lang="de-DE" smtClean="0"/>
-              <a:t>26.06.12</a:t>
+              <a:pPr/>
+              <a:t>7/10/12</a:t>
             </a:fld>
             <a:endParaRPr lang="en-US" dirty="0"/>
           </a:p>
@@ -3362,7 +3371,7 @@
 </file>
 
 <file path=ppt/slideMasters/slideMaster1.xml><?xml version="1.0" encoding="utf-8"?>
-<p:sldMaster xmlns:a="http://schemas.openxmlformats.org/drawingml/2006/main" xmlns:r="http://schemas.openxmlformats.org/officeDocument/2006/relationships" xmlns:p="http://schemas.openxmlformats.org/presentationml/2006/main">
+<p:sldMaster xmlns:a="http://schemas.openxmlformats.org/drawingml/2006/main" xmlns:r="http://schemas.openxmlformats.org/officeDocument/2006/relationships" xmlns:mc="http://schemas.openxmlformats.org/markup-compatibility/2006" xmlns:mv="urn:schemas-microsoft-com:mac:vml" xmlns:p="http://schemas.openxmlformats.org/presentationml/2006/main" mc:Ignorable="mv" mc:PreserveAttributes="mv:*">
   <p:cSld>
     <p:bg>
       <p:bgRef idx="1001">
@@ -3396,7 +3405,7 @@
             <a:alphaModFix/>
             <a:extLst>
               <a:ext uri="{28A0092B-C50C-407E-A947-70E740481C1C}">
-                <a14:useLocalDpi xmlns:a14="http://schemas.microsoft.com/office/drawing/2010/main" val="0"/>
+                <a14:useLocalDpi xmlns:a14="http://schemas.microsoft.com/office/drawing/2010/main" xmlns:p="http://schemas.openxmlformats.org/presentationml/2006/main" xmlns:r="http://schemas.openxmlformats.org/officeDocument/2006/relationships" xmlns:a="http://schemas.openxmlformats.org/drawingml/2006/main" xmlns="" val="0"/>
               </a:ext>
             </a:extLst>
           </a:blip>
@@ -3572,7 +3581,7 @@
             <a:fld id="{D28FDE68-CCAC-7646-8047-4E07B32EE7F1}" type="datetime1">
               <a:rPr lang="de-DE" smtClean="0"/>
               <a:pPr/>
-              <a:t>26.06.12</a:t>
+              <a:t>7/10/12</a:t>
             </a:fld>
             <a:endParaRPr lang="en-US" dirty="0"/>
           </a:p>
@@ -3948,7 +3957,7 @@
 </file>
 
 <file path=ppt/slideMasters/slideMaster2.xml><?xml version="1.0" encoding="utf-8"?>
-<p:sldMaster xmlns:a="http://schemas.openxmlformats.org/drawingml/2006/main" xmlns:r="http://schemas.openxmlformats.org/officeDocument/2006/relationships" xmlns:p="http://schemas.openxmlformats.org/presentationml/2006/main" preserve="1">
+<p:sldMaster xmlns:a="http://schemas.openxmlformats.org/drawingml/2006/main" xmlns:r="http://schemas.openxmlformats.org/officeDocument/2006/relationships" xmlns:mc="http://schemas.openxmlformats.org/markup-compatibility/2006" xmlns:mv="urn:schemas-microsoft-com:mac:vml" xmlns:p="http://schemas.openxmlformats.org/presentationml/2006/main" mc:Ignorable="mv" mc:PreserveAttributes="mv:*" preserve="1">
   <p:cSld>
     <p:bg>
       <p:bgPr>
@@ -4220,7 +4229,10 @@
                   <a:srgbClr val="000066"/>
                 </a:solidFill>
               </a:rPr>
-              <a:t>26.06.12</a:t>
+              <a:pPr eaLnBrk="0" hangingPunct="0">
+                <a:defRPr/>
+              </a:pPr>
+              <a:t>7/10/12</a:t>
             </a:fld>
             <a:endParaRPr lang="en-US" dirty="0">
               <a:solidFill>
@@ -4506,13 +4518,13 @@
     </p:spTree>
   </p:cSld>
   <p:clrMap bg1="lt1" tx1="dk1" bg2="lt2" tx2="dk2" accent1="accent1" accent2="accent2" accent3="accent3" accent4="accent4" accent5="accent5" accent6="accent6" hlink="hlink" folHlink="folHlink"/>
-  <p:transition xmlns:p14="http://schemas.microsoft.com/office/powerpoint/2010/main">
+  <p:transition>
     <p:dissolve/>
   </p:transition>
   <p:timing>
     <p:tnLst>
       <p:par>
-        <p:cTn xmlns:p14="http://schemas.microsoft.com/office/powerpoint/2010/main" id="1" dur="indefinite" restart="never" nodeType="tmRoot"/>
+        <p:cTn id="1" dur="indefinite" restart="never" nodeType="tmRoot"/>
       </p:par>
     </p:tnLst>
   </p:timing>
@@ -4903,7 +4915,7 @@
 </file>
 
 <file path=ppt/slideMasters/slideMaster3.xml><?xml version="1.0" encoding="utf-8"?>
-<p:sldMaster xmlns:a="http://schemas.openxmlformats.org/drawingml/2006/main" xmlns:r="http://schemas.openxmlformats.org/officeDocument/2006/relationships" xmlns:p="http://schemas.openxmlformats.org/presentationml/2006/main" preserve="1">
+<p:sldMaster xmlns:a="http://schemas.openxmlformats.org/drawingml/2006/main" xmlns:r="http://schemas.openxmlformats.org/officeDocument/2006/relationships" xmlns:mc="http://schemas.openxmlformats.org/markup-compatibility/2006" xmlns:mv="urn:schemas-microsoft-com:mac:vml" xmlns:p="http://schemas.openxmlformats.org/presentationml/2006/main" mc:Ignorable="mv" mc:PreserveAttributes="mv:*" preserve="1">
   <p:cSld>
     <p:bg>
       <p:bgPr>
@@ -5099,7 +5111,8 @@
                 </a:solidFill>
                 <a:latin typeface="Comic Sans MS" charset="0"/>
               </a:rPr>
-              <a:t>26.06.12</a:t>
+              <a:pPr/>
+              <a:t>7/10/12</a:t>
             </a:fld>
             <a:endParaRPr lang="en-GB" dirty="0">
               <a:solidFill>
@@ -5183,13 +5196,13 @@
     </p:spTree>
   </p:cSld>
   <p:clrMap bg1="lt1" tx1="dk1" bg2="lt2" tx2="dk2" accent1="accent1" accent2="accent2" accent3="accent3" accent4="accent4" accent5="accent5" accent6="accent6" hlink="hlink" folHlink="folHlink"/>
-  <p:transition xmlns:p14="http://schemas.microsoft.com/office/powerpoint/2010/main">
+  <p:transition>
     <p:dissolve/>
   </p:transition>
   <p:timing>
     <p:tnLst>
       <p:par>
-        <p:cTn xmlns:p14="http://schemas.microsoft.com/office/powerpoint/2010/main" id="1" dur="indefinite" restart="never" nodeType="tmRoot"/>
+        <p:cTn id="1" dur="indefinite" restart="never" nodeType="tmRoot"/>
       </p:par>
     </p:tnLst>
   </p:timing>
@@ -5596,7 +5609,7 @@
 </file>
 
 <file path=ppt/slides/slide1.xml><?xml version="1.0" encoding="utf-8"?>
-<p:sld xmlns:a="http://schemas.openxmlformats.org/drawingml/2006/main" xmlns:r="http://schemas.openxmlformats.org/officeDocument/2006/relationships" xmlns:p="http://schemas.openxmlformats.org/presentationml/2006/main">
+<p:sld xmlns:a="http://schemas.openxmlformats.org/drawingml/2006/main" xmlns:r="http://schemas.openxmlformats.org/officeDocument/2006/relationships" xmlns:mc="http://schemas.openxmlformats.org/markup-compatibility/2006" xmlns:mv="urn:schemas-microsoft-com:mac:vml" xmlns:p="http://schemas.openxmlformats.org/presentationml/2006/main" mc:Ignorable="mv" mc:PreserveAttributes="mv:*">
   <p:cSld>
     <p:spTree>
       <p:nvGrpSpPr>
@@ -5612,41 +5625,166 @@
           <a:chExt cx="0" cy="0"/>
         </a:xfrm>
       </p:grpSpPr>
-      <p:pic>
-        <p:nvPicPr>
-          <p:cNvPr id="5" name="Picture 4"/>
-          <p:cNvPicPr>
-            <a:picLocks noChangeAspect="1"/>
-          </p:cNvPicPr>
-          <p:nvPr/>
-        </p:nvPicPr>
-        <p:blipFill rotWithShape="1">
-          <a:blip r:embed="rId2"/>
-          <a:srcRect t="17652" b="12580"/>
-          <a:stretch/>
-        </p:blipFill>
+      <p:sp>
+        <p:nvSpPr>
+          <p:cNvPr id="14338" name="Rectangle 2"/>
+          <p:cNvSpPr>
+            <a:spLocks noGrp="1" noChangeArrowheads="1"/>
+          </p:cNvSpPr>
+          <p:nvPr>
+            <p:ph type="ctrTitle"/>
+          </p:nvPr>
+        </p:nvSpPr>
         <p:spPr>
           <a:xfrm>
-            <a:off x="1" y="0"/>
-            <a:ext cx="9144000" cy="6858000"/>
+            <a:off x="685800" y="1126276"/>
+            <a:ext cx="7772400" cy="2474175"/>
           </a:xfrm>
-          <a:prstGeom prst="rect">
-            <a:avLst/>
-          </a:prstGeom>
         </p:spPr>
-      </p:pic>
+        <p:txBody>
+          <a:bodyPr>
+            <a:normAutofit fontScale="90000"/>
+          </a:bodyPr>
+          <a:lstStyle/>
+          <a:p>
+            <a:pPr eaLnBrk="1" hangingPunct="1"/>
+            <a:r>
+              <a:rPr lang="en-US" dirty="0" smtClean="0"/>
+              <a:t>Getting more IPTA for your Buck</a:t>
+            </a:r>
+            <a:br>
+              <a:rPr lang="en-US" dirty="0" smtClean="0"/>
+            </a:br>
+            <a:r>
+              <a:rPr lang="en-US" dirty="0" smtClean="0"/>
+              <a:t/>
+            </a:r>
+            <a:br>
+              <a:rPr lang="en-US" dirty="0" smtClean="0"/>
+            </a:br>
+            <a:r>
+              <a:rPr lang="en-US" dirty="0"/>
+              <a:t/>
+            </a:r>
+            <a:br>
+              <a:rPr lang="en-US" dirty="0"/>
+            </a:br>
+            <a:r>
+              <a:rPr lang="en-US" dirty="0" smtClean="0"/>
+              <a:t> </a:t>
+            </a:r>
+            <a:endParaRPr lang="en-US" sz="2400" dirty="0" smtClean="0"/>
+          </a:p>
+        </p:txBody>
+      </p:sp>
+      <p:sp>
+        <p:nvSpPr>
+          <p:cNvPr id="14339" name="Rectangle 3"/>
+          <p:cNvSpPr>
+            <a:spLocks noGrp="1" noChangeArrowheads="1"/>
+          </p:cNvSpPr>
+          <p:nvPr>
+            <p:ph type="subTitle" idx="1"/>
+          </p:nvPr>
+        </p:nvSpPr>
+        <p:spPr/>
+        <p:txBody>
+          <a:bodyPr>
+            <a:normAutofit fontScale="85000" lnSpcReduction="20000"/>
+          </a:bodyPr>
+          <a:lstStyle/>
+          <a:p>
+            <a:pPr eaLnBrk="1" hangingPunct="1"/>
+            <a:r>
+              <a:rPr lang="en-US" dirty="0" smtClean="0">
+                <a:solidFill>
+                  <a:srgbClr val="FFFFFF"/>
+                </a:solidFill>
+              </a:rPr>
+              <a:t>David Champion</a:t>
+            </a:r>
+          </a:p>
+          <a:p>
+            <a:pPr eaLnBrk="1" hangingPunct="1"/>
+            <a:r>
+              <a:rPr lang="de-DE" dirty="0" smtClean="0">
+                <a:solidFill>
+                  <a:srgbClr val="FFFFFF"/>
+                </a:solidFill>
+              </a:rPr>
+              <a:t>Max-Planck-Institut für Radioastronomie</a:t>
+            </a:r>
+          </a:p>
+          <a:p>
+            <a:pPr eaLnBrk="1" hangingPunct="1"/>
+            <a:r>
+              <a:rPr lang="en-US" dirty="0" smtClean="0">
+                <a:solidFill>
+                  <a:srgbClr val="FFFFFF"/>
+                </a:solidFill>
+              </a:rPr>
+              <a:t>IPTA Conference, </a:t>
+            </a:r>
+            <a:r>
+              <a:rPr lang="en-US" dirty="0" err="1" smtClean="0">
+                <a:solidFill>
+                  <a:srgbClr val="FFFFFF"/>
+                </a:solidFill>
+              </a:rPr>
+              <a:t>Kiama</a:t>
+            </a:r>
+            <a:endParaRPr lang="en-US" dirty="0" smtClean="0">
+              <a:solidFill>
+                <a:srgbClr val="FFFFFF"/>
+              </a:solidFill>
+            </a:endParaRPr>
+          </a:p>
+          <a:p>
+            <a:pPr eaLnBrk="1" hangingPunct="1"/>
+            <a:r>
+              <a:rPr lang="en-US" dirty="0" smtClean="0">
+                <a:solidFill>
+                  <a:srgbClr val="FFFFFF"/>
+                </a:solidFill>
+              </a:rPr>
+              <a:t>29</a:t>
+            </a:r>
+            <a:r>
+              <a:rPr lang="en-US" baseline="30000" dirty="0" smtClean="0">
+                <a:solidFill>
+                  <a:srgbClr val="FFFFFF"/>
+                </a:solidFill>
+              </a:rPr>
+              <a:t>th</a:t>
+            </a:r>
+            <a:r>
+              <a:rPr lang="en-US" dirty="0" smtClean="0">
+                <a:solidFill>
+                  <a:srgbClr val="FFFFFF"/>
+                </a:solidFill>
+              </a:rPr>
+              <a:t> June2012</a:t>
+            </a:r>
+          </a:p>
+        </p:txBody>
+      </p:sp>
     </p:spTree>
+    <p:extLst>
+      <p:ext uri="{BB962C8B-B14F-4D97-AF65-F5344CB8AC3E}">
+        <p14:creationId xmlns:p14="http://schemas.microsoft.com/office/powerpoint/2010/main" xmlns:p="http://schemas.openxmlformats.org/presentationml/2006/main" xmlns:r="http://schemas.openxmlformats.org/officeDocument/2006/relationships" xmlns:a="http://schemas.openxmlformats.org/drawingml/2006/main" xmlns="" val="2936147000"/>
+      </p:ext>
+    </p:extLst>
   </p:cSld>
   <p:clrMapOvr>
     <a:masterClrMapping/>
   </p:clrMapOvr>
-  <p:transition xmlns:p14="http://schemas.microsoft.com/office/powerpoint/2010/main">
+  <p:transition>
     <p:fade/>
   </p:transition>
   <p:timing>
     <p:tnLst>
       <p:par>
-        <p:cTn xmlns:p14="http://schemas.microsoft.com/office/powerpoint/2010/main" id="1" dur="indefinite" restart="never" nodeType="tmRoot"/>
+        <p:cTn id="1" dur="indefinite" restart="never" nodeType="tmRoot"/>
       </p:par>
     </p:tnLst>
   </p:timing>
@@ -5654,7 +5792,7 @@
 </file>
 
 <file path=ppt/slides/slide10.xml><?xml version="1.0" encoding="utf-8"?>
-<p:sld xmlns:a="http://schemas.openxmlformats.org/drawingml/2006/main" xmlns:r="http://schemas.openxmlformats.org/officeDocument/2006/relationships" xmlns:p="http://schemas.openxmlformats.org/presentationml/2006/main">
+<p:sld xmlns:a="http://schemas.openxmlformats.org/drawingml/2006/main" xmlns:r="http://schemas.openxmlformats.org/officeDocument/2006/relationships" xmlns:mc="http://schemas.openxmlformats.org/markup-compatibility/2006" xmlns:mv="urn:schemas-microsoft-com:mac:vml" xmlns:p="http://schemas.openxmlformats.org/presentationml/2006/main" mc:Ignorable="mv" mc:PreserveAttributes="mv:*">
   <p:cSld>
     <p:spTree>
       <p:nvGrpSpPr>
@@ -5687,7 +5825,7 @@
           <a:p>
             <a:r>
               <a:rPr lang="en-US" dirty="0" smtClean="0"/>
-              <a:t>IPTA common infrastructure</a:t>
+              <a:t>IPTA common hardware</a:t>
             </a:r>
             <a:endParaRPr lang="en-US" dirty="0"/>
           </a:p>
@@ -5709,42 +5847,32 @@
           <a:lstStyle/>
           <a:p>
             <a:r>
-              <a:rPr lang="en-US" dirty="0" err="1" smtClean="0"/>
-              <a:t>Centralised</a:t>
-            </a:r>
-            <a:r>
               <a:rPr lang="en-US" dirty="0" smtClean="0"/>
-              <a:t> database of fully / partially reduced data</a:t>
+              <a:t>EPTA use common hardware: necessary for LEAP. Useful for comparison and combination.</a:t>
             </a:r>
           </a:p>
           <a:p>
             <a:r>
               <a:rPr lang="en-US" dirty="0" smtClean="0"/>
-              <a:t>PD, RS: DM analysis and GW detection technique linked</a:t>
-            </a:r>
-          </a:p>
-          <a:p>
-            <a:r>
-              <a:rPr lang="en-US" dirty="0"/>
-              <a:t>Access to raw </a:t>
-            </a:r>
-            <a:r>
-              <a:rPr lang="en-US" dirty="0" err="1"/>
-              <a:t>uncalibrated</a:t>
-            </a:r>
-            <a:r>
-              <a:rPr lang="en-US" dirty="0"/>
-              <a:t> </a:t>
-            </a:r>
+              <a:t>All our pulsars in one backend?</a:t>
+            </a:r>
+          </a:p>
+          <a:p>
             <a:r>
               <a:rPr lang="en-US" dirty="0" smtClean="0"/>
-              <a:t>data</a:t>
+              <a:t>Similar UBB frontends?</a:t>
             </a:r>
           </a:p>
           <a:p>
             <a:r>
               <a:rPr lang="en-US" dirty="0" smtClean="0"/>
-              <a:t>Common wiki and webpage</a:t>
+              <a:t>Willem: Temporal variations in frontend /backend.</a:t>
+            </a:r>
+          </a:p>
+          <a:p>
+            <a:r>
+              <a:rPr lang="en-US" dirty="0" smtClean="0"/>
+              <a:t>Willem: In some cases MTM is better than x4 integration time</a:t>
             </a:r>
             <a:endParaRPr lang="en-US" dirty="0"/>
           </a:p>
@@ -5799,9 +5927,10 @@
           <a:bodyPr/>
           <a:lstStyle/>
           <a:p>
-            <a:fld id="{07A801C9-BEFE-2142-B5B9-6A058FE5E0D4}" type="datetime1">
+            <a:fld id="{FC084A64-DD25-E54C-97CD-E1649A612FA1}" type="datetime1">
               <a:rPr lang="de-DE" smtClean="0"/>
-              <a:t>28.06.12</a:t>
+              <a:pPr/>
+              <a:t>7/10/12</a:t>
             </a:fld>
             <a:endParaRPr lang="en-US" dirty="0"/>
           </a:p>
@@ -5834,7 +5963,7 @@
     </p:spTree>
     <p:extLst>
       <p:ext uri="{BB962C8B-B14F-4D97-AF65-F5344CB8AC3E}">
-        <p14:creationId xmlns:p14="http://schemas.microsoft.com/office/powerpoint/2010/main" val="860962665"/>
+        <p14:creationId xmlns:p14="http://schemas.microsoft.com/office/powerpoint/2010/main" xmlns:p="http://schemas.openxmlformats.org/presentationml/2006/main" xmlns:r="http://schemas.openxmlformats.org/officeDocument/2006/relationships" xmlns:a="http://schemas.openxmlformats.org/drawingml/2006/main" xmlns="" val="2188124046"/>
       </p:ext>
     </p:extLst>
   </p:cSld>
@@ -5845,7 +5974,7 @@
 </file>
 
 <file path=ppt/slides/slide11.xml><?xml version="1.0" encoding="utf-8"?>
-<p:sld xmlns:a="http://schemas.openxmlformats.org/drawingml/2006/main" xmlns:r="http://schemas.openxmlformats.org/officeDocument/2006/relationships" xmlns:p="http://schemas.openxmlformats.org/presentationml/2006/main">
+<p:sld xmlns:a="http://schemas.openxmlformats.org/drawingml/2006/main" xmlns:r="http://schemas.openxmlformats.org/officeDocument/2006/relationships" xmlns:mc="http://schemas.openxmlformats.org/markup-compatibility/2006" xmlns:mv="urn:schemas-microsoft-com:mac:vml" xmlns:p="http://schemas.openxmlformats.org/presentationml/2006/main" mc:Ignorable="mv" mc:PreserveAttributes="mv:*">
   <p:cSld>
     <p:spTree>
       <p:nvGrpSpPr>
@@ -5878,7 +6007,7 @@
           <a:p>
             <a:r>
               <a:rPr lang="en-US" dirty="0" smtClean="0"/>
-              <a:t>IPTA common hardware</a:t>
+              <a:t>Detection / Limit Techniques</a:t>
             </a:r>
             <a:endParaRPr lang="en-US" dirty="0"/>
           </a:p>
@@ -5896,36 +6025,52 @@
         </p:nvSpPr>
         <p:spPr/>
         <p:txBody>
-          <a:bodyPr/>
+          <a:bodyPr>
+            <a:normAutofit fontScale="92500"/>
+          </a:bodyPr>
           <a:lstStyle/>
           <a:p>
             <a:r>
               <a:rPr lang="en-US" dirty="0" smtClean="0"/>
-              <a:t>EPTA use common hardware: necessary for LEAP. Useful for comparison and combination.</a:t>
-            </a:r>
-          </a:p>
-          <a:p>
+              <a:t>At least 4 limit or detection techniques</a:t>
+            </a:r>
+          </a:p>
+          <a:p>
+            <a:r>
+              <a:rPr lang="en-US" dirty="0"/>
+              <a:t>DN: “The ISM is a monster and we should be scared of it</a:t>
+            </a:r>
             <a:r>
               <a:rPr lang="en-US" dirty="0" smtClean="0"/>
-              <a:t>All our pulsars in one backend?</a:t>
+              <a:t>”</a:t>
             </a:r>
           </a:p>
           <a:p>
             <a:r>
               <a:rPr lang="en-US" dirty="0" smtClean="0"/>
-              <a:t>Similar UBB frontends?</a:t>
-            </a:r>
-          </a:p>
-          <a:p>
+              <a:t>DM keep Matthew awake at night</a:t>
+            </a:r>
+          </a:p>
+          <a:p>
+            <a:r>
+              <a:rPr lang="en-US" dirty="0" err="1" smtClean="0"/>
+              <a:t>Linqing</a:t>
+            </a:r>
             <a:r>
               <a:rPr lang="en-US" dirty="0" smtClean="0"/>
-              <a:t>Willem: Temporal variations in frontend /backend.</a:t>
+              <a:t>: Keep the non-optimal techniques</a:t>
             </a:r>
           </a:p>
           <a:p>
             <a:r>
               <a:rPr lang="en-US" dirty="0" smtClean="0"/>
-              <a:t>Willem: In some cases MTM is better than x4 integration time</a:t>
+              <a:t>Different biases and assumptions</a:t>
+            </a:r>
+          </a:p>
+          <a:p>
+            <a:r>
+              <a:rPr lang="en-US" dirty="0" smtClean="0"/>
+              <a:t>When a detection is made it would be reassuring to see it in more than one technique</a:t>
             </a:r>
             <a:endParaRPr lang="en-US" dirty="0"/>
           </a:p>
@@ -5980,9 +6125,10 @@
           <a:bodyPr/>
           <a:lstStyle/>
           <a:p>
-            <a:fld id="{FC084A64-DD25-E54C-97CD-E1649A612FA1}" type="datetime1">
+            <a:fld id="{E2665B39-5F7E-EE4A-A840-D78921C644A3}" type="datetime1">
               <a:rPr lang="de-DE" smtClean="0"/>
-              <a:t>26.06.12</a:t>
+              <a:pPr/>
+              <a:t>7/10/12</a:t>
             </a:fld>
             <a:endParaRPr lang="en-US" dirty="0"/>
           </a:p>
@@ -6015,7 +6161,7 @@
     </p:spTree>
     <p:extLst>
       <p:ext uri="{BB962C8B-B14F-4D97-AF65-F5344CB8AC3E}">
-        <p14:creationId xmlns:p14="http://schemas.microsoft.com/office/powerpoint/2010/main" val="2188124046"/>
+        <p14:creationId xmlns:p14="http://schemas.microsoft.com/office/powerpoint/2010/main" xmlns:p="http://schemas.openxmlformats.org/presentationml/2006/main" xmlns:r="http://schemas.openxmlformats.org/officeDocument/2006/relationships" xmlns:a="http://schemas.openxmlformats.org/drawingml/2006/main" xmlns="" val="194492848"/>
       </p:ext>
     </p:extLst>
   </p:cSld>
@@ -6026,7 +6172,7 @@
 </file>
 
 <file path=ppt/slides/slide12.xml><?xml version="1.0" encoding="utf-8"?>
-<p:sld xmlns:a="http://schemas.openxmlformats.org/drawingml/2006/main" xmlns:r="http://schemas.openxmlformats.org/officeDocument/2006/relationships" xmlns:p="http://schemas.openxmlformats.org/presentationml/2006/main">
+<p:sld xmlns:a="http://schemas.openxmlformats.org/drawingml/2006/main" xmlns:r="http://schemas.openxmlformats.org/officeDocument/2006/relationships" xmlns:mc="http://schemas.openxmlformats.org/markup-compatibility/2006" xmlns:mv="urn:schemas-microsoft-com:mac:vml" xmlns:p="http://schemas.openxmlformats.org/presentationml/2006/main" mc:Ignorable="mv" mc:PreserveAttributes="mv:*">
   <p:cSld>
     <p:spTree>
       <p:nvGrpSpPr>
@@ -6059,7 +6205,7 @@
           <a:p>
             <a:r>
               <a:rPr lang="en-US" dirty="0" smtClean="0"/>
-              <a:t>Detection / Limit Techniques</a:t>
+              <a:t>Beyond GWs</a:t>
             </a:r>
             <a:endParaRPr lang="en-US" dirty="0"/>
           </a:p>
@@ -6078,52 +6224,71 @@
         <p:spPr/>
         <p:txBody>
           <a:bodyPr>
-            <a:normAutofit fontScale="92500"/>
+            <a:normAutofit fontScale="92500" lnSpcReduction="10000"/>
           </a:bodyPr>
           <a:lstStyle/>
           <a:p>
             <a:r>
               <a:rPr lang="en-US" dirty="0" smtClean="0"/>
-              <a:t>At least 4 limit or detection techniques</a:t>
-            </a:r>
-          </a:p>
-          <a:p>
-            <a:r>
-              <a:rPr lang="en-US" dirty="0"/>
-              <a:t>DN: “The ISM is a monster and we should be scared of it</a:t>
-            </a:r>
+              <a:t>Is the IPTA only for GWs?</a:t>
+            </a:r>
+          </a:p>
+          <a:p>
             <a:r>
               <a:rPr lang="en-US" dirty="0" smtClean="0"/>
-              <a:t>”</a:t>
-            </a:r>
-          </a:p>
-          <a:p>
+              <a:t>Many of our current projects are not purely GW based.</a:t>
+            </a:r>
+          </a:p>
+          <a:p>
+            <a:pPr lvl="1"/>
             <a:r>
               <a:rPr lang="en-US" dirty="0" smtClean="0"/>
-              <a:t>DM keep Matthew awake at night</a:t>
-            </a:r>
-          </a:p>
-          <a:p>
+              <a:t>Clock corrections (George’s talk)</a:t>
+            </a:r>
+          </a:p>
+          <a:p>
+            <a:pPr lvl="1"/>
+            <a:r>
+              <a:rPr lang="en-US" dirty="0" smtClean="0"/>
+              <a:t>Solar wind (</a:t>
+            </a:r>
             <a:r>
               <a:rPr lang="en-US" dirty="0" err="1" smtClean="0"/>
-              <a:t>Linqing</a:t>
+              <a:t>Xiaopeng’s</a:t>
             </a:r>
             <a:r>
               <a:rPr lang="en-US" dirty="0" smtClean="0"/>
-              <a:t>: Keep the non-optimal techniques</a:t>
-            </a:r>
-          </a:p>
-          <a:p>
+              <a:t> talk)</a:t>
+            </a:r>
+          </a:p>
+          <a:p>
+            <a:pPr lvl="1"/>
             <a:r>
               <a:rPr lang="en-US" dirty="0" smtClean="0"/>
-              <a:t>Different biases and assumptions</a:t>
-            </a:r>
-          </a:p>
-          <a:p>
+              <a:t>ISM effects (e.g. Dan’s talk)</a:t>
+            </a:r>
+          </a:p>
+          <a:p>
+            <a:pPr lvl="1"/>
             <a:r>
               <a:rPr lang="en-US" dirty="0" smtClean="0"/>
-              <a:t>When a detection is made it would be reassuring to see it in more than one technique</a:t>
-            </a:r>
+              <a:t>Pulsar navigation (Jiang’s talk)</a:t>
+            </a:r>
+          </a:p>
+          <a:p>
+            <a:pPr lvl="1"/>
+            <a:r>
+              <a:rPr lang="en-US" dirty="0" smtClean="0"/>
+              <a:t>Solar System</a:t>
+            </a:r>
+          </a:p>
+          <a:p>
+            <a:r>
+              <a:rPr lang="en-US" dirty="0" smtClean="0"/>
+              <a:t>“Our secondary science is more interesting than most groups’ primary science”</a:t>
+            </a:r>
+          </a:p>
+          <a:p>
             <a:endParaRPr lang="en-US" dirty="0"/>
           </a:p>
         </p:txBody>
@@ -6147,18 +6312,14 @@
               <a:defRPr/>
             </a:pPr>
             <a:r>
-              <a:rPr lang="en-US" b="0" smtClean="0">
-                <a:solidFill>
-                  <a:srgbClr val="FFFFFF"/>
-                </a:solidFill>
-              </a:rPr>
-              <a:t>IPTA conference 2012</a:t>
-            </a:r>
-            <a:endParaRPr lang="en-US" b="0" dirty="0" smtClean="0">
-              <a:solidFill>
-                <a:srgbClr val="FFFFFF"/>
-              </a:solidFill>
-            </a:endParaRPr>
+              <a:rPr lang="en-US" dirty="0"/>
+              <a:t>IPTA conference </a:t>
+            </a:r>
+            <a:r>
+              <a:rPr lang="en-US" dirty="0" smtClean="0"/>
+              <a:t>2012</a:t>
+            </a:r>
+            <a:endParaRPr lang="en-US" dirty="0"/>
           </a:p>
         </p:txBody>
       </p:sp>
@@ -6177,9 +6338,10 @@
           <a:bodyPr/>
           <a:lstStyle/>
           <a:p>
-            <a:fld id="{E2665B39-5F7E-EE4A-A840-D78921C644A3}" type="datetime1">
+            <a:fld id="{0527C831-90DB-2443-B0F6-267AD3244BB2}" type="datetime1">
               <a:rPr lang="de-DE" smtClean="0"/>
-              <a:t>29.06.12</a:t>
+              <a:pPr/>
+              <a:t>7/10/12</a:t>
             </a:fld>
             <a:endParaRPr lang="en-US" dirty="0"/>
           </a:p>
@@ -6212,7 +6374,7 @@
     </p:spTree>
     <p:extLst>
       <p:ext uri="{BB962C8B-B14F-4D97-AF65-F5344CB8AC3E}">
-        <p14:creationId xmlns:p14="http://schemas.microsoft.com/office/powerpoint/2010/main" val="194492848"/>
+        <p14:creationId xmlns:p14="http://schemas.microsoft.com/office/powerpoint/2010/main" xmlns:p="http://schemas.openxmlformats.org/presentationml/2006/main" xmlns:r="http://schemas.openxmlformats.org/officeDocument/2006/relationships" xmlns:a="http://schemas.openxmlformats.org/drawingml/2006/main" xmlns="" val="1459164036"/>
       </p:ext>
     </p:extLst>
   </p:cSld>
@@ -6223,7 +6385,7 @@
 </file>
 
 <file path=ppt/slides/slide13.xml><?xml version="1.0" encoding="utf-8"?>
-<p:sld xmlns:a="http://schemas.openxmlformats.org/drawingml/2006/main" xmlns:r="http://schemas.openxmlformats.org/officeDocument/2006/relationships" xmlns:p="http://schemas.openxmlformats.org/presentationml/2006/main">
+<p:sld xmlns:a="http://schemas.openxmlformats.org/drawingml/2006/main" xmlns:r="http://schemas.openxmlformats.org/officeDocument/2006/relationships" xmlns:mc="http://schemas.openxmlformats.org/markup-compatibility/2006" xmlns:mv="urn:schemas-microsoft-com:mac:vml" xmlns:p="http://schemas.openxmlformats.org/presentationml/2006/main" mc:Ignorable="mv" mc:PreserveAttributes="mv:*">
   <p:cSld>
     <p:spTree>
       <p:nvGrpSpPr>
@@ -6256,7 +6418,7 @@
           <a:p>
             <a:r>
               <a:rPr lang="en-US" dirty="0" smtClean="0"/>
-              <a:t>Beyond GWs</a:t>
+              <a:t>Expanding the IPTA</a:t>
             </a:r>
             <a:endParaRPr lang="en-US" dirty="0"/>
           </a:p>
@@ -6274,72 +6436,34 @@
         </p:nvSpPr>
         <p:spPr/>
         <p:txBody>
-          <a:bodyPr>
-            <a:normAutofit fontScale="92500" lnSpcReduction="10000"/>
-          </a:bodyPr>
+          <a:bodyPr/>
           <a:lstStyle/>
           <a:p>
             <a:r>
               <a:rPr lang="en-US" dirty="0" smtClean="0"/>
-              <a:t>Is the IPTA only for GWs?</a:t>
+              <a:t>FAST - can we expect a CPTA?</a:t>
             </a:r>
           </a:p>
           <a:p>
             <a:r>
               <a:rPr lang="en-US" dirty="0" smtClean="0"/>
-              <a:t>Many of our current projects are not purely GW based.</a:t>
+              <a:t>Proposals as the IPTA?</a:t>
             </a:r>
           </a:p>
           <a:p>
             <a:pPr lvl="1"/>
             <a:r>
+              <a:rPr lang="en-US" dirty="0" err="1" smtClean="0"/>
+              <a:t>MeerKAT</a:t>
+            </a:r>
+            <a:endParaRPr lang="en-US" dirty="0" smtClean="0"/>
+          </a:p>
+          <a:p>
+            <a:pPr lvl="1"/>
+            <a:r>
               <a:rPr lang="en-US" dirty="0" smtClean="0"/>
-              <a:t>Clock corrections (George’s talk)</a:t>
-            </a:r>
-          </a:p>
-          <a:p>
-            <a:pPr lvl="1"/>
-            <a:r>
-              <a:rPr lang="en-US" dirty="0" smtClean="0"/>
-              <a:t>Solar wind (</a:t>
-            </a:r>
-            <a:r>
-              <a:rPr lang="en-US" dirty="0" err="1" smtClean="0"/>
-              <a:t>Xiaopeng’s</a:t>
-            </a:r>
-            <a:r>
-              <a:rPr lang="en-US" dirty="0" smtClean="0"/>
-              <a:t> talk)</a:t>
-            </a:r>
-          </a:p>
-          <a:p>
-            <a:pPr lvl="1"/>
-            <a:r>
-              <a:rPr lang="en-US" dirty="0" smtClean="0"/>
-              <a:t>ISM effects (e.g. Dan’s talk)</a:t>
-            </a:r>
-          </a:p>
-          <a:p>
-            <a:pPr lvl="1"/>
-            <a:r>
-              <a:rPr lang="en-US" dirty="0" smtClean="0"/>
-              <a:t>Pulsar navigation (Jiang’s talk)</a:t>
-            </a:r>
-          </a:p>
-          <a:p>
-            <a:pPr lvl="1"/>
-            <a:r>
-              <a:rPr lang="en-US" dirty="0" smtClean="0"/>
-              <a:t>Solar System</a:t>
-            </a:r>
-          </a:p>
-          <a:p>
-            <a:r>
-              <a:rPr lang="en-US" dirty="0" smtClean="0"/>
-              <a:t>“Our secondary science is more interesting than most groups’ primary science”</a:t>
-            </a:r>
-          </a:p>
-          <a:p>
+              <a:t>SKA</a:t>
+            </a:r>
             <a:endParaRPr lang="en-US" dirty="0"/>
           </a:p>
         </p:txBody>
@@ -6363,14 +6487,18 @@
               <a:defRPr/>
             </a:pPr>
             <a:r>
-              <a:rPr lang="en-US" dirty="0"/>
-              <a:t>IPTA conference </a:t>
-            </a:r>
-            <a:r>
-              <a:rPr lang="en-US" dirty="0" smtClean="0"/>
-              <a:t>2012</a:t>
-            </a:r>
-            <a:endParaRPr lang="en-US" dirty="0"/>
+              <a:rPr lang="en-US" b="0" smtClean="0">
+                <a:solidFill>
+                  <a:srgbClr val="FFFFFF"/>
+                </a:solidFill>
+              </a:rPr>
+              <a:t>IPTA conference 2012</a:t>
+            </a:r>
+            <a:endParaRPr lang="en-US" b="0" dirty="0" smtClean="0">
+              <a:solidFill>
+                <a:srgbClr val="FFFFFF"/>
+              </a:solidFill>
+            </a:endParaRPr>
           </a:p>
         </p:txBody>
       </p:sp>
@@ -6389,9 +6517,10 @@
           <a:bodyPr/>
           <a:lstStyle/>
           <a:p>
-            <a:fld id="{0527C831-90DB-2443-B0F6-267AD3244BB2}" type="datetime1">
+            <a:fld id="{D75F85F9-A695-C245-A8F1-ECEEBF45872F}" type="datetime1">
               <a:rPr lang="de-DE" smtClean="0"/>
-              <a:t>26.06.12</a:t>
+              <a:pPr/>
+              <a:t>7/10/12</a:t>
             </a:fld>
             <a:endParaRPr lang="en-US" dirty="0"/>
           </a:p>
@@ -6424,7 +6553,7 @@
     </p:spTree>
     <p:extLst>
       <p:ext uri="{BB962C8B-B14F-4D97-AF65-F5344CB8AC3E}">
-        <p14:creationId xmlns:p14="http://schemas.microsoft.com/office/powerpoint/2010/main" val="1459164036"/>
+        <p14:creationId xmlns:p14="http://schemas.microsoft.com/office/powerpoint/2010/main" xmlns:p="http://schemas.openxmlformats.org/presentationml/2006/main" xmlns:r="http://schemas.openxmlformats.org/officeDocument/2006/relationships" xmlns:a="http://schemas.openxmlformats.org/drawingml/2006/main" xmlns="" val="773340146"/>
       </p:ext>
     </p:extLst>
   </p:cSld>
@@ -6435,7 +6564,7 @@
 </file>
 
 <file path=ppt/slides/slide14.xml><?xml version="1.0" encoding="utf-8"?>
-<p:sld xmlns:a="http://schemas.openxmlformats.org/drawingml/2006/main" xmlns:r="http://schemas.openxmlformats.org/officeDocument/2006/relationships" xmlns:p="http://schemas.openxmlformats.org/presentationml/2006/main">
+<p:sld xmlns:a="http://schemas.openxmlformats.org/drawingml/2006/main" xmlns:r="http://schemas.openxmlformats.org/officeDocument/2006/relationships" xmlns:mc="http://schemas.openxmlformats.org/markup-compatibility/2006" xmlns:mv="urn:schemas-microsoft-com:mac:vml" xmlns:p="http://schemas.openxmlformats.org/presentationml/2006/main" mc:Ignorable="mv" mc:PreserveAttributes="mv:*">
   <p:cSld>
     <p:spTree>
       <p:nvGrpSpPr>
@@ -6468,7 +6597,7 @@
           <a:p>
             <a:r>
               <a:rPr lang="en-US" dirty="0" smtClean="0"/>
-              <a:t>Expanding the IPTA</a:t>
+              <a:t>The Bucks</a:t>
             </a:r>
             <a:endParaRPr lang="en-US" dirty="0"/>
           </a:p>
@@ -6491,36 +6620,56 @@
           <a:p>
             <a:r>
               <a:rPr lang="en-US" dirty="0" smtClean="0"/>
-              <a:t>FAST - can we expect a CPTA?</a:t>
+              <a:t>“The IPTA is like Star Trek, it started out as a 5 year mission, but it keeps coming back” Mike</a:t>
             </a:r>
           </a:p>
           <a:p>
             <a:r>
               <a:rPr lang="en-US" dirty="0" smtClean="0"/>
-              <a:t>Proposals as the IPTA?</a:t>
-            </a:r>
-          </a:p>
-          <a:p>
-            <a:pPr lvl="1"/>
-            <a:r>
-              <a:rPr lang="en-US" dirty="0" err="1" smtClean="0"/>
-              <a:t>MeerKAT</a:t>
-            </a:r>
-            <a:endParaRPr lang="en-US" dirty="0" smtClean="0"/>
-          </a:p>
-          <a:p>
-            <a:pPr lvl="1"/>
+              <a:t>“We use large amounts of expensive telescope time” Simon</a:t>
+            </a:r>
+          </a:p>
+          <a:p>
             <a:r>
               <a:rPr lang="en-US" dirty="0" smtClean="0"/>
-              <a:t>SKA</a:t>
-            </a:r>
+              <a:t>Matthew: 300M$ project</a:t>
+            </a:r>
+          </a:p>
+          <a:p>
+            <a:r>
+              <a:rPr lang="en-US" dirty="0" smtClean="0"/>
+              <a:t>“Let the TACs do their job”</a:t>
+            </a:r>
+          </a:p>
+        </p:txBody>
+      </p:sp>
+      <p:sp>
+        <p:nvSpPr>
+          <p:cNvPr id="4" name="Date Placeholder 3"/>
+          <p:cNvSpPr>
+            <a:spLocks noGrp="1"/>
+          </p:cNvSpPr>
+          <p:nvPr>
+            <p:ph type="dt" sz="half" idx="10"/>
+          </p:nvPr>
+        </p:nvSpPr>
+        <p:spPr/>
+        <p:txBody>
+          <a:bodyPr/>
+          <a:lstStyle/>
+          <a:p>
+            <a:fld id="{C1E2467A-468C-BB4F-8513-F5A32D4F9690}" type="datetime1">
+              <a:rPr lang="de-DE" smtClean="0"/>
+              <a:pPr/>
+              <a:t>7/10/12</a:t>
+            </a:fld>
             <a:endParaRPr lang="en-US" dirty="0"/>
           </a:p>
         </p:txBody>
       </p:sp>
       <p:sp>
         <p:nvSpPr>
-          <p:cNvPr id="4" name="Footer Placeholder 3"/>
+          <p:cNvPr id="5" name="Footer Placeholder 4"/>
           <p:cNvSpPr>
             <a:spLocks noGrp="1"/>
           </p:cNvSpPr>
@@ -6537,41 +6686,10 @@
               <a:defRPr/>
             </a:pPr>
             <a:r>
-              <a:rPr lang="en-US" b="0" smtClean="0">
-                <a:solidFill>
-                  <a:srgbClr val="FFFFFF"/>
-                </a:solidFill>
-              </a:rPr>
+              <a:rPr lang="en-US" b="0" smtClean="0"/>
               <a:t>IPTA conference 2012</a:t>
             </a:r>
-            <a:endParaRPr lang="en-US" b="0" dirty="0" smtClean="0">
-              <a:solidFill>
-                <a:srgbClr val="FFFFFF"/>
-              </a:solidFill>
-            </a:endParaRPr>
-          </a:p>
-        </p:txBody>
-      </p:sp>
-      <p:sp>
-        <p:nvSpPr>
-          <p:cNvPr id="5" name="Date Placeholder 4"/>
-          <p:cNvSpPr>
-            <a:spLocks noGrp="1"/>
-          </p:cNvSpPr>
-          <p:nvPr>
-            <p:ph type="dt" sz="half" idx="10"/>
-          </p:nvPr>
-        </p:nvSpPr>
-        <p:spPr/>
-        <p:txBody>
-          <a:bodyPr/>
-          <a:lstStyle/>
-          <a:p>
-            <a:fld id="{D75F85F9-A695-C245-A8F1-ECEEBF45872F}" type="datetime1">
-              <a:rPr lang="de-DE" smtClean="0"/>
-              <a:t>26.06.12</a:t>
-            </a:fld>
-            <a:endParaRPr lang="en-US" dirty="0"/>
+            <a:endParaRPr lang="en-US" b="0" dirty="0" smtClean="0"/>
           </a:p>
         </p:txBody>
       </p:sp>
@@ -6602,7 +6720,7 @@
     </p:spTree>
     <p:extLst>
       <p:ext uri="{BB962C8B-B14F-4D97-AF65-F5344CB8AC3E}">
-        <p14:creationId xmlns:p14="http://schemas.microsoft.com/office/powerpoint/2010/main" val="773340146"/>
+        <p14:creationId xmlns:p14="http://schemas.microsoft.com/office/powerpoint/2010/main" xmlns:p="http://schemas.openxmlformats.org/presentationml/2006/main" xmlns:r="http://schemas.openxmlformats.org/officeDocument/2006/relationships" xmlns:a="http://schemas.openxmlformats.org/drawingml/2006/main" xmlns="" val="1676079957"/>
       </p:ext>
     </p:extLst>
   </p:cSld>
@@ -6613,7 +6731,7 @@
 </file>
 
 <file path=ppt/slides/slide15.xml><?xml version="1.0" encoding="utf-8"?>
-<p:sld xmlns:a="http://schemas.openxmlformats.org/drawingml/2006/main" xmlns:r="http://schemas.openxmlformats.org/officeDocument/2006/relationships" xmlns:p="http://schemas.openxmlformats.org/presentationml/2006/main">
+<p:sld xmlns:a="http://schemas.openxmlformats.org/drawingml/2006/main" xmlns:r="http://schemas.openxmlformats.org/officeDocument/2006/relationships" xmlns:mc="http://schemas.openxmlformats.org/markup-compatibility/2006" xmlns:mv="urn:schemas-microsoft-com:mac:vml" xmlns:p="http://schemas.openxmlformats.org/presentationml/2006/main" mc:Ignorable="mv" mc:PreserveAttributes="mv:*">
   <p:cSld>
     <p:spTree>
       <p:nvGrpSpPr>
@@ -6646,7 +6764,7 @@
           <a:p>
             <a:r>
               <a:rPr lang="en-US" dirty="0" smtClean="0"/>
-              <a:t>The Bucks</a:t>
+              <a:t>Global funding</a:t>
             </a:r>
             <a:endParaRPr lang="en-US" dirty="0"/>
           </a:p>
@@ -6669,55 +6787,62 @@
           <a:p>
             <a:r>
               <a:rPr lang="en-US" dirty="0" smtClean="0"/>
-              <a:t>“The IPTA is like Star Trek, it started out as a 5 year mission, but it keeps coming back” Mike</a:t>
-            </a:r>
+              <a:t>E.g. PIRE grant for </a:t>
+            </a:r>
+            <a:r>
+              <a:rPr lang="en-US" dirty="0" err="1" smtClean="0"/>
+              <a:t>NanoGRAV</a:t>
+            </a:r>
+            <a:endParaRPr lang="en-US" dirty="0" smtClean="0"/>
           </a:p>
           <a:p>
             <a:r>
               <a:rPr lang="en-US" dirty="0" smtClean="0"/>
-              <a:t>“We use large amounts of expensive telescope time” Simon</a:t>
-            </a:r>
-          </a:p>
-          <a:p>
+              <a:t>Resources:</a:t>
+            </a:r>
+          </a:p>
+          <a:p>
+            <a:pPr lvl="1"/>
             <a:r>
               <a:rPr lang="en-US" dirty="0" smtClean="0"/>
-              <a:t>Matthew: 300M$ project</a:t>
-            </a:r>
-          </a:p>
-          <a:p>
+              <a:t>IPTA white paper</a:t>
+            </a:r>
+          </a:p>
+          <a:p>
+            <a:pPr lvl="1"/>
             <a:r>
               <a:rPr lang="en-US" dirty="0" smtClean="0"/>
-              <a:t>“Let the TACs do their job”</a:t>
-            </a:r>
-          </a:p>
-        </p:txBody>
-      </p:sp>
-      <p:sp>
-        <p:nvSpPr>
-          <p:cNvPr id="4" name="Date Placeholder 3"/>
-          <p:cNvSpPr>
-            <a:spLocks noGrp="1"/>
-          </p:cNvSpPr>
-          <p:nvPr>
-            <p:ph type="dt" sz="half" idx="10"/>
-          </p:nvPr>
-        </p:nvSpPr>
-        <p:spPr/>
-        <p:txBody>
-          <a:bodyPr/>
-          <a:lstStyle/>
-          <a:p>
-            <a:fld id="{C1E2467A-468C-BB4F-8513-F5A32D4F9690}" type="datetime1">
-              <a:rPr lang="de-DE" smtClean="0"/>
-              <a:t>28.06.12</a:t>
-            </a:fld>
+              <a:t>Sources:</a:t>
+            </a:r>
+          </a:p>
+          <a:p>
+            <a:pPr lvl="2"/>
+            <a:r>
+              <a:rPr lang="en-US" dirty="0" err="1" smtClean="0"/>
+              <a:t>NanoGrav</a:t>
+            </a:r>
+            <a:endParaRPr lang="en-US" dirty="0" smtClean="0"/>
+          </a:p>
+          <a:p>
+            <a:pPr lvl="2"/>
+            <a:r>
+              <a:rPr lang="en-US" dirty="0" smtClean="0"/>
+              <a:t>SKA white papers</a:t>
+            </a:r>
+          </a:p>
+          <a:p>
+            <a:pPr lvl="2"/>
+            <a:r>
+              <a:rPr lang="en-US" dirty="0" smtClean="0"/>
+              <a:t>More…</a:t>
+            </a:r>
             <a:endParaRPr lang="en-US" dirty="0"/>
           </a:p>
         </p:txBody>
       </p:sp>
       <p:sp>
         <p:nvSpPr>
-          <p:cNvPr id="5" name="Footer Placeholder 4"/>
+          <p:cNvPr id="4" name="Footer Placeholder 3"/>
           <p:cNvSpPr>
             <a:spLocks noGrp="1"/>
           </p:cNvSpPr>
@@ -6734,10 +6859,42 @@
               <a:defRPr/>
             </a:pPr>
             <a:r>
-              <a:rPr lang="en-US" b="0" smtClean="0"/>
+              <a:rPr lang="en-US" b="0" smtClean="0">
+                <a:solidFill>
+                  <a:srgbClr val="FFFFFF"/>
+                </a:solidFill>
+              </a:rPr>
               <a:t>IPTA conference 2012</a:t>
             </a:r>
-            <a:endParaRPr lang="en-US" b="0" dirty="0" smtClean="0"/>
+            <a:endParaRPr lang="en-US" b="0" dirty="0" smtClean="0">
+              <a:solidFill>
+                <a:srgbClr val="FFFFFF"/>
+              </a:solidFill>
+            </a:endParaRPr>
+          </a:p>
+        </p:txBody>
+      </p:sp>
+      <p:sp>
+        <p:nvSpPr>
+          <p:cNvPr id="5" name="Date Placeholder 4"/>
+          <p:cNvSpPr>
+            <a:spLocks noGrp="1"/>
+          </p:cNvSpPr>
+          <p:nvPr>
+            <p:ph type="dt" sz="half" idx="10"/>
+          </p:nvPr>
+        </p:nvSpPr>
+        <p:spPr/>
+        <p:txBody>
+          <a:bodyPr/>
+          <a:lstStyle/>
+          <a:p>
+            <a:fld id="{C277097C-597A-624B-BDBE-DF8E29A7A1E0}" type="datetime1">
+              <a:rPr lang="de-DE" smtClean="0"/>
+              <a:pPr/>
+              <a:t>7/10/12</a:t>
+            </a:fld>
+            <a:endParaRPr lang="en-US" dirty="0"/>
           </a:p>
         </p:txBody>
       </p:sp>
@@ -6768,7 +6925,7 @@
     </p:spTree>
     <p:extLst>
       <p:ext uri="{BB962C8B-B14F-4D97-AF65-F5344CB8AC3E}">
-        <p14:creationId xmlns:p14="http://schemas.microsoft.com/office/powerpoint/2010/main" val="1676079957"/>
+        <p14:creationId xmlns:p14="http://schemas.microsoft.com/office/powerpoint/2010/main" xmlns:p="http://schemas.openxmlformats.org/presentationml/2006/main" xmlns:r="http://schemas.openxmlformats.org/officeDocument/2006/relationships" xmlns:a="http://schemas.openxmlformats.org/drawingml/2006/main" xmlns="" val="1835844764"/>
       </p:ext>
     </p:extLst>
   </p:cSld>
@@ -6779,7 +6936,7 @@
 </file>
 
 <file path=ppt/slides/slide16.xml><?xml version="1.0" encoding="utf-8"?>
-<p:sld xmlns:a="http://schemas.openxmlformats.org/drawingml/2006/main" xmlns:r="http://schemas.openxmlformats.org/officeDocument/2006/relationships" xmlns:p="http://schemas.openxmlformats.org/presentationml/2006/main">
+<p:sld xmlns:a="http://schemas.openxmlformats.org/drawingml/2006/main" xmlns:r="http://schemas.openxmlformats.org/officeDocument/2006/relationships" xmlns:mc="http://schemas.openxmlformats.org/markup-compatibility/2006" xmlns:mv="urn:schemas-microsoft-com:mac:vml" xmlns:p="http://schemas.openxmlformats.org/presentationml/2006/main" mc:Ignorable="mv" mc:PreserveAttributes="mv:*">
   <p:cSld>
     <p:spTree>
       <p:nvGrpSpPr>
@@ -6812,7 +6969,7 @@
           <a:p>
             <a:r>
               <a:rPr lang="en-US" dirty="0" smtClean="0"/>
-              <a:t>Global funding</a:t>
+              <a:t>IPTA and the SKA</a:t>
             </a:r>
             <a:endParaRPr lang="en-US" dirty="0"/>
           </a:p>
@@ -6830,60 +6987,60 @@
         </p:nvSpPr>
         <p:spPr/>
         <p:txBody>
-          <a:bodyPr/>
-          <a:lstStyle/>
-          <a:p>
+          <a:bodyPr>
+            <a:normAutofit fontScale="92500"/>
+          </a:bodyPr>
+          <a:lstStyle/>
+          <a:p>
+            <a:r>
+              <a:rPr lang="en-US" dirty="0"/>
+              <a:t>RNM: Even 20% SKA will be a big </a:t>
+            </a:r>
             <a:r>
               <a:rPr lang="en-US" dirty="0" smtClean="0"/>
-              <a:t>E.g. PIRE grant for </a:t>
+              <a:t>improvement</a:t>
+            </a:r>
+          </a:p>
+          <a:p>
+            <a:r>
+              <a:rPr lang="en-US" dirty="0" smtClean="0"/>
+              <a:t>Scott: “SKA phase 1 is not a panacea for </a:t>
             </a:r>
             <a:r>
               <a:rPr lang="en-US" dirty="0" err="1" smtClean="0"/>
-              <a:t>NanoGRAV</a:t>
-            </a:r>
-            <a:endParaRPr lang="en-US" dirty="0" smtClean="0"/>
-          </a:p>
-          <a:p>
+              <a:t>puslars</a:t>
+            </a:r>
             <a:r>
               <a:rPr lang="en-US" dirty="0" smtClean="0"/>
-              <a:t>Resources:</a:t>
-            </a:r>
-          </a:p>
-          <a:p>
-            <a:pPr lvl="1"/>
+              <a:t>”</a:t>
+            </a:r>
+            <a:endParaRPr lang="en-US" dirty="0"/>
+          </a:p>
+          <a:p>
             <a:r>
               <a:rPr lang="en-US" dirty="0" smtClean="0"/>
-              <a:t>IPTA white paper</a:t>
-            </a:r>
-          </a:p>
-          <a:p>
-            <a:pPr lvl="1"/>
+              <a:t>PSR GW is a major science driver</a:t>
+            </a:r>
+          </a:p>
+          <a:p>
             <a:r>
               <a:rPr lang="en-US" dirty="0" smtClean="0"/>
-              <a:t>Sources:</a:t>
-            </a:r>
-          </a:p>
-          <a:p>
-            <a:pPr lvl="2"/>
-            <a:r>
-              <a:rPr lang="en-US" dirty="0" err="1" smtClean="0"/>
-              <a:t>NanoGrav</a:t>
-            </a:r>
-            <a:endParaRPr lang="en-US" dirty="0" smtClean="0"/>
-          </a:p>
-          <a:p>
-            <a:pPr lvl="2"/>
+              <a:t>“If we are going to drive the SKA [for PSR GW] we’d better be sure that we can do it” Jim</a:t>
+            </a:r>
+          </a:p>
+          <a:p>
             <a:r>
               <a:rPr lang="en-US" dirty="0" smtClean="0"/>
-              <a:t>SKA white papers</a:t>
-            </a:r>
-          </a:p>
-          <a:p>
-            <a:pPr lvl="2"/>
-            <a:r>
-              <a:rPr lang="en-US" dirty="0" smtClean="0"/>
-              <a:t>More…</a:t>
-            </a:r>
+              <a:t>“If we were to design a PSR GW telescope, it wouldn’t be the SKA” Simon</a:t>
+            </a:r>
+          </a:p>
+          <a:p>
+            <a:r>
+              <a:rPr lang="en-US" dirty="0"/>
+              <a:t>Won’t see all northern sky</a:t>
+            </a:r>
+          </a:p>
+          <a:p>
             <a:endParaRPr lang="en-US" dirty="0"/>
           </a:p>
         </p:txBody>
@@ -6937,9 +7094,10 @@
           <a:bodyPr/>
           <a:lstStyle/>
           <a:p>
-            <a:fld id="{C277097C-597A-624B-BDBE-DF8E29A7A1E0}" type="datetime1">
+            <a:fld id="{0A20862B-E632-EB46-8592-A3491097B2BA}" type="datetime1">
               <a:rPr lang="de-DE" smtClean="0"/>
-              <a:t>26.06.12</a:t>
+              <a:pPr/>
+              <a:t>7/10/12</a:t>
             </a:fld>
             <a:endParaRPr lang="en-US" dirty="0"/>
           </a:p>
@@ -6972,7 +7130,7 @@
     </p:spTree>
     <p:extLst>
       <p:ext uri="{BB962C8B-B14F-4D97-AF65-F5344CB8AC3E}">
-        <p14:creationId xmlns:p14="http://schemas.microsoft.com/office/powerpoint/2010/main" val="1835844764"/>
+        <p14:creationId xmlns:p14="http://schemas.microsoft.com/office/powerpoint/2010/main" xmlns:p="http://schemas.openxmlformats.org/presentationml/2006/main" xmlns:r="http://schemas.openxmlformats.org/officeDocument/2006/relationships" xmlns:a="http://schemas.openxmlformats.org/drawingml/2006/main" xmlns="" val="262846851"/>
       </p:ext>
     </p:extLst>
   </p:cSld>
@@ -6983,7 +7141,7 @@
 </file>
 
 <file path=ppt/slides/slide17.xml><?xml version="1.0" encoding="utf-8"?>
-<p:sld xmlns:a="http://schemas.openxmlformats.org/drawingml/2006/main" xmlns:r="http://schemas.openxmlformats.org/officeDocument/2006/relationships" xmlns:p="http://schemas.openxmlformats.org/presentationml/2006/main">
+<p:sld xmlns:a="http://schemas.openxmlformats.org/drawingml/2006/main" xmlns:r="http://schemas.openxmlformats.org/officeDocument/2006/relationships" xmlns:mc="http://schemas.openxmlformats.org/markup-compatibility/2006" xmlns:mv="urn:schemas-microsoft-com:mac:vml" xmlns:p="http://schemas.openxmlformats.org/presentationml/2006/main" mc:Ignorable="mv" mc:PreserveAttributes="mv:*">
   <p:cSld>
     <p:spTree>
       <p:nvGrpSpPr>
@@ -7009,14 +7167,28 @@
             <p:ph type="title"/>
           </p:nvPr>
         </p:nvSpPr>
-        <p:spPr/>
-        <p:txBody>
-          <a:bodyPr/>
+        <p:spPr>
+          <a:xfrm>
+            <a:off x="457200" y="2658988"/>
+            <a:ext cx="8229600" cy="1143000"/>
+          </a:xfrm>
+        </p:spPr>
+        <p:txBody>
+          <a:bodyPr>
+            <a:normAutofit fontScale="90000"/>
+          </a:bodyPr>
           <a:lstStyle/>
           <a:p>
             <a:r>
               <a:rPr lang="en-US" dirty="0" smtClean="0"/>
-              <a:t>IPTA and the SKA</a:t>
+              <a:t>“The future of the IPTA is bright!”</a:t>
+            </a:r>
+            <a:br>
+              <a:rPr lang="en-US" dirty="0" smtClean="0"/>
+            </a:br>
+            <a:r>
+              <a:rPr lang="en-US" dirty="0" smtClean="0"/>
+              <a:t>IPTA students 2012</a:t>
             </a:r>
             <a:endParaRPr lang="en-US" dirty="0"/>
           </a:p>
@@ -7024,77 +7196,31 @@
       </p:sp>
       <p:sp>
         <p:nvSpPr>
-          <p:cNvPr id="3" name="Content Placeholder 2"/>
-          <p:cNvSpPr>
-            <a:spLocks noGrp="1"/>
-          </p:cNvSpPr>
-          <p:nvPr>
-            <p:ph idx="1"/>
-          </p:nvPr>
-        </p:nvSpPr>
-        <p:spPr/>
-        <p:txBody>
-          <a:bodyPr>
-            <a:normAutofit fontScale="92500"/>
-          </a:bodyPr>
-          <a:lstStyle/>
-          <a:p>
-            <a:r>
-              <a:rPr lang="en-US" dirty="0"/>
-              <a:t>RNM: Even 20% SKA will be a big </a:t>
-            </a:r>
-            <a:r>
-              <a:rPr lang="en-US" dirty="0" smtClean="0"/>
-              <a:t>improvement</a:t>
-            </a:r>
-          </a:p>
-          <a:p>
-            <a:r>
-              <a:rPr lang="en-US" dirty="0" smtClean="0"/>
-              <a:t>Scott: “SKA phase 1 is not a panacea for </a:t>
-            </a:r>
-            <a:r>
-              <a:rPr lang="en-US" dirty="0" err="1" smtClean="0"/>
-              <a:t>puslars</a:t>
-            </a:r>
-            <a:r>
-              <a:rPr lang="en-US" dirty="0" smtClean="0"/>
-              <a:t>”</a:t>
-            </a:r>
+          <p:cNvPr id="4" name="Date Placeholder 3"/>
+          <p:cNvSpPr>
+            <a:spLocks noGrp="1"/>
+          </p:cNvSpPr>
+          <p:nvPr>
+            <p:ph type="dt" sz="half" idx="10"/>
+          </p:nvPr>
+        </p:nvSpPr>
+        <p:spPr/>
+        <p:txBody>
+          <a:bodyPr/>
+          <a:lstStyle/>
+          <a:p>
+            <a:fld id="{C1E2467A-468C-BB4F-8513-F5A32D4F9690}" type="datetime1">
+              <a:rPr lang="de-DE" smtClean="0"/>
+              <a:pPr/>
+              <a:t>7/10/12</a:t>
+            </a:fld>
             <a:endParaRPr lang="en-US" dirty="0"/>
           </a:p>
-          <a:p>
-            <a:r>
-              <a:rPr lang="en-US" dirty="0" smtClean="0"/>
-              <a:t>PSR GW is a major science driver</a:t>
-            </a:r>
-          </a:p>
-          <a:p>
-            <a:r>
-              <a:rPr lang="en-US" dirty="0" smtClean="0"/>
-              <a:t>“If we are going to drive the SKA [for PSR GW] we’d better be sure that we can do it” Jim</a:t>
-            </a:r>
-          </a:p>
-          <a:p>
-            <a:r>
-              <a:rPr lang="en-US" dirty="0" smtClean="0"/>
-              <a:t>“If we were to design a PSR GW telescope, it wouldn’t be the SKA” Simon</a:t>
-            </a:r>
-          </a:p>
-          <a:p>
-            <a:r>
-              <a:rPr lang="en-US" dirty="0"/>
-              <a:t>Won’t see all northern sky</a:t>
-            </a:r>
-          </a:p>
-          <a:p>
-            <a:endParaRPr lang="en-US" dirty="0"/>
-          </a:p>
-        </p:txBody>
-      </p:sp>
-      <p:sp>
-        <p:nvSpPr>
-          <p:cNvPr id="4" name="Footer Placeholder 3"/>
+        </p:txBody>
+      </p:sp>
+      <p:sp>
+        <p:nvSpPr>
+          <p:cNvPr id="5" name="Footer Placeholder 4"/>
           <p:cNvSpPr>
             <a:spLocks noGrp="1"/>
           </p:cNvSpPr>
@@ -7113,39 +7239,16 @@
             <a:r>
               <a:rPr lang="en-US" b="0" smtClean="0">
                 <a:solidFill>
-                  <a:srgbClr val="FFFFFF"/>
+                  <a:schemeClr val="tx1"/>
                 </a:solidFill>
               </a:rPr>
               <a:t>IPTA conference 2012</a:t>
             </a:r>
             <a:endParaRPr lang="en-US" b="0" dirty="0" smtClean="0">
               <a:solidFill>
-                <a:srgbClr val="FFFFFF"/>
+                <a:schemeClr val="tx1"/>
               </a:solidFill>
             </a:endParaRPr>
-          </a:p>
-        </p:txBody>
-      </p:sp>
-      <p:sp>
-        <p:nvSpPr>
-          <p:cNvPr id="5" name="Date Placeholder 4"/>
-          <p:cNvSpPr>
-            <a:spLocks noGrp="1"/>
-          </p:cNvSpPr>
-          <p:nvPr>
-            <p:ph type="dt" sz="half" idx="10"/>
-          </p:nvPr>
-        </p:nvSpPr>
-        <p:spPr/>
-        <p:txBody>
-          <a:bodyPr/>
-          <a:lstStyle/>
-          <a:p>
-            <a:fld id="{0A20862B-E632-EB46-8592-A3491097B2BA}" type="datetime1">
-              <a:rPr lang="de-DE" smtClean="0"/>
-              <a:t>29.06.12</a:t>
-            </a:fld>
-            <a:endParaRPr lang="en-US" dirty="0"/>
           </a:p>
         </p:txBody>
       </p:sp>
@@ -7176,7 +7279,7 @@
     </p:spTree>
     <p:extLst>
       <p:ext uri="{BB962C8B-B14F-4D97-AF65-F5344CB8AC3E}">
-        <p14:creationId xmlns:p14="http://schemas.microsoft.com/office/powerpoint/2010/main" val="262846851"/>
+        <p14:creationId xmlns:p14="http://schemas.microsoft.com/office/powerpoint/2010/main" xmlns:p="http://schemas.openxmlformats.org/presentationml/2006/main" xmlns:r="http://schemas.openxmlformats.org/officeDocument/2006/relationships" xmlns:a="http://schemas.openxmlformats.org/drawingml/2006/main" xmlns="" val="1362496290"/>
       </p:ext>
     </p:extLst>
   </p:cSld>
@@ -7187,7 +7290,7 @@
 </file>
 
 <file path=ppt/slides/slide18.xml><?xml version="1.0" encoding="utf-8"?>
-<p:sld xmlns:a="http://schemas.openxmlformats.org/drawingml/2006/main" xmlns:r="http://schemas.openxmlformats.org/officeDocument/2006/relationships" xmlns:p="http://schemas.openxmlformats.org/presentationml/2006/main">
+<p:sld xmlns:a="http://schemas.openxmlformats.org/drawingml/2006/main" xmlns:r="http://schemas.openxmlformats.org/officeDocument/2006/relationships" xmlns:mc="http://schemas.openxmlformats.org/markup-compatibility/2006" xmlns:mv="urn:schemas-microsoft-com:mac:vml" xmlns:p="http://schemas.openxmlformats.org/presentationml/2006/main" mc:Ignorable="mv" mc:PreserveAttributes="mv:*">
   <p:cSld>
     <p:spTree>
       <p:nvGrpSpPr>
@@ -7213,30 +7316,120 @@
             <p:ph type="title"/>
           </p:nvPr>
         </p:nvSpPr>
-        <p:spPr>
-          <a:xfrm>
-            <a:off x="457200" y="2658988"/>
-            <a:ext cx="8229600" cy="1143000"/>
-          </a:xfrm>
-        </p:spPr>
+        <p:spPr/>
+        <p:txBody>
+          <a:bodyPr/>
+          <a:lstStyle/>
+          <a:p>
+            <a:r>
+              <a:rPr lang="en-US" dirty="0" smtClean="0"/>
+              <a:t>Discussion Topics</a:t>
+            </a:r>
+            <a:endParaRPr lang="en-US" dirty="0"/>
+          </a:p>
+        </p:txBody>
+      </p:sp>
+      <p:sp>
+        <p:nvSpPr>
+          <p:cNvPr id="3" name="Content Placeholder 2"/>
+          <p:cNvSpPr>
+            <a:spLocks noGrp="1"/>
+          </p:cNvSpPr>
+          <p:nvPr>
+            <p:ph idx="1"/>
+          </p:nvPr>
+        </p:nvSpPr>
+        <p:spPr/>
         <p:txBody>
           <a:bodyPr>
-            <a:normAutofit fontScale="90000"/>
+            <a:normAutofit/>
           </a:bodyPr>
           <a:lstStyle/>
           <a:p>
             <a:r>
-              <a:rPr lang="en-US" dirty="0" smtClean="0"/>
-              <a:t>“The future of the IPTA is bright!”</a:t>
-            </a:r>
-            <a:br>
-              <a:rPr lang="en-US" dirty="0" smtClean="0"/>
-            </a:br>
-            <a:r>
-              <a:rPr lang="en-US" dirty="0" smtClean="0"/>
-              <a:t>IPTA students 2012</a:t>
-            </a:r>
-            <a:endParaRPr lang="en-US" dirty="0"/>
+              <a:rPr lang="en-US" sz="1800" b="1" dirty="0"/>
+              <a:t>What other opportunities exist within the IPTA related areas that we can use for outreach, do we need to make it part of the IPTA structure to have an outreach group</a:t>
+            </a:r>
+            <a:r>
+              <a:rPr lang="en-US" sz="1800" b="1" dirty="0" smtClean="0"/>
+              <a:t>?</a:t>
+            </a:r>
+          </a:p>
+          <a:p>
+            <a:r>
+              <a:rPr lang="en-US" sz="1800" dirty="0" smtClean="0"/>
+              <a:t>New telescopes: FAST, LEAP, </a:t>
+            </a:r>
+            <a:r>
+              <a:rPr lang="en-US" sz="1800" dirty="0" err="1" smtClean="0"/>
+              <a:t>MeerKAT</a:t>
+            </a:r>
+            <a:r>
+              <a:rPr lang="en-US" sz="1800" dirty="0" smtClean="0"/>
+              <a:t>, ASKAP</a:t>
+            </a:r>
+          </a:p>
+          <a:p>
+            <a:r>
+              <a:rPr lang="en-US" sz="1800" dirty="0" smtClean="0"/>
+              <a:t>Are the frequency ranges enough? Sub-arrays?</a:t>
+            </a:r>
+          </a:p>
+          <a:p>
+            <a:r>
+              <a:rPr lang="en-US" sz="1800" dirty="0" smtClean="0"/>
+              <a:t>RNM: If LEAP gets really good TOAs at 21cm then the other telescope can concentrate on the other bands</a:t>
+            </a:r>
+          </a:p>
+          <a:p>
+            <a:r>
+              <a:rPr lang="en-US" sz="1800" dirty="0" smtClean="0"/>
+              <a:t>Is </a:t>
+            </a:r>
+            <a:r>
+              <a:rPr lang="en-US" sz="1800" dirty="0" err="1" smtClean="0"/>
+              <a:t>Joris</a:t>
+            </a:r>
+            <a:r>
+              <a:rPr lang="en-US" sz="1800" dirty="0" smtClean="0"/>
+              <a:t> completely stupid? Can we use LOFAR to correct DM?</a:t>
+            </a:r>
+          </a:p>
+          <a:p>
+            <a:r>
+              <a:rPr lang="en-US" sz="1800" dirty="0" smtClean="0"/>
+              <a:t>Variability of scattering could help LOFAR</a:t>
+            </a:r>
+          </a:p>
+          <a:p>
+            <a:r>
+              <a:rPr lang="en-US" sz="1800" dirty="0" smtClean="0"/>
+              <a:t>Checking the SKA hardware / software</a:t>
+            </a:r>
+          </a:p>
+          <a:p>
+            <a:r>
+              <a:rPr lang="en-US" sz="1800" dirty="0" smtClean="0"/>
+              <a:t>Is the SKA the solution?</a:t>
+            </a:r>
+          </a:p>
+          <a:p>
+            <a:r>
+              <a:rPr lang="en-US" sz="1800" dirty="0" smtClean="0"/>
+              <a:t>Jitter issues – can we correct for it? Is it a problem?</a:t>
+            </a:r>
+          </a:p>
+          <a:p>
+            <a:r>
+              <a:rPr lang="en-US" sz="1800" dirty="0" smtClean="0"/>
+              <a:t>GMRT at low frequencies</a:t>
+            </a:r>
+          </a:p>
+          <a:p>
+            <a:r>
+              <a:rPr lang="en-US" sz="1800" dirty="0" smtClean="0"/>
+              <a:t>SKA: Big science model</a:t>
+            </a:r>
           </a:p>
         </p:txBody>
       </p:sp>
@@ -7257,7 +7450,8 @@
           <a:p>
             <a:fld id="{C1E2467A-468C-BB4F-8513-F5A32D4F9690}" type="datetime1">
               <a:rPr lang="de-DE" smtClean="0"/>
-              <a:t>29.06.12</a:t>
+              <a:pPr/>
+              <a:t>7/10/12</a:t>
             </a:fld>
             <a:endParaRPr lang="en-US" dirty="0"/>
           </a:p>
@@ -7324,7 +7518,7 @@
     </p:spTree>
     <p:extLst>
       <p:ext uri="{BB962C8B-B14F-4D97-AF65-F5344CB8AC3E}">
-        <p14:creationId xmlns:p14="http://schemas.microsoft.com/office/powerpoint/2010/main" val="1362496290"/>
+        <p14:creationId xmlns:p14="http://schemas.microsoft.com/office/powerpoint/2010/main" xmlns:p="http://schemas.openxmlformats.org/presentationml/2006/main" xmlns:r="http://schemas.openxmlformats.org/officeDocument/2006/relationships" xmlns:a="http://schemas.openxmlformats.org/drawingml/2006/main" xmlns="" val="3643303798"/>
       </p:ext>
     </p:extLst>
   </p:cSld>
@@ -7334,8 +7528,8 @@
 </p:sld>
 </file>
 
-<file path=ppt/slides/slide19.xml><?xml version="1.0" encoding="utf-8"?>
-<p:sld xmlns:a="http://schemas.openxmlformats.org/drawingml/2006/main" xmlns:r="http://schemas.openxmlformats.org/officeDocument/2006/relationships" xmlns:p="http://schemas.openxmlformats.org/presentationml/2006/main">
+<file path=ppt/slides/slide2.xml><?xml version="1.0" encoding="utf-8"?>
+<p:sld xmlns:a="http://schemas.openxmlformats.org/drawingml/2006/main" xmlns:r="http://schemas.openxmlformats.org/officeDocument/2006/relationships" xmlns:mc="http://schemas.openxmlformats.org/markup-compatibility/2006" xmlns:mv="urn:schemas-microsoft-com:mac:vml" xmlns:p="http://schemas.openxmlformats.org/presentationml/2006/main" mc:Ignorable="mv" mc:PreserveAttributes="mv:*">
   <p:cSld>
     <p:spTree>
       <p:nvGrpSpPr>
@@ -7353,227 +7547,169 @@
       </p:grpSpPr>
       <p:sp>
         <p:nvSpPr>
-          <p:cNvPr id="2" name="Title 1"/>
-          <p:cNvSpPr>
-            <a:spLocks noGrp="1"/>
-          </p:cNvSpPr>
-          <p:nvPr>
-            <p:ph type="title"/>
-          </p:nvPr>
-        </p:nvSpPr>
-        <p:spPr/>
-        <p:txBody>
-          <a:bodyPr/>
-          <a:lstStyle/>
-          <a:p>
+          <p:cNvPr id="14338" name="Rectangle 2"/>
+          <p:cNvSpPr>
+            <a:spLocks noGrp="1" noChangeArrowheads="1"/>
+          </p:cNvSpPr>
+          <p:nvPr>
+            <p:ph type="ctrTitle"/>
+          </p:nvPr>
+        </p:nvSpPr>
+        <p:spPr>
+          <a:xfrm>
+            <a:off x="685800" y="1126276"/>
+            <a:ext cx="7772400" cy="2474175"/>
+          </a:xfrm>
+        </p:spPr>
+        <p:txBody>
+          <a:bodyPr>
+            <a:normAutofit fontScale="90000"/>
+          </a:bodyPr>
+          <a:lstStyle/>
+          <a:p>
+            <a:pPr eaLnBrk="1" hangingPunct="1"/>
             <a:r>
               <a:rPr lang="en-US" dirty="0" smtClean="0"/>
-              <a:t>Discussion Topics</a:t>
-            </a:r>
-            <a:endParaRPr lang="en-US" dirty="0"/>
-          </a:p>
-        </p:txBody>
-      </p:sp>
-      <p:sp>
-        <p:nvSpPr>
-          <p:cNvPr id="3" name="Content Placeholder 2"/>
-          <p:cNvSpPr>
-            <a:spLocks noGrp="1"/>
-          </p:cNvSpPr>
-          <p:nvPr>
-            <p:ph idx="1"/>
+              <a:t>Getting more IPTA for your Buck</a:t>
+            </a:r>
+            <a:br>
+              <a:rPr lang="en-US" dirty="0" smtClean="0"/>
+            </a:br>
+            <a:r>
+              <a:rPr lang="en-US" sz="3600" i="1" dirty="0" smtClean="0"/>
+              <a:t>or</a:t>
+            </a:r>
+            <a:r>
+              <a:rPr lang="en-US" dirty="0" smtClean="0"/>
+              <a:t/>
+            </a:r>
+            <a:br>
+              <a:rPr lang="en-US" dirty="0" smtClean="0"/>
+            </a:br>
+            <a:r>
+              <a:rPr lang="en-US" dirty="0" smtClean="0"/>
+              <a:t>How I learned to stop worrying and love the IPTA</a:t>
+            </a:r>
+            <a:endParaRPr lang="en-US" sz="2400" dirty="0" smtClean="0"/>
+          </a:p>
+        </p:txBody>
+      </p:sp>
+      <p:sp>
+        <p:nvSpPr>
+          <p:cNvPr id="14339" name="Rectangle 3"/>
+          <p:cNvSpPr>
+            <a:spLocks noGrp="1" noChangeArrowheads="1"/>
+          </p:cNvSpPr>
+          <p:nvPr>
+            <p:ph type="subTitle" idx="1"/>
           </p:nvPr>
         </p:nvSpPr>
         <p:spPr/>
         <p:txBody>
           <a:bodyPr>
-            <a:normAutofit/>
+            <a:normAutofit fontScale="85000" lnSpcReduction="20000"/>
           </a:bodyPr>
           <a:lstStyle/>
           <a:p>
-            <a:r>
-              <a:rPr lang="en-US" sz="1800" b="1" dirty="0"/>
-              <a:t>What other opportunities exist within the IPTA related areas that we can use for outreach, do we need to make it part of the IPTA structure to have an outreach group</a:t>
-            </a:r>
-            <a:r>
-              <a:rPr lang="en-US" sz="1800" b="1" dirty="0" smtClean="0"/>
-              <a:t>?</a:t>
-            </a:r>
-          </a:p>
-          <a:p>
-            <a:r>
-              <a:rPr lang="en-US" sz="1800" dirty="0" smtClean="0"/>
-              <a:t>New telescopes: FAST, LEAP, </a:t>
-            </a:r>
-            <a:r>
-              <a:rPr lang="en-US" sz="1800" dirty="0" err="1" smtClean="0"/>
-              <a:t>MeerKAT</a:t>
-            </a:r>
-            <a:r>
-              <a:rPr lang="en-US" sz="1800" dirty="0" smtClean="0"/>
-              <a:t>, ASKAP</a:t>
-            </a:r>
-          </a:p>
-          <a:p>
-            <a:r>
-              <a:rPr lang="en-US" sz="1800" dirty="0" smtClean="0"/>
-              <a:t>Are the frequency ranges enough? Sub-arrays?</a:t>
-            </a:r>
-          </a:p>
-          <a:p>
-            <a:r>
-              <a:rPr lang="en-US" sz="1800" dirty="0" smtClean="0"/>
-              <a:t>RNM: If LEAP gets really good TOAs at 21cm then the other telescope can concentrate on the other bands</a:t>
-            </a:r>
-          </a:p>
-          <a:p>
-            <a:r>
-              <a:rPr lang="en-US" sz="1800" dirty="0" smtClean="0"/>
-              <a:t>Is </a:t>
-            </a:r>
-            <a:r>
-              <a:rPr lang="en-US" sz="1800" dirty="0" err="1" smtClean="0"/>
-              <a:t>Joris</a:t>
-            </a:r>
-            <a:r>
-              <a:rPr lang="en-US" sz="1800" dirty="0" smtClean="0"/>
-              <a:t> completely stupid? Can we use LOFAR to correct DM?</a:t>
-            </a:r>
-          </a:p>
-          <a:p>
-            <a:r>
-              <a:rPr lang="en-US" sz="1800" dirty="0" smtClean="0"/>
-              <a:t>Variability of scattering could help LOFAR</a:t>
-            </a:r>
-          </a:p>
-          <a:p>
-            <a:r>
-              <a:rPr lang="en-US" sz="1800" dirty="0" smtClean="0"/>
-              <a:t>Checking the SKA hardware / software</a:t>
-            </a:r>
-          </a:p>
-          <a:p>
-            <a:r>
-              <a:rPr lang="en-US" sz="1800" dirty="0" smtClean="0"/>
-              <a:t>Is the SKA the solution?</a:t>
-            </a:r>
-          </a:p>
-          <a:p>
-            <a:r>
-              <a:rPr lang="en-US" sz="1800" dirty="0" smtClean="0"/>
-              <a:t>Jitter issues – can we correct for it? Is it a problem?</a:t>
-            </a:r>
-          </a:p>
-          <a:p>
-            <a:r>
-              <a:rPr lang="en-US" sz="1800" dirty="0" smtClean="0"/>
-              <a:t>GMRT at low frequencies</a:t>
-            </a:r>
-          </a:p>
-          <a:p>
-            <a:r>
-              <a:rPr lang="en-US" sz="1800" dirty="0" smtClean="0"/>
-              <a:t>SKA: Big science model</a:t>
-            </a:r>
-          </a:p>
-        </p:txBody>
-      </p:sp>
-      <p:sp>
-        <p:nvSpPr>
-          <p:cNvPr id="4" name="Date Placeholder 3"/>
-          <p:cNvSpPr>
-            <a:spLocks noGrp="1"/>
-          </p:cNvSpPr>
-          <p:nvPr>
-            <p:ph type="dt" sz="half" idx="10"/>
-          </p:nvPr>
-        </p:nvSpPr>
-        <p:spPr/>
-        <p:txBody>
-          <a:bodyPr/>
-          <a:lstStyle/>
-          <a:p>
-            <a:fld id="{C1E2467A-468C-BB4F-8513-F5A32D4F9690}" type="datetime1">
-              <a:rPr lang="de-DE" smtClean="0"/>
-              <a:t>29.06.12</a:t>
-            </a:fld>
-            <a:endParaRPr lang="en-US" dirty="0"/>
-          </a:p>
-        </p:txBody>
-      </p:sp>
-      <p:sp>
-        <p:nvSpPr>
-          <p:cNvPr id="5" name="Footer Placeholder 4"/>
-          <p:cNvSpPr>
-            <a:spLocks noGrp="1"/>
-          </p:cNvSpPr>
-          <p:nvPr>
-            <p:ph type="ftr" sz="quarter" idx="11"/>
-          </p:nvPr>
-        </p:nvSpPr>
-        <p:spPr/>
-        <p:txBody>
-          <a:bodyPr/>
-          <a:lstStyle/>
-          <a:p>
-            <a:pPr>
-              <a:defRPr/>
-            </a:pPr>
-            <a:r>
-              <a:rPr lang="en-US" b="0" smtClean="0">
+            <a:pPr eaLnBrk="1" hangingPunct="1"/>
+            <a:r>
+              <a:rPr lang="en-US" dirty="0" smtClean="0">
                 <a:solidFill>
-                  <a:schemeClr val="tx1"/>
+                  <a:srgbClr val="FFFFFF"/>
                 </a:solidFill>
               </a:rPr>
-              <a:t>IPTA conference 2012</a:t>
-            </a:r>
-            <a:endParaRPr lang="en-US" b="0" dirty="0" smtClean="0">
+              <a:t>David Champion</a:t>
+            </a:r>
+          </a:p>
+          <a:p>
+            <a:pPr eaLnBrk="1" hangingPunct="1"/>
+            <a:r>
+              <a:rPr lang="de-DE" dirty="0" smtClean="0">
+                <a:solidFill>
+                  <a:srgbClr val="FFFFFF"/>
+                </a:solidFill>
+              </a:rPr>
+              <a:t>Max-Planck-Institut für Radioastronomie</a:t>
+            </a:r>
+          </a:p>
+          <a:p>
+            <a:pPr eaLnBrk="1" hangingPunct="1"/>
+            <a:r>
+              <a:rPr lang="en-US" dirty="0" smtClean="0">
+                <a:solidFill>
+                  <a:srgbClr val="FFFFFF"/>
+                </a:solidFill>
+              </a:rPr>
+              <a:t>IPTA Conference, </a:t>
+            </a:r>
+            <a:r>
+              <a:rPr lang="en-US" dirty="0" err="1" smtClean="0">
+                <a:solidFill>
+                  <a:srgbClr val="FFFFFF"/>
+                </a:solidFill>
+              </a:rPr>
+              <a:t>Kiama</a:t>
+            </a:r>
+            <a:endParaRPr lang="en-US" dirty="0" smtClean="0">
               <a:solidFill>
-                <a:schemeClr val="tx1"/>
+                <a:srgbClr val="FFFFFF"/>
               </a:solidFill>
             </a:endParaRPr>
           </a:p>
-        </p:txBody>
-      </p:sp>
-      <p:sp>
-        <p:nvSpPr>
-          <p:cNvPr id="6" name="Slide Number Placeholder 5"/>
-          <p:cNvSpPr>
-            <a:spLocks noGrp="1"/>
-          </p:cNvSpPr>
-          <p:nvPr>
-            <p:ph type="sldNum" sz="quarter" idx="12"/>
-          </p:nvPr>
-        </p:nvSpPr>
-        <p:spPr/>
-        <p:txBody>
-          <a:bodyPr/>
-          <a:lstStyle/>
-          <a:p>
-            <a:fld id="{785805AC-A8A2-8640-B3CF-422F6C12D499}" type="slidenum">
-              <a:rPr lang="en-US" smtClean="0"/>
-              <a:pPr/>
-              <a:t>19</a:t>
-            </a:fld>
-            <a:endParaRPr lang="en-US" dirty="0"/>
+          <a:p>
+            <a:pPr eaLnBrk="1" hangingPunct="1"/>
+            <a:r>
+              <a:rPr lang="en-US" dirty="0" smtClean="0">
+                <a:solidFill>
+                  <a:srgbClr val="FFFFFF"/>
+                </a:solidFill>
+              </a:rPr>
+              <a:t>29</a:t>
+            </a:r>
+            <a:r>
+              <a:rPr lang="en-US" baseline="30000" dirty="0" smtClean="0">
+                <a:solidFill>
+                  <a:srgbClr val="FFFFFF"/>
+                </a:solidFill>
+              </a:rPr>
+              <a:t>th</a:t>
+            </a:r>
+            <a:r>
+              <a:rPr lang="en-US" dirty="0" smtClean="0">
+                <a:solidFill>
+                  <a:srgbClr val="FFFFFF"/>
+                </a:solidFill>
+              </a:rPr>
+              <a:t> June2012</a:t>
+            </a:r>
           </a:p>
         </p:txBody>
       </p:sp>
     </p:spTree>
     <p:extLst>
       <p:ext uri="{BB962C8B-B14F-4D97-AF65-F5344CB8AC3E}">
-        <p14:creationId xmlns:p14="http://schemas.microsoft.com/office/powerpoint/2010/main" val="3643303798"/>
+        <p14:creationId xmlns:p14="http://schemas.microsoft.com/office/powerpoint/2010/main" xmlns:p="http://schemas.openxmlformats.org/presentationml/2006/main" xmlns:r="http://schemas.openxmlformats.org/officeDocument/2006/relationships" xmlns:a="http://schemas.openxmlformats.org/drawingml/2006/main" xmlns="" val="3661402700"/>
       </p:ext>
     </p:extLst>
   </p:cSld>
   <p:clrMapOvr>
     <a:masterClrMapping/>
   </p:clrMapOvr>
+  <p:transition>
+    <p:fade/>
+  </p:transition>
+  <p:timing>
+    <p:tnLst>
+      <p:par>
+        <p:cTn id="1" dur="indefinite" restart="never" nodeType="tmRoot"/>
+      </p:par>
+    </p:tnLst>
+  </p:timing>
 </p:sld>
 </file>
 
-<file path=ppt/slides/slide2.xml><?xml version="1.0" encoding="utf-8"?>
-<p:sld xmlns:a="http://schemas.openxmlformats.org/drawingml/2006/main" xmlns:r="http://schemas.openxmlformats.org/officeDocument/2006/relationships" xmlns:p="http://schemas.openxmlformats.org/presentationml/2006/main">
+<file path=ppt/slides/slide3.xml><?xml version="1.0" encoding="utf-8"?>
+<p:sld xmlns:a="http://schemas.openxmlformats.org/drawingml/2006/main" xmlns:r="http://schemas.openxmlformats.org/officeDocument/2006/relationships" xmlns:mc="http://schemas.openxmlformats.org/markup-compatibility/2006" xmlns:mv="urn:schemas-microsoft-com:mac:vml" xmlns:p="http://schemas.openxmlformats.org/presentationml/2006/main" mc:Ignorable="mv" mc:PreserveAttributes="mv:*">
   <p:cSld>
     <p:spTree>
       <p:nvGrpSpPr>
@@ -7591,18 +7727,18 @@
       </p:grpSpPr>
       <p:sp>
         <p:nvSpPr>
-          <p:cNvPr id="14338" name="Rectangle 2"/>
-          <p:cNvSpPr>
-            <a:spLocks noGrp="1" noChangeArrowheads="1"/>
-          </p:cNvSpPr>
-          <p:nvPr>
-            <p:ph type="ctrTitle"/>
+          <p:cNvPr id="2" name="Title 1"/>
+          <p:cNvSpPr>
+            <a:spLocks noGrp="1"/>
+          </p:cNvSpPr>
+          <p:nvPr>
+            <p:ph type="title"/>
           </p:nvPr>
         </p:nvSpPr>
         <p:spPr>
           <a:xfrm>
-            <a:off x="685800" y="1126276"/>
-            <a:ext cx="7772400" cy="2474175"/>
+            <a:off x="481161" y="2215672"/>
+            <a:ext cx="8229600" cy="2576990"/>
           </a:xfrm>
         </p:spPr>
         <p:txBody>
@@ -7611,157 +7747,118 @@
           </a:bodyPr>
           <a:lstStyle/>
           <a:p>
-            <a:pPr eaLnBrk="1" hangingPunct="1"/>
             <a:r>
               <a:rPr lang="en-US" dirty="0" smtClean="0"/>
-              <a:t>Getting more IPTA for your Buck</a:t>
+              <a:t>“If we don’t make the first pulsar GW detection with IPTA data then we’re doing something wrong”</a:t>
             </a:r>
             <a:br>
               <a:rPr lang="en-US" dirty="0" smtClean="0"/>
             </a:br>
             <a:r>
               <a:rPr lang="en-US" dirty="0" smtClean="0"/>
-              <a:t/>
-            </a:r>
-            <a:br>
-              <a:rPr lang="en-US" dirty="0" smtClean="0"/>
-            </a:br>
-            <a:r>
-              <a:rPr lang="en-US" dirty="0"/>
-              <a:t/>
-            </a:r>
-            <a:br>
-              <a:rPr lang="en-US" dirty="0"/>
-            </a:br>
-            <a:r>
-              <a:rPr lang="en-US" dirty="0" smtClean="0"/>
-              <a:t> </a:t>
-            </a:r>
-            <a:endParaRPr lang="en-US" sz="2400" dirty="0" smtClean="0"/>
-          </a:p>
-        </p:txBody>
-      </p:sp>
-      <p:sp>
-        <p:nvSpPr>
-          <p:cNvPr id="14339" name="Rectangle 3"/>
-          <p:cNvSpPr>
-            <a:spLocks noGrp="1" noChangeArrowheads="1"/>
-          </p:cNvSpPr>
-          <p:nvPr>
-            <p:ph type="subTitle" idx="1"/>
-          </p:nvPr>
-        </p:nvSpPr>
-        <p:spPr/>
-        <p:txBody>
-          <a:bodyPr>
-            <a:normAutofit fontScale="85000" lnSpcReduction="20000"/>
-          </a:bodyPr>
-          <a:lstStyle/>
-          <a:p>
-            <a:pPr eaLnBrk="1" hangingPunct="1"/>
-            <a:r>
-              <a:rPr lang="en-US" dirty="0" smtClean="0">
+              <a:t>Scott Ransom IPTA 2011</a:t>
+            </a:r>
+            <a:endParaRPr lang="en-US" dirty="0"/>
+          </a:p>
+        </p:txBody>
+      </p:sp>
+      <p:sp>
+        <p:nvSpPr>
+          <p:cNvPr id="3" name="Date Placeholder 2"/>
+          <p:cNvSpPr>
+            <a:spLocks noGrp="1"/>
+          </p:cNvSpPr>
+          <p:nvPr>
+            <p:ph type="dt" sz="half" idx="10"/>
+          </p:nvPr>
+        </p:nvSpPr>
+        <p:spPr/>
+        <p:txBody>
+          <a:bodyPr/>
+          <a:lstStyle/>
+          <a:p>
+            <a:fld id="{DFA92F6D-5103-A642-B220-478B8EEFADAB}" type="datetime1">
+              <a:rPr lang="de-DE" smtClean="0"/>
+              <a:pPr/>
+              <a:t>7/10/12</a:t>
+            </a:fld>
+            <a:endParaRPr lang="en-US" dirty="0"/>
+          </a:p>
+        </p:txBody>
+      </p:sp>
+      <p:sp>
+        <p:nvSpPr>
+          <p:cNvPr id="4" name="Footer Placeholder 3"/>
+          <p:cNvSpPr>
+            <a:spLocks noGrp="1"/>
+          </p:cNvSpPr>
+          <p:nvPr>
+            <p:ph type="ftr" sz="quarter" idx="11"/>
+          </p:nvPr>
+        </p:nvSpPr>
+        <p:spPr/>
+        <p:txBody>
+          <a:bodyPr/>
+          <a:lstStyle/>
+          <a:p>
+            <a:pPr>
+              <a:defRPr/>
+            </a:pPr>
+            <a:r>
+              <a:rPr lang="en-US" b="0" smtClean="0">
                 <a:solidFill>
                   <a:srgbClr val="FFFFFF"/>
                 </a:solidFill>
               </a:rPr>
-              <a:t>David Champion</a:t>
-            </a:r>
-          </a:p>
-          <a:p>
-            <a:pPr eaLnBrk="1" hangingPunct="1"/>
-            <a:r>
-              <a:rPr lang="de-DE" dirty="0" smtClean="0">
-                <a:solidFill>
-                  <a:srgbClr val="FFFFFF"/>
-                </a:solidFill>
-              </a:rPr>
-              <a:t>Max-Planck-Institut für Radioastronomie</a:t>
-            </a:r>
-          </a:p>
-          <a:p>
-            <a:pPr eaLnBrk="1" hangingPunct="1"/>
-            <a:r>
-              <a:rPr lang="en-US" dirty="0" smtClean="0">
-                <a:solidFill>
-                  <a:srgbClr val="FFFFFF"/>
-                </a:solidFill>
-              </a:rPr>
-              <a:t>IPTA Conference, </a:t>
-            </a:r>
-            <a:r>
-              <a:rPr lang="en-US" dirty="0" err="1" smtClean="0">
-                <a:solidFill>
-                  <a:srgbClr val="FFFFFF"/>
-                </a:solidFill>
-              </a:rPr>
-              <a:t>Kiama</a:t>
-            </a:r>
-            <a:endParaRPr lang="en-US" dirty="0" smtClean="0">
+              <a:t>IPTA conference 2012</a:t>
+            </a:r>
+            <a:endParaRPr lang="en-US" b="0" dirty="0" smtClean="0">
               <a:solidFill>
                 <a:srgbClr val="FFFFFF"/>
               </a:solidFill>
             </a:endParaRPr>
           </a:p>
-          <a:p>
-            <a:pPr eaLnBrk="1" hangingPunct="1"/>
-            <a:r>
-              <a:rPr lang="en-US" dirty="0" smtClean="0">
-                <a:solidFill>
-                  <a:srgbClr val="FFFFFF"/>
-                </a:solidFill>
-              </a:rPr>
-              <a:t>29</a:t>
-            </a:r>
-            <a:r>
-              <a:rPr lang="en-US" baseline="30000" dirty="0" smtClean="0">
-                <a:solidFill>
-                  <a:srgbClr val="FFFFFF"/>
-                </a:solidFill>
-              </a:rPr>
-              <a:t>th</a:t>
-            </a:r>
-            <a:r>
-              <a:rPr lang="en-US" dirty="0" smtClean="0">
-                <a:solidFill>
-                  <a:srgbClr val="FFFFFF"/>
-                </a:solidFill>
-              </a:rPr>
-              <a:t> June2012</a:t>
-            </a:r>
-            <a:endParaRPr lang="en-US" dirty="0" smtClean="0">
-              <a:solidFill>
-                <a:srgbClr val="FFFFFF"/>
-              </a:solidFill>
-            </a:endParaRPr>
+        </p:txBody>
+      </p:sp>
+      <p:sp>
+        <p:nvSpPr>
+          <p:cNvPr id="5" name="Slide Number Placeholder 4"/>
+          <p:cNvSpPr>
+            <a:spLocks noGrp="1"/>
+          </p:cNvSpPr>
+          <p:nvPr>
+            <p:ph type="sldNum" sz="quarter" idx="12"/>
+          </p:nvPr>
+        </p:nvSpPr>
+        <p:spPr/>
+        <p:txBody>
+          <a:bodyPr/>
+          <a:lstStyle/>
+          <a:p>
+            <a:fld id="{785805AC-A8A2-8640-B3CF-422F6C12D499}" type="slidenum">
+              <a:rPr lang="en-US" smtClean="0"/>
+              <a:pPr/>
+              <a:t>3</a:t>
+            </a:fld>
+            <a:endParaRPr lang="en-US" dirty="0"/>
           </a:p>
         </p:txBody>
       </p:sp>
     </p:spTree>
     <p:extLst>
       <p:ext uri="{BB962C8B-B14F-4D97-AF65-F5344CB8AC3E}">
-        <p14:creationId xmlns:p14="http://schemas.microsoft.com/office/powerpoint/2010/main" val="2936147000"/>
+        <p14:creationId xmlns:p14="http://schemas.microsoft.com/office/powerpoint/2010/main" xmlns:p="http://schemas.openxmlformats.org/presentationml/2006/main" xmlns:r="http://schemas.openxmlformats.org/officeDocument/2006/relationships" xmlns:a="http://schemas.openxmlformats.org/drawingml/2006/main" xmlns="" val="3087951042"/>
       </p:ext>
     </p:extLst>
   </p:cSld>
   <p:clrMapOvr>
     <a:masterClrMapping/>
   </p:clrMapOvr>
-  <p:transition xmlns:p14="http://schemas.microsoft.com/office/powerpoint/2010/main">
-    <p:fade/>
-  </p:transition>
-  <p:timing>
-    <p:tnLst>
-      <p:par>
-        <p:cTn xmlns:p14="http://schemas.microsoft.com/office/powerpoint/2010/main" id="1" dur="indefinite" restart="never" nodeType="tmRoot"/>
-      </p:par>
-    </p:tnLst>
-  </p:timing>
 </p:sld>
 </file>
 
-<file path=ppt/slides/slide20.xml><?xml version="1.0" encoding="utf-8"?>
-<p:sld xmlns:a="http://schemas.openxmlformats.org/drawingml/2006/main" xmlns:r="http://schemas.openxmlformats.org/officeDocument/2006/relationships" xmlns:p="http://schemas.openxmlformats.org/presentationml/2006/main">
+<file path=ppt/slides/slide4.xml><?xml version="1.0" encoding="utf-8"?>
+<p:sld xmlns:a="http://schemas.openxmlformats.org/drawingml/2006/main" xmlns:r="http://schemas.openxmlformats.org/officeDocument/2006/relationships" xmlns:mc="http://schemas.openxmlformats.org/markup-compatibility/2006" xmlns:mv="urn:schemas-microsoft-com:mac:vml" xmlns:p="http://schemas.openxmlformats.org/presentationml/2006/main" mc:Ignorable="mv" mc:PreserveAttributes="mv:*">
   <p:cSld>
     <p:spTree>
       <p:nvGrpSpPr>
@@ -7787,14 +7884,28 @@
             <p:ph type="title"/>
           </p:nvPr>
         </p:nvSpPr>
-        <p:spPr/>
-        <p:txBody>
-          <a:bodyPr/>
+        <p:spPr>
+          <a:xfrm>
+            <a:off x="481161" y="2215672"/>
+            <a:ext cx="8229600" cy="2576990"/>
+          </a:xfrm>
+        </p:spPr>
+        <p:txBody>
+          <a:bodyPr>
+            <a:normAutofit fontScale="90000"/>
+          </a:bodyPr>
           <a:lstStyle/>
           <a:p>
             <a:r>
               <a:rPr lang="en-US" dirty="0" smtClean="0"/>
-              <a:t>Notes from talks</a:t>
+              <a:t>“I would love us all to stand in a circle, hold hands and share the observing… but it’s not going to happen”</a:t>
+            </a:r>
+            <a:br>
+              <a:rPr lang="en-US" dirty="0" smtClean="0"/>
+            </a:br>
+            <a:r>
+              <a:rPr lang="en-US" dirty="0" smtClean="0"/>
+              <a:t>Scott Ransom IPTA 2012</a:t>
             </a:r>
             <a:endParaRPr lang="en-US" dirty="0"/>
           </a:p>
@@ -7802,37 +7913,24 @@
       </p:sp>
       <p:sp>
         <p:nvSpPr>
-          <p:cNvPr id="3" name="Content Placeholder 2"/>
-          <p:cNvSpPr>
-            <a:spLocks noGrp="1"/>
-          </p:cNvSpPr>
-          <p:nvPr>
-            <p:ph idx="1"/>
-          </p:nvPr>
-        </p:nvSpPr>
-        <p:spPr/>
-        <p:txBody>
-          <a:bodyPr/>
-          <a:lstStyle/>
-          <a:p>
-            <a:r>
-              <a:rPr lang="en-US" dirty="0" smtClean="0"/>
-              <a:t>MB: LIGO syndrome</a:t>
-            </a:r>
-          </a:p>
-          <a:p>
-            <a:r>
-              <a:rPr lang="en-US" dirty="0" smtClean="0"/>
-              <a:t>DN: ISM is a monster and we should be scared of it</a:t>
-            </a:r>
-          </a:p>
-          <a:p>
-            <a:r>
-              <a:rPr lang="en-US" dirty="0" smtClean="0"/>
-              <a:t>DN: still engineering the detector</a:t>
-            </a:r>
-          </a:p>
-          <a:p>
+          <p:cNvPr id="3" name="Date Placeholder 2"/>
+          <p:cNvSpPr>
+            <a:spLocks noGrp="1"/>
+          </p:cNvSpPr>
+          <p:nvPr>
+            <p:ph type="dt" sz="half" idx="10"/>
+          </p:nvPr>
+        </p:nvSpPr>
+        <p:spPr/>
+        <p:txBody>
+          <a:bodyPr/>
+          <a:lstStyle/>
+          <a:p>
+            <a:fld id="{DFA92F6D-5103-A642-B220-478B8EEFADAB}" type="datetime1">
+              <a:rPr lang="de-DE" smtClean="0"/>
+              <a:pPr/>
+              <a:t>7/10/12</a:t>
+            </a:fld>
             <a:endParaRPr lang="en-US" dirty="0"/>
           </a:p>
         </p:txBody>
@@ -7873,30 +7971,7 @@
       </p:sp>
       <p:sp>
         <p:nvSpPr>
-          <p:cNvPr id="5" name="Date Placeholder 4"/>
-          <p:cNvSpPr>
-            <a:spLocks noGrp="1"/>
-          </p:cNvSpPr>
-          <p:nvPr>
-            <p:ph type="dt" sz="half" idx="10"/>
-          </p:nvPr>
-        </p:nvSpPr>
-        <p:spPr/>
-        <p:txBody>
-          <a:bodyPr/>
-          <a:lstStyle/>
-          <a:p>
-            <a:fld id="{A6F6A6E6-5961-DE4D-835E-878F3556F6ED}" type="datetime1">
-              <a:rPr lang="de-DE" smtClean="0"/>
-              <a:t>26.06.12</a:t>
-            </a:fld>
-            <a:endParaRPr lang="en-US" dirty="0"/>
-          </a:p>
-        </p:txBody>
-      </p:sp>
-      <p:sp>
-        <p:nvSpPr>
-          <p:cNvPr id="6" name="Slide Number Placeholder 5"/>
+          <p:cNvPr id="5" name="Slide Number Placeholder 4"/>
           <p:cNvSpPr>
             <a:spLocks noGrp="1"/>
           </p:cNvSpPr>
@@ -7912,7 +7987,7 @@
             <a:fld id="{785805AC-A8A2-8640-B3CF-422F6C12D499}" type="slidenum">
               <a:rPr lang="en-US" smtClean="0"/>
               <a:pPr/>
-              <a:t>20</a:t>
+              <a:t>4</a:t>
             </a:fld>
             <a:endParaRPr lang="en-US" dirty="0"/>
           </a:p>
@@ -7921,7 +7996,7 @@
     </p:spTree>
     <p:extLst>
       <p:ext uri="{BB962C8B-B14F-4D97-AF65-F5344CB8AC3E}">
-        <p14:creationId xmlns:p14="http://schemas.microsoft.com/office/powerpoint/2010/main" val="1451974422"/>
+        <p14:creationId xmlns:p14="http://schemas.microsoft.com/office/powerpoint/2010/main" xmlns:p="http://schemas.openxmlformats.org/presentationml/2006/main" xmlns:r="http://schemas.openxmlformats.org/officeDocument/2006/relationships" xmlns:a="http://schemas.openxmlformats.org/drawingml/2006/main" xmlns="" val="1866397534"/>
       </p:ext>
     </p:extLst>
   </p:cSld>
@@ -7931,8 +8006,8 @@
 </p:sld>
 </file>
 
-<file path=ppt/slides/slide21.xml><?xml version="1.0" encoding="utf-8"?>
-<p:sld xmlns:a="http://schemas.openxmlformats.org/drawingml/2006/main" xmlns:r="http://schemas.openxmlformats.org/officeDocument/2006/relationships" xmlns:p="http://schemas.openxmlformats.org/presentationml/2006/main">
+<file path=ppt/slides/slide5.xml><?xml version="1.0" encoding="utf-8"?>
+<p:sld xmlns:a="http://schemas.openxmlformats.org/drawingml/2006/main" xmlns:r="http://schemas.openxmlformats.org/officeDocument/2006/relationships" xmlns:mc="http://schemas.openxmlformats.org/markup-compatibility/2006" xmlns:mv="urn:schemas-microsoft-com:mac:vml" xmlns:p="http://schemas.openxmlformats.org/presentationml/2006/main" mc:Ignorable="mv" mc:PreserveAttributes="mv:*">
   <p:cSld>
     <p:spTree>
       <p:nvGrpSpPr>
@@ -7963,7 +8038,11 @@
           <a:bodyPr/>
           <a:lstStyle/>
           <a:p>
-            <a:endParaRPr lang="en-US"/>
+            <a:r>
+              <a:rPr lang="en-US" dirty="0" smtClean="0"/>
+              <a:t>Working as the IPTA</a:t>
+            </a:r>
+            <a:endParaRPr lang="en-US" dirty="0"/>
           </a:p>
         </p:txBody>
       </p:sp>
@@ -7983,38 +8062,29 @@
           <a:lstStyle/>
           <a:p>
             <a:r>
-              <a:rPr lang="en-US" dirty="0"/>
-              <a:t>- common instruments</a:t>
-            </a:r>
-          </a:p>
-          <a:p>
-            <a:r>
-              <a:rPr lang="en-US" dirty="0"/>
-              <a:t>- repositories</a:t>
-            </a:r>
-          </a:p>
-          <a:p>
-            <a:r>
-              <a:rPr lang="en-US" dirty="0"/>
-              <a:t>- public data</a:t>
-            </a:r>
-          </a:p>
-          <a:p>
-            <a:r>
-              <a:rPr lang="en-US" dirty="0"/>
-              <a:t>- moving beyond GWs</a:t>
-            </a:r>
-          </a:p>
-          <a:p>
-            <a:r>
-              <a:rPr lang="en-US" dirty="0"/>
-              <a:t>- global funding</a:t>
-            </a:r>
-          </a:p>
-          <a:p>
-            <a:r>
-              <a:rPr lang="en-US" dirty="0"/>
-              <a:t>- the IPTA and the SKA</a:t>
+              <a:rPr lang="en-US" dirty="0" smtClean="0"/>
+              <a:t>Data combination</a:t>
+            </a:r>
+          </a:p>
+          <a:p>
+            <a:pPr lvl="1"/>
+            <a:r>
+              <a:rPr lang="en-US" dirty="0" smtClean="0"/>
+              <a:t>We could make a detection if we “got lucky”</a:t>
+            </a:r>
+          </a:p>
+          <a:p>
+            <a:pPr lvl="1"/>
+            <a:r>
+              <a:rPr lang="en-US" dirty="0" smtClean="0"/>
+              <a:t>We will certainly find all the weirdness in each others data</a:t>
+            </a:r>
+          </a:p>
+          <a:p>
+            <a:pPr lvl="2"/>
+            <a:r>
+              <a:rPr lang="en-US" dirty="0" smtClean="0"/>
+              <a:t>Better understanding of our own datasets</a:t>
             </a:r>
             <a:endParaRPr lang="en-US" dirty="0"/>
           </a:p>
@@ -8022,7 +8092,31 @@
       </p:sp>
       <p:sp>
         <p:nvSpPr>
-          <p:cNvPr id="4" name="Footer Placeholder 3"/>
+          <p:cNvPr id="4" name="Date Placeholder 3"/>
+          <p:cNvSpPr>
+            <a:spLocks noGrp="1"/>
+          </p:cNvSpPr>
+          <p:nvPr>
+            <p:ph type="dt" sz="half" idx="10"/>
+          </p:nvPr>
+        </p:nvSpPr>
+        <p:spPr/>
+        <p:txBody>
+          <a:bodyPr/>
+          <a:lstStyle/>
+          <a:p>
+            <a:fld id="{C1E2467A-468C-BB4F-8513-F5A32D4F9690}" type="datetime1">
+              <a:rPr lang="de-DE" smtClean="0"/>
+              <a:pPr/>
+              <a:t>7/10/12</a:t>
+            </a:fld>
+            <a:endParaRPr lang="en-US" dirty="0"/>
+          </a:p>
+        </p:txBody>
+      </p:sp>
+      <p:sp>
+        <p:nvSpPr>
+          <p:cNvPr id="5" name="Footer Placeholder 4"/>
           <p:cNvSpPr>
             <a:spLocks noGrp="1"/>
           </p:cNvSpPr>
@@ -8039,41 +8133,10 @@
               <a:defRPr/>
             </a:pPr>
             <a:r>
-              <a:rPr lang="en-US" b="0" smtClean="0">
-                <a:solidFill>
-                  <a:schemeClr val="tx1"/>
-                </a:solidFill>
-              </a:rPr>
+              <a:rPr lang="en-US" b="0" smtClean="0"/>
               <a:t>IPTA conference 2012</a:t>
             </a:r>
-            <a:endParaRPr lang="en-US" b="0" dirty="0" smtClean="0">
-              <a:solidFill>
-                <a:schemeClr val="tx1"/>
-              </a:solidFill>
-            </a:endParaRPr>
-          </a:p>
-        </p:txBody>
-      </p:sp>
-      <p:sp>
-        <p:nvSpPr>
-          <p:cNvPr id="5" name="Date Placeholder 4"/>
-          <p:cNvSpPr>
-            <a:spLocks noGrp="1"/>
-          </p:cNvSpPr>
-          <p:nvPr>
-            <p:ph type="dt" sz="half" idx="10"/>
-          </p:nvPr>
-        </p:nvSpPr>
-        <p:spPr/>
-        <p:txBody>
-          <a:bodyPr/>
-          <a:lstStyle/>
-          <a:p>
-            <a:fld id="{787E2068-22BB-0149-BC19-5DDDD39E4EAE}" type="datetime1">
-              <a:rPr lang="de-DE" smtClean="0"/>
-              <a:t>26.06.12</a:t>
-            </a:fld>
-            <a:endParaRPr lang="en-US" dirty="0"/>
+            <a:endParaRPr lang="en-US" b="0" dirty="0" smtClean="0"/>
           </a:p>
         </p:txBody>
       </p:sp>
@@ -8095,7 +8158,7 @@
             <a:fld id="{785805AC-A8A2-8640-B3CF-422F6C12D499}" type="slidenum">
               <a:rPr lang="en-US" smtClean="0"/>
               <a:pPr/>
-              <a:t>21</a:t>
+              <a:t>5</a:t>
             </a:fld>
             <a:endParaRPr lang="en-US" dirty="0"/>
           </a:p>
@@ -8104,7 +8167,7 @@
     </p:spTree>
     <p:extLst>
       <p:ext uri="{BB962C8B-B14F-4D97-AF65-F5344CB8AC3E}">
-        <p14:creationId xmlns:p14="http://schemas.microsoft.com/office/powerpoint/2010/main" val="165220891"/>
+        <p14:creationId xmlns:p14="http://schemas.microsoft.com/office/powerpoint/2010/main" xmlns:p="http://schemas.openxmlformats.org/presentationml/2006/main" xmlns:r="http://schemas.openxmlformats.org/officeDocument/2006/relationships" xmlns:a="http://schemas.openxmlformats.org/drawingml/2006/main" xmlns="" val="3456139173"/>
       </p:ext>
     </p:extLst>
   </p:cSld>
@@ -8114,8 +8177,8 @@
 </p:sld>
 </file>
 
-<file path=ppt/slides/slide22.xml><?xml version="1.0" encoding="utf-8"?>
-<p:sld xmlns:a="http://schemas.openxmlformats.org/drawingml/2006/main" xmlns:r="http://schemas.openxmlformats.org/officeDocument/2006/relationships" xmlns:p="http://schemas.openxmlformats.org/presentationml/2006/main">
+<file path=ppt/slides/slide6.xml><?xml version="1.0" encoding="utf-8"?>
+<p:sld xmlns:a="http://schemas.openxmlformats.org/drawingml/2006/main" xmlns:r="http://schemas.openxmlformats.org/officeDocument/2006/relationships" xmlns:mc="http://schemas.openxmlformats.org/markup-compatibility/2006" xmlns:mv="urn:schemas-microsoft-com:mac:vml" xmlns:p="http://schemas.openxmlformats.org/presentationml/2006/main" mc:Ignorable="mv" mc:PreserveAttributes="mv:*">
   <p:cSld>
     <p:spTree>
       <p:nvGrpSpPr>
@@ -8141,21 +8204,14 @@
             <p:ph type="title"/>
           </p:nvPr>
         </p:nvSpPr>
-        <p:spPr>
-          <a:xfrm>
-            <a:off x="481161" y="2215672"/>
-            <a:ext cx="8229600" cy="2505106"/>
-          </a:xfrm>
-        </p:spPr>
-        <p:txBody>
-          <a:bodyPr>
-            <a:normAutofit/>
-          </a:bodyPr>
+        <p:spPr/>
+        <p:txBody>
+          <a:bodyPr/>
           <a:lstStyle/>
           <a:p>
             <a:r>
               <a:rPr lang="en-US" dirty="0" smtClean="0"/>
-              <a:t>?</a:t>
+              <a:t>Working as the IPTA</a:t>
             </a:r>
             <a:endParaRPr lang="en-US" dirty="0"/>
           </a:p>
@@ -8163,30 +8219,65 @@
       </p:sp>
       <p:sp>
         <p:nvSpPr>
-          <p:cNvPr id="5" name="Date Placeholder 4"/>
-          <p:cNvSpPr>
-            <a:spLocks noGrp="1"/>
-          </p:cNvSpPr>
-          <p:nvPr>
-            <p:ph type="dt" sz="half" idx="10"/>
-          </p:nvPr>
-        </p:nvSpPr>
-        <p:spPr/>
-        <p:txBody>
-          <a:bodyPr/>
-          <a:lstStyle/>
-          <a:p>
-            <a:fld id="{C7033B67-0AE5-704D-8303-3C70BDBAB444}" type="datetime1">
-              <a:rPr lang="de-DE" smtClean="0"/>
-              <a:t>26.06.12</a:t>
-            </a:fld>
-            <a:endParaRPr lang="en-US" dirty="0"/>
-          </a:p>
-        </p:txBody>
-      </p:sp>
-      <p:sp>
-        <p:nvSpPr>
-          <p:cNvPr id="6" name="Footer Placeholder 5"/>
+          <p:cNvPr id="3" name="Content Placeholder 2"/>
+          <p:cNvSpPr>
+            <a:spLocks noGrp="1"/>
+          </p:cNvSpPr>
+          <p:nvPr>
+            <p:ph idx="1"/>
+          </p:nvPr>
+        </p:nvSpPr>
+        <p:spPr/>
+        <p:txBody>
+          <a:bodyPr/>
+          <a:lstStyle/>
+          <a:p>
+            <a:r>
+              <a:rPr lang="en-US" dirty="0" err="1" smtClean="0"/>
+              <a:t>Optimising</a:t>
+            </a:r>
+            <a:r>
+              <a:rPr lang="en-US" dirty="0" smtClean="0"/>
+              <a:t> observing strategy over the whole IPTA rather than by PTA</a:t>
+            </a:r>
+          </a:p>
+          <a:p>
+            <a:pPr lvl="1"/>
+            <a:r>
+              <a:rPr lang="en-US" dirty="0" smtClean="0"/>
+              <a:t>Clearly dependent on model of pulsar and GW</a:t>
+            </a:r>
+          </a:p>
+          <a:p>
+            <a:pPr lvl="1"/>
+            <a:r>
+              <a:rPr lang="en-US" dirty="0" err="1" smtClean="0"/>
+              <a:t>Optimise</a:t>
+            </a:r>
+            <a:r>
+              <a:rPr lang="en-US" dirty="0" smtClean="0"/>
+              <a:t> for detection or limit, single source or background</a:t>
+            </a:r>
+          </a:p>
+          <a:p>
+            <a:pPr lvl="1"/>
+            <a:r>
+              <a:rPr lang="en-US" dirty="0" smtClean="0"/>
+              <a:t>Pulsar triage? (examples from Matthew)</a:t>
+            </a:r>
+          </a:p>
+          <a:p>
+            <a:pPr lvl="1"/>
+            <a:r>
+              <a:rPr lang="en-US" dirty="0" smtClean="0"/>
+              <a:t>Within the current framework there is a potential gain of 10 years</a:t>
+            </a:r>
+          </a:p>
+        </p:txBody>
+      </p:sp>
+      <p:sp>
+        <p:nvSpPr>
+          <p:cNvPr id="4" name="Footer Placeholder 3"/>
           <p:cNvSpPr>
             <a:spLocks noGrp="1"/>
           </p:cNvSpPr>
@@ -8205,14 +8296,14 @@
             <a:r>
               <a:rPr lang="en-US" b="0" smtClean="0">
                 <a:solidFill>
-                  <a:schemeClr val="tx1"/>
+                  <a:srgbClr val="FFFFFF"/>
                 </a:solidFill>
               </a:rPr>
               <a:t>IPTA conference 2012</a:t>
             </a:r>
             <a:endParaRPr lang="en-US" b="0" dirty="0" smtClean="0">
               <a:solidFill>
-                <a:schemeClr val="tx1"/>
+                <a:srgbClr val="FFFFFF"/>
               </a:solidFill>
             </a:endParaRPr>
           </a:p>
@@ -8220,7 +8311,31 @@
       </p:sp>
       <p:sp>
         <p:nvSpPr>
-          <p:cNvPr id="7" name="Slide Number Placeholder 6"/>
+          <p:cNvPr id="5" name="Date Placeholder 4"/>
+          <p:cNvSpPr>
+            <a:spLocks noGrp="1"/>
+          </p:cNvSpPr>
+          <p:nvPr>
+            <p:ph type="dt" sz="half" idx="10"/>
+          </p:nvPr>
+        </p:nvSpPr>
+        <p:spPr/>
+        <p:txBody>
+          <a:bodyPr/>
+          <a:lstStyle/>
+          <a:p>
+            <a:fld id="{AEFFC700-88EA-274D-BB21-C8D3BB664238}" type="datetime1">
+              <a:rPr lang="de-DE" smtClean="0"/>
+              <a:pPr/>
+              <a:t>7/10/12</a:t>
+            </a:fld>
+            <a:endParaRPr lang="en-US" dirty="0"/>
+          </a:p>
+        </p:txBody>
+      </p:sp>
+      <p:sp>
+        <p:nvSpPr>
+          <p:cNvPr id="6" name="Slide Number Placeholder 5"/>
           <p:cNvSpPr>
             <a:spLocks noGrp="1"/>
           </p:cNvSpPr>
@@ -8236,7 +8351,7 @@
             <a:fld id="{785805AC-A8A2-8640-B3CF-422F6C12D499}" type="slidenum">
               <a:rPr lang="en-US" smtClean="0"/>
               <a:pPr/>
-              <a:t>22</a:t>
+              <a:t>6</a:t>
             </a:fld>
             <a:endParaRPr lang="en-US" dirty="0"/>
           </a:p>
@@ -8245,7 +8360,7 @@
     </p:spTree>
     <p:extLst>
       <p:ext uri="{BB962C8B-B14F-4D97-AF65-F5344CB8AC3E}">
-        <p14:creationId xmlns:p14="http://schemas.microsoft.com/office/powerpoint/2010/main" val="3466240605"/>
+        <p14:creationId xmlns:p14="http://schemas.microsoft.com/office/powerpoint/2010/main" xmlns:p="http://schemas.openxmlformats.org/presentationml/2006/main" xmlns:r="http://schemas.openxmlformats.org/officeDocument/2006/relationships" xmlns:a="http://schemas.openxmlformats.org/drawingml/2006/main" xmlns="" val="4083466518"/>
       </p:ext>
     </p:extLst>
   </p:cSld>
@@ -8255,8 +8370,8 @@
 </p:sld>
 </file>
 
-<file path=ppt/slides/slide3.xml><?xml version="1.0" encoding="utf-8"?>
-<p:sld xmlns:a="http://schemas.openxmlformats.org/drawingml/2006/main" xmlns:r="http://schemas.openxmlformats.org/officeDocument/2006/relationships" xmlns:p="http://schemas.openxmlformats.org/presentationml/2006/main">
+<file path=ppt/slides/slide7.xml><?xml version="1.0" encoding="utf-8"?>
+<p:sld xmlns:a="http://schemas.openxmlformats.org/drawingml/2006/main" xmlns:r="http://schemas.openxmlformats.org/officeDocument/2006/relationships" xmlns:mc="http://schemas.openxmlformats.org/markup-compatibility/2006" xmlns:mv="urn:schemas-microsoft-com:mac:vml" xmlns:p="http://schemas.openxmlformats.org/presentationml/2006/main" mc:Ignorable="mv" mc:PreserveAttributes="mv:*">
   <p:cSld>
     <p:spTree>
       <p:nvGrpSpPr>
@@ -8274,174 +8389,217 @@
       </p:grpSpPr>
       <p:sp>
         <p:nvSpPr>
-          <p:cNvPr id="14338" name="Rectangle 2"/>
-          <p:cNvSpPr>
-            <a:spLocks noGrp="1" noChangeArrowheads="1"/>
-          </p:cNvSpPr>
-          <p:nvPr>
-            <p:ph type="ctrTitle"/>
-          </p:nvPr>
-        </p:nvSpPr>
-        <p:spPr>
-          <a:xfrm>
-            <a:off x="685800" y="1126276"/>
-            <a:ext cx="7772400" cy="2474175"/>
-          </a:xfrm>
-        </p:spPr>
+          <p:cNvPr id="2" name="Title 1"/>
+          <p:cNvSpPr>
+            <a:spLocks noGrp="1"/>
+          </p:cNvSpPr>
+          <p:nvPr>
+            <p:ph type="title"/>
+          </p:nvPr>
+        </p:nvSpPr>
+        <p:spPr/>
+        <p:txBody>
+          <a:bodyPr/>
+          <a:lstStyle/>
+          <a:p>
+            <a:r>
+              <a:rPr lang="en-US" dirty="0" smtClean="0"/>
+              <a:t>Working as the IPTA</a:t>
+            </a:r>
+            <a:endParaRPr lang="en-US" dirty="0"/>
+          </a:p>
+        </p:txBody>
+      </p:sp>
+      <p:sp>
+        <p:nvSpPr>
+          <p:cNvPr id="3" name="Content Placeholder 2"/>
+          <p:cNvSpPr>
+            <a:spLocks noGrp="1"/>
+          </p:cNvSpPr>
+          <p:nvPr>
+            <p:ph idx="1"/>
+          </p:nvPr>
+        </p:nvSpPr>
+        <p:spPr/>
         <p:txBody>
           <a:bodyPr>
-            <a:normAutofit fontScale="90000"/>
+            <a:normAutofit fontScale="92500"/>
           </a:bodyPr>
           <a:lstStyle/>
           <a:p>
-            <a:pPr eaLnBrk="1" hangingPunct="1"/>
             <a:r>
               <a:rPr lang="en-US" dirty="0" smtClean="0"/>
-              <a:t>Getting more IPTA for your Buck</a:t>
-            </a:r>
-            <a:br>
+              <a:t>Almost all PTA projects as IPTA</a:t>
+            </a:r>
+          </a:p>
+          <a:p>
+            <a:pPr lvl="1"/>
+            <a:r>
               <a:rPr lang="en-US" dirty="0" smtClean="0"/>
-            </a:br>
-            <a:r>
-              <a:rPr lang="en-US" sz="3600" i="1" dirty="0" smtClean="0"/>
-              <a:t>or</a:t>
-            </a:r>
+              <a:t>Working across 8 countries, 6 time zones</a:t>
+            </a:r>
+          </a:p>
+          <a:p>
+            <a:pPr lvl="1"/>
             <a:r>
               <a:rPr lang="en-US" dirty="0" smtClean="0"/>
-              <a:t/>
-            </a:r>
-            <a:br>
+              <a:t>Committees, </a:t>
+            </a:r>
+            <a:r>
+              <a:rPr lang="en-US" dirty="0" err="1" smtClean="0"/>
+              <a:t>telecons</a:t>
+            </a:r>
+            <a:r>
               <a:rPr lang="en-US" dirty="0" smtClean="0"/>
-            </a:br>
+              <a:t> </a:t>
+            </a:r>
+            <a:r>
+              <a:rPr lang="en-US" dirty="0" err="1" smtClean="0"/>
+              <a:t>etc</a:t>
+            </a:r>
             <a:r>
               <a:rPr lang="en-US" dirty="0" smtClean="0"/>
-              <a:t>How I learned to stop worrying and love the IPTA</a:t>
-            </a:r>
-            <a:endParaRPr lang="en-US" sz="2400" dirty="0" smtClean="0"/>
-          </a:p>
-        </p:txBody>
-      </p:sp>
-      <p:sp>
-        <p:nvSpPr>
-          <p:cNvPr id="14339" name="Rectangle 3"/>
-          <p:cNvSpPr>
-            <a:spLocks noGrp="1" noChangeArrowheads="1"/>
-          </p:cNvSpPr>
-          <p:nvPr>
-            <p:ph type="subTitle" idx="1"/>
-          </p:nvPr>
-        </p:nvSpPr>
-        <p:spPr/>
-        <p:txBody>
-          <a:bodyPr>
-            <a:normAutofit fontScale="85000" lnSpcReduction="20000"/>
-          </a:bodyPr>
-          <a:lstStyle/>
-          <a:p>
-            <a:pPr eaLnBrk="1" hangingPunct="1"/>
-            <a:r>
-              <a:rPr lang="en-US" dirty="0" smtClean="0">
+              <a:t> are a necessary evil</a:t>
+            </a:r>
+          </a:p>
+          <a:p>
+            <a:r>
+              <a:rPr lang="en-US" dirty="0"/>
+              <a:t>Implication is interdependence not only for GW work</a:t>
+            </a:r>
+          </a:p>
+          <a:p>
+            <a:r>
+              <a:rPr lang="en-US" dirty="0" smtClean="0"/>
+              <a:t>Massive </a:t>
+            </a:r>
+            <a:r>
+              <a:rPr lang="en-US" dirty="0"/>
+              <a:t>change from competition to </a:t>
+            </a:r>
+            <a:r>
+              <a:rPr lang="en-US" dirty="0" smtClean="0"/>
+              <a:t>collaboration</a:t>
+            </a:r>
+          </a:p>
+          <a:p>
+            <a:pPr lvl="1"/>
+            <a:r>
+              <a:rPr lang="en-US" dirty="0" smtClean="0"/>
+              <a:t>Concern that a lack of competition will stifle progress</a:t>
+            </a:r>
+          </a:p>
+          <a:p>
+            <a:pPr lvl="1"/>
+            <a:r>
+              <a:rPr lang="en-US" dirty="0" smtClean="0"/>
+              <a:t>Concern from students needing protection</a:t>
+            </a:r>
+            <a:endParaRPr lang="en-US" dirty="0"/>
+          </a:p>
+          <a:p>
+            <a:pPr lvl="1"/>
+            <a:endParaRPr lang="en-US" dirty="0"/>
+          </a:p>
+        </p:txBody>
+      </p:sp>
+      <p:sp>
+        <p:nvSpPr>
+          <p:cNvPr id="4" name="Footer Placeholder 3"/>
+          <p:cNvSpPr>
+            <a:spLocks noGrp="1"/>
+          </p:cNvSpPr>
+          <p:nvPr>
+            <p:ph type="ftr" sz="quarter" idx="11"/>
+          </p:nvPr>
+        </p:nvSpPr>
+        <p:spPr/>
+        <p:txBody>
+          <a:bodyPr/>
+          <a:lstStyle/>
+          <a:p>
+            <a:pPr>
+              <a:defRPr/>
+            </a:pPr>
+            <a:r>
+              <a:rPr lang="en-US" b="0" smtClean="0">
                 <a:solidFill>
                   <a:srgbClr val="FFFFFF"/>
                 </a:solidFill>
               </a:rPr>
-              <a:t>David Champion</a:t>
-            </a:r>
-          </a:p>
-          <a:p>
-            <a:pPr eaLnBrk="1" hangingPunct="1"/>
-            <a:r>
-              <a:rPr lang="de-DE" dirty="0" smtClean="0">
-                <a:solidFill>
-                  <a:srgbClr val="FFFFFF"/>
-                </a:solidFill>
-              </a:rPr>
-              <a:t>Max-Planck-Institut für Radioastronomie</a:t>
-            </a:r>
-          </a:p>
-          <a:p>
-            <a:pPr eaLnBrk="1" hangingPunct="1"/>
-            <a:r>
-              <a:rPr lang="en-US" dirty="0" smtClean="0">
-                <a:solidFill>
-                  <a:srgbClr val="FFFFFF"/>
-                </a:solidFill>
-              </a:rPr>
-              <a:t>IPTA Conference, </a:t>
-            </a:r>
-            <a:r>
-              <a:rPr lang="en-US" dirty="0" err="1" smtClean="0">
-                <a:solidFill>
-                  <a:srgbClr val="FFFFFF"/>
-                </a:solidFill>
-              </a:rPr>
-              <a:t>Kiama</a:t>
-            </a:r>
-            <a:endParaRPr lang="en-US" dirty="0" smtClean="0">
+              <a:t>IPTA conference 2012</a:t>
+            </a:r>
+            <a:endParaRPr lang="en-US" b="0" dirty="0" smtClean="0">
               <a:solidFill>
                 <a:srgbClr val="FFFFFF"/>
               </a:solidFill>
             </a:endParaRPr>
           </a:p>
-          <a:p>
-            <a:pPr eaLnBrk="1" hangingPunct="1"/>
-            <a:r>
-              <a:rPr lang="en-US" dirty="0" smtClean="0">
-                <a:solidFill>
-                  <a:srgbClr val="FFFFFF"/>
-                </a:solidFill>
-              </a:rPr>
-              <a:t>29</a:t>
-            </a:r>
-            <a:r>
-              <a:rPr lang="en-US" baseline="30000" dirty="0" smtClean="0">
-                <a:solidFill>
-                  <a:srgbClr val="FFFFFF"/>
-                </a:solidFill>
-              </a:rPr>
-              <a:t>th</a:t>
-            </a:r>
-            <a:r>
-              <a:rPr lang="en-US" dirty="0" smtClean="0">
-                <a:solidFill>
-                  <a:srgbClr val="FFFFFF"/>
-                </a:solidFill>
-              </a:rPr>
-              <a:t> June2012</a:t>
-            </a:r>
-            <a:endParaRPr lang="en-US" dirty="0" smtClean="0">
-              <a:solidFill>
-                <a:srgbClr val="FFFFFF"/>
-              </a:solidFill>
-            </a:endParaRPr>
+        </p:txBody>
+      </p:sp>
+      <p:sp>
+        <p:nvSpPr>
+          <p:cNvPr id="5" name="Date Placeholder 4"/>
+          <p:cNvSpPr>
+            <a:spLocks noGrp="1"/>
+          </p:cNvSpPr>
+          <p:nvPr>
+            <p:ph type="dt" sz="half" idx="10"/>
+          </p:nvPr>
+        </p:nvSpPr>
+        <p:spPr/>
+        <p:txBody>
+          <a:bodyPr/>
+          <a:lstStyle/>
+          <a:p>
+            <a:fld id="{AEFFC700-88EA-274D-BB21-C8D3BB664238}" type="datetime1">
+              <a:rPr lang="de-DE" smtClean="0"/>
+              <a:pPr/>
+              <a:t>7/10/12</a:t>
+            </a:fld>
+            <a:endParaRPr lang="en-US" dirty="0"/>
+          </a:p>
+        </p:txBody>
+      </p:sp>
+      <p:sp>
+        <p:nvSpPr>
+          <p:cNvPr id="6" name="Slide Number Placeholder 5"/>
+          <p:cNvSpPr>
+            <a:spLocks noGrp="1"/>
+          </p:cNvSpPr>
+          <p:nvPr>
+            <p:ph type="sldNum" sz="quarter" idx="12"/>
+          </p:nvPr>
+        </p:nvSpPr>
+        <p:spPr/>
+        <p:txBody>
+          <a:bodyPr/>
+          <a:lstStyle/>
+          <a:p>
+            <a:fld id="{785805AC-A8A2-8640-B3CF-422F6C12D499}" type="slidenum">
+              <a:rPr lang="en-US" smtClean="0"/>
+              <a:pPr/>
+              <a:t>7</a:t>
+            </a:fld>
+            <a:endParaRPr lang="en-US" dirty="0"/>
           </a:p>
         </p:txBody>
       </p:sp>
     </p:spTree>
     <p:extLst>
       <p:ext uri="{BB962C8B-B14F-4D97-AF65-F5344CB8AC3E}">
-        <p14:creationId xmlns:p14="http://schemas.microsoft.com/office/powerpoint/2010/main" val="3661402700"/>
+        <p14:creationId xmlns:p14="http://schemas.microsoft.com/office/powerpoint/2010/main" xmlns:p="http://schemas.openxmlformats.org/presentationml/2006/main" xmlns:r="http://schemas.openxmlformats.org/officeDocument/2006/relationships" xmlns:a="http://schemas.openxmlformats.org/drawingml/2006/main" xmlns="" val="1590693688"/>
       </p:ext>
     </p:extLst>
   </p:cSld>
   <p:clrMapOvr>
     <a:masterClrMapping/>
   </p:clrMapOvr>
-  <p:transition xmlns:p14="http://schemas.microsoft.com/office/powerpoint/2010/main">
-    <p:fade/>
-  </p:transition>
-  <p:timing>
-    <p:tnLst>
-      <p:par>
-        <p:cTn xmlns:p14="http://schemas.microsoft.com/office/powerpoint/2010/main" id="1" dur="indefinite" restart="never" nodeType="tmRoot"/>
-      </p:par>
-    </p:tnLst>
-  </p:timing>
 </p:sld>
 </file>
 
-<file path=ppt/slides/slide4.xml><?xml version="1.0" encoding="utf-8"?>
-<p:sld xmlns:a="http://schemas.openxmlformats.org/drawingml/2006/main" xmlns:r="http://schemas.openxmlformats.org/officeDocument/2006/relationships" xmlns:p="http://schemas.openxmlformats.org/presentationml/2006/main">
+<file path=ppt/slides/slide8.xml><?xml version="1.0" encoding="utf-8"?>
+<p:sld xmlns:a="http://schemas.openxmlformats.org/drawingml/2006/main" xmlns:r="http://schemas.openxmlformats.org/officeDocument/2006/relationships" xmlns:mc="http://schemas.openxmlformats.org/markup-compatibility/2006" xmlns:mv="urn:schemas-microsoft-com:mac:vml" xmlns:p="http://schemas.openxmlformats.org/presentationml/2006/main" mc:Ignorable="mv" mc:PreserveAttributes="mv:*">
   <p:cSld>
     <p:spTree>
       <p:nvGrpSpPr>
@@ -8467,52 +8625,90 @@
             <p:ph type="title"/>
           </p:nvPr>
         </p:nvSpPr>
-        <p:spPr>
-          <a:xfrm>
-            <a:off x="481161" y="2215672"/>
-            <a:ext cx="8229600" cy="2576990"/>
-          </a:xfrm>
-        </p:spPr>
+        <p:spPr/>
+        <p:txBody>
+          <a:bodyPr/>
+          <a:lstStyle/>
+          <a:p>
+            <a:r>
+              <a:rPr lang="en-US" dirty="0"/>
+              <a:t>Public release of data</a:t>
+            </a:r>
+          </a:p>
+        </p:txBody>
+      </p:sp>
+      <p:sp>
+        <p:nvSpPr>
+          <p:cNvPr id="3" name="Content Placeholder 2"/>
+          <p:cNvSpPr>
+            <a:spLocks noGrp="1"/>
+          </p:cNvSpPr>
+          <p:nvPr>
+            <p:ph idx="1"/>
+          </p:nvPr>
+        </p:nvSpPr>
+        <p:spPr/>
         <p:txBody>
           <a:bodyPr>
-            <a:normAutofit fontScale="90000"/>
+            <a:normAutofit lnSpcReduction="10000"/>
           </a:bodyPr>
           <a:lstStyle/>
           <a:p>
             <a:r>
               <a:rPr lang="en-US" dirty="0" smtClean="0"/>
-              <a:t>“If we don’t make the first pulsar GW detection with IPTA data then we’re doing something wrong”</a:t>
-            </a:r>
-            <a:br>
+              <a:t>Invite those outside the IPTA to search for GWs in our data</a:t>
+            </a:r>
+          </a:p>
+          <a:p>
+            <a:r>
               <a:rPr lang="en-US" dirty="0" smtClean="0"/>
-            </a:br>
+              <a:t>Engage with the wider community</a:t>
+            </a:r>
+          </a:p>
+          <a:p>
             <a:r>
               <a:rPr lang="en-US" dirty="0" smtClean="0"/>
-              <a:t>Scott Ransom IPTA 2011</a:t>
-            </a:r>
-            <a:endParaRPr lang="en-US" dirty="0"/>
-          </a:p>
-        </p:txBody>
-      </p:sp>
-      <p:sp>
-        <p:nvSpPr>
-          <p:cNvPr id="3" name="Date Placeholder 2"/>
-          <p:cNvSpPr>
-            <a:spLocks noGrp="1"/>
-          </p:cNvSpPr>
-          <p:nvPr>
-            <p:ph type="dt" sz="half" idx="10"/>
-          </p:nvPr>
-        </p:nvSpPr>
-        <p:spPr/>
-        <p:txBody>
-          <a:bodyPr/>
-          <a:lstStyle/>
-          <a:p>
-            <a:fld id="{DFA92F6D-5103-A642-B220-478B8EEFADAB}" type="datetime1">
-              <a:rPr lang="de-DE" smtClean="0"/>
-              <a:t>26.06.12</a:t>
-            </a:fld>
+              <a:t>Pulsar data is unusual:</a:t>
+            </a:r>
+          </a:p>
+          <a:p>
+            <a:pPr lvl="1"/>
+            <a:r>
+              <a:rPr lang="en-US" dirty="0" smtClean="0"/>
+              <a:t>“[The IPTA] is a very scary detector” </a:t>
+            </a:r>
+            <a:r>
+              <a:rPr lang="en-US" dirty="0" err="1" smtClean="0"/>
+              <a:t>Linqing</a:t>
+            </a:r>
+            <a:endParaRPr lang="en-US" dirty="0" smtClean="0"/>
+          </a:p>
+          <a:p>
+            <a:pPr lvl="1"/>
+            <a:r>
+              <a:rPr lang="en-US" dirty="0" smtClean="0"/>
+              <a:t>IPTA timing workshops</a:t>
+            </a:r>
+          </a:p>
+          <a:p>
+            <a:pPr lvl="1"/>
+            <a:r>
+              <a:rPr lang="en-US" dirty="0" smtClean="0"/>
+              <a:t>IPTA data challenges</a:t>
+            </a:r>
+          </a:p>
+          <a:p>
+            <a:pPr lvl="1"/>
+            <a:r>
+              <a:rPr lang="en-US" dirty="0" smtClean="0"/>
+              <a:t>Online simulator (KJ)</a:t>
+            </a:r>
+          </a:p>
+          <a:p>
+            <a:r>
+              <a:rPr lang="en-US" dirty="0" smtClean="0"/>
+              <a:t>Risk false alarms, gain novel techniques</a:t>
+            </a:r>
             <a:endParaRPr lang="en-US" dirty="0"/>
           </a:p>
         </p:txBody>
@@ -8536,24 +8732,40 @@
               <a:defRPr/>
             </a:pPr>
             <a:r>
-              <a:rPr lang="en-US" b="0" smtClean="0">
-                <a:solidFill>
-                  <a:srgbClr val="FFFFFF"/>
-                </a:solidFill>
-              </a:rPr>
+              <a:rPr lang="en-US" b="0" smtClean="0"/>
               <a:t>IPTA conference 2012</a:t>
             </a:r>
-            <a:endParaRPr lang="en-US" b="0" dirty="0" smtClean="0">
-              <a:solidFill>
-                <a:srgbClr val="FFFFFF"/>
-              </a:solidFill>
-            </a:endParaRPr>
-          </a:p>
-        </p:txBody>
-      </p:sp>
-      <p:sp>
-        <p:nvSpPr>
-          <p:cNvPr id="5" name="Slide Number Placeholder 4"/>
+            <a:endParaRPr lang="en-US" b="0" dirty="0" smtClean="0"/>
+          </a:p>
+        </p:txBody>
+      </p:sp>
+      <p:sp>
+        <p:nvSpPr>
+          <p:cNvPr id="5" name="Date Placeholder 4"/>
+          <p:cNvSpPr>
+            <a:spLocks noGrp="1"/>
+          </p:cNvSpPr>
+          <p:nvPr>
+            <p:ph type="dt" sz="half" idx="10"/>
+          </p:nvPr>
+        </p:nvSpPr>
+        <p:spPr/>
+        <p:txBody>
+          <a:bodyPr/>
+          <a:lstStyle/>
+          <a:p>
+            <a:fld id="{6ABBDB12-5DC7-C341-8126-512F1B884ACF}" type="datetime1">
+              <a:rPr lang="de-DE" smtClean="0"/>
+              <a:pPr/>
+              <a:t>7/10/12</a:t>
+            </a:fld>
+            <a:endParaRPr lang="en-US" dirty="0"/>
+          </a:p>
+        </p:txBody>
+      </p:sp>
+      <p:sp>
+        <p:nvSpPr>
+          <p:cNvPr id="6" name="Slide Number Placeholder 5"/>
           <p:cNvSpPr>
             <a:spLocks noGrp="1"/>
           </p:cNvSpPr>
@@ -8569,7 +8781,7 @@
             <a:fld id="{785805AC-A8A2-8640-B3CF-422F6C12D499}" type="slidenum">
               <a:rPr lang="en-US" smtClean="0"/>
               <a:pPr/>
-              <a:t>4</a:t>
+              <a:t>8</a:t>
             </a:fld>
             <a:endParaRPr lang="en-US" dirty="0"/>
           </a:p>
@@ -8578,7 +8790,7 @@
     </p:spTree>
     <p:extLst>
       <p:ext uri="{BB962C8B-B14F-4D97-AF65-F5344CB8AC3E}">
-        <p14:creationId xmlns:p14="http://schemas.microsoft.com/office/powerpoint/2010/main" val="3087951042"/>
+        <p14:creationId xmlns:p14="http://schemas.microsoft.com/office/powerpoint/2010/main" xmlns:p="http://schemas.openxmlformats.org/presentationml/2006/main" xmlns:r="http://schemas.openxmlformats.org/officeDocument/2006/relationships" xmlns:a="http://schemas.openxmlformats.org/drawingml/2006/main" xmlns="" val="2071229238"/>
       </p:ext>
     </p:extLst>
   </p:cSld>
@@ -8588,8 +8800,8 @@
 </p:sld>
 </file>
 
-<file path=ppt/slides/slide5.xml><?xml version="1.0" encoding="utf-8"?>
-<p:sld xmlns:a="http://schemas.openxmlformats.org/drawingml/2006/main" xmlns:r="http://schemas.openxmlformats.org/officeDocument/2006/relationships" xmlns:p="http://schemas.openxmlformats.org/presentationml/2006/main">
+<file path=ppt/slides/slide9.xml><?xml version="1.0" encoding="utf-8"?>
+<p:sld xmlns:a="http://schemas.openxmlformats.org/drawingml/2006/main" xmlns:r="http://schemas.openxmlformats.org/officeDocument/2006/relationships" xmlns:mc="http://schemas.openxmlformats.org/markup-compatibility/2006" xmlns:mv="urn:schemas-microsoft-com:mac:vml" xmlns:p="http://schemas.openxmlformats.org/presentationml/2006/main" mc:Ignorable="mv" mc:PreserveAttributes="mv:*">
   <p:cSld>
     <p:spTree>
       <p:nvGrpSpPr>
@@ -8615,52 +8827,72 @@
             <p:ph type="title"/>
           </p:nvPr>
         </p:nvSpPr>
-        <p:spPr>
-          <a:xfrm>
-            <a:off x="481161" y="2215672"/>
-            <a:ext cx="8229600" cy="2576990"/>
-          </a:xfrm>
-        </p:spPr>
-        <p:txBody>
-          <a:bodyPr>
-            <a:normAutofit fontScale="90000"/>
-          </a:bodyPr>
+        <p:spPr/>
+        <p:txBody>
+          <a:bodyPr/>
           <a:lstStyle/>
           <a:p>
             <a:r>
               <a:rPr lang="en-US" dirty="0" smtClean="0"/>
-              <a:t>“I would love us all to stand in a circle, hold hands and share the observing… but it’s not going to happen”</a:t>
-            </a:r>
-            <a:br>
+              <a:t>IPTA common infrastructure</a:t>
+            </a:r>
+            <a:endParaRPr lang="en-US" dirty="0"/>
+          </a:p>
+        </p:txBody>
+      </p:sp>
+      <p:sp>
+        <p:nvSpPr>
+          <p:cNvPr id="3" name="Content Placeholder 2"/>
+          <p:cNvSpPr>
+            <a:spLocks noGrp="1"/>
+          </p:cNvSpPr>
+          <p:nvPr>
+            <p:ph idx="1"/>
+          </p:nvPr>
+        </p:nvSpPr>
+        <p:spPr/>
+        <p:txBody>
+          <a:bodyPr/>
+          <a:lstStyle/>
+          <a:p>
+            <a:r>
+              <a:rPr lang="en-US" dirty="0" err="1" smtClean="0"/>
+              <a:t>Centralised</a:t>
+            </a:r>
+            <a:r>
               <a:rPr lang="en-US" dirty="0" smtClean="0"/>
-            </a:br>
+              <a:t> database of fully / partially reduced data</a:t>
+            </a:r>
+          </a:p>
+          <a:p>
             <a:r>
               <a:rPr lang="en-US" dirty="0" smtClean="0"/>
-              <a:t>Scott Ransom IPTA 2012</a:t>
-            </a:r>
-            <a:endParaRPr lang="en-US" dirty="0"/>
-          </a:p>
-        </p:txBody>
-      </p:sp>
-      <p:sp>
-        <p:nvSpPr>
-          <p:cNvPr id="3" name="Date Placeholder 2"/>
-          <p:cNvSpPr>
-            <a:spLocks noGrp="1"/>
-          </p:cNvSpPr>
-          <p:nvPr>
-            <p:ph type="dt" sz="half" idx="10"/>
-          </p:nvPr>
-        </p:nvSpPr>
-        <p:spPr/>
-        <p:txBody>
-          <a:bodyPr/>
-          <a:lstStyle/>
-          <a:p>
-            <a:fld id="{DFA92F6D-5103-A642-B220-478B8EEFADAB}" type="datetime1">
-              <a:rPr lang="de-DE" smtClean="0"/>
-              <a:t>28.06.12</a:t>
-            </a:fld>
+              <a:t>PD, RS: DM analysis and GW detection technique linked</a:t>
+            </a:r>
+          </a:p>
+          <a:p>
+            <a:r>
+              <a:rPr lang="en-US" dirty="0"/>
+              <a:t>Access to raw </a:t>
+            </a:r>
+            <a:r>
+              <a:rPr lang="en-US" dirty="0" err="1"/>
+              <a:t>uncalibrated</a:t>
+            </a:r>
+            <a:r>
+              <a:rPr lang="en-US" dirty="0"/>
+              <a:t> </a:t>
+            </a:r>
+            <a:r>
+              <a:rPr lang="en-US" dirty="0" smtClean="0"/>
+              <a:t>data</a:t>
+            </a:r>
+          </a:p>
+          <a:p>
+            <a:r>
+              <a:rPr lang="en-US" dirty="0" smtClean="0"/>
+              <a:t>Common wiki and webpage</a:t>
+            </a:r>
             <a:endParaRPr lang="en-US" dirty="0"/>
           </a:p>
         </p:txBody>
@@ -8701,789 +8933,23 @@
       </p:sp>
       <p:sp>
         <p:nvSpPr>
-          <p:cNvPr id="5" name="Slide Number Placeholder 4"/>
-          <p:cNvSpPr>
-            <a:spLocks noGrp="1"/>
-          </p:cNvSpPr>
-          <p:nvPr>
-            <p:ph type="sldNum" sz="quarter" idx="12"/>
-          </p:nvPr>
-        </p:nvSpPr>
-        <p:spPr/>
-        <p:txBody>
-          <a:bodyPr/>
-          <a:lstStyle/>
-          <a:p>
-            <a:fld id="{785805AC-A8A2-8640-B3CF-422F6C12D499}" type="slidenum">
-              <a:rPr lang="en-US" smtClean="0"/>
+          <p:cNvPr id="5" name="Date Placeholder 4"/>
+          <p:cNvSpPr>
+            <a:spLocks noGrp="1"/>
+          </p:cNvSpPr>
+          <p:nvPr>
+            <p:ph type="dt" sz="half" idx="10"/>
+          </p:nvPr>
+        </p:nvSpPr>
+        <p:spPr/>
+        <p:txBody>
+          <a:bodyPr/>
+          <a:lstStyle/>
+          <a:p>
+            <a:fld id="{07A801C9-BEFE-2142-B5B9-6A058FE5E0D4}" type="datetime1">
+              <a:rPr lang="de-DE" smtClean="0"/>
               <a:pPr/>
-              <a:t>5</a:t>
-            </a:fld>
-            <a:endParaRPr lang="en-US" dirty="0"/>
-          </a:p>
-        </p:txBody>
-      </p:sp>
-    </p:spTree>
-    <p:extLst>
-      <p:ext uri="{BB962C8B-B14F-4D97-AF65-F5344CB8AC3E}">
-        <p14:creationId xmlns:p14="http://schemas.microsoft.com/office/powerpoint/2010/main" val="1866397534"/>
-      </p:ext>
-    </p:extLst>
-  </p:cSld>
-  <p:clrMapOvr>
-    <a:masterClrMapping/>
-  </p:clrMapOvr>
-</p:sld>
-</file>
-
-<file path=ppt/slides/slide6.xml><?xml version="1.0" encoding="utf-8"?>
-<p:sld xmlns:a="http://schemas.openxmlformats.org/drawingml/2006/main" xmlns:r="http://schemas.openxmlformats.org/officeDocument/2006/relationships" xmlns:p="http://schemas.openxmlformats.org/presentationml/2006/main">
-  <p:cSld>
-    <p:spTree>
-      <p:nvGrpSpPr>
-        <p:cNvPr id="1" name=""/>
-        <p:cNvGrpSpPr/>
-        <p:nvPr/>
-      </p:nvGrpSpPr>
-      <p:grpSpPr>
-        <a:xfrm>
-          <a:off x="0" y="0"/>
-          <a:ext cx="0" cy="0"/>
-          <a:chOff x="0" y="0"/>
-          <a:chExt cx="0" cy="0"/>
-        </a:xfrm>
-      </p:grpSpPr>
-      <p:sp>
-        <p:nvSpPr>
-          <p:cNvPr id="2" name="Title 1"/>
-          <p:cNvSpPr>
-            <a:spLocks noGrp="1"/>
-          </p:cNvSpPr>
-          <p:nvPr>
-            <p:ph type="title"/>
-          </p:nvPr>
-        </p:nvSpPr>
-        <p:spPr/>
-        <p:txBody>
-          <a:bodyPr/>
-          <a:lstStyle/>
-          <a:p>
-            <a:r>
-              <a:rPr lang="en-US" dirty="0" smtClean="0"/>
-              <a:t>Working as the IPTA</a:t>
-            </a:r>
-            <a:endParaRPr lang="en-US" dirty="0"/>
-          </a:p>
-        </p:txBody>
-      </p:sp>
-      <p:sp>
-        <p:nvSpPr>
-          <p:cNvPr id="3" name="Content Placeholder 2"/>
-          <p:cNvSpPr>
-            <a:spLocks noGrp="1"/>
-          </p:cNvSpPr>
-          <p:nvPr>
-            <p:ph idx="1"/>
-          </p:nvPr>
-        </p:nvSpPr>
-        <p:spPr/>
-        <p:txBody>
-          <a:bodyPr/>
-          <a:lstStyle/>
-          <a:p>
-            <a:r>
-              <a:rPr lang="en-US" dirty="0" smtClean="0"/>
-              <a:t>Data combination</a:t>
-            </a:r>
-          </a:p>
-          <a:p>
-            <a:pPr lvl="1"/>
-            <a:r>
-              <a:rPr lang="en-US" dirty="0" smtClean="0"/>
-              <a:t>We could make a detection if we “got lucky”</a:t>
-            </a:r>
-          </a:p>
-          <a:p>
-            <a:pPr lvl="1"/>
-            <a:r>
-              <a:rPr lang="en-US" dirty="0" smtClean="0"/>
-              <a:t>We will certainly find all the weirdness in each others data</a:t>
-            </a:r>
-          </a:p>
-          <a:p>
-            <a:pPr lvl="2"/>
-            <a:r>
-              <a:rPr lang="en-US" dirty="0" smtClean="0"/>
-              <a:t>Better understanding of our own datasets</a:t>
-            </a:r>
-            <a:endParaRPr lang="en-US" dirty="0"/>
-          </a:p>
-        </p:txBody>
-      </p:sp>
-      <p:sp>
-        <p:nvSpPr>
-          <p:cNvPr id="4" name="Date Placeholder 3"/>
-          <p:cNvSpPr>
-            <a:spLocks noGrp="1"/>
-          </p:cNvSpPr>
-          <p:nvPr>
-            <p:ph type="dt" sz="half" idx="10"/>
-          </p:nvPr>
-        </p:nvSpPr>
-        <p:spPr/>
-        <p:txBody>
-          <a:bodyPr/>
-          <a:lstStyle/>
-          <a:p>
-            <a:fld id="{C1E2467A-468C-BB4F-8513-F5A32D4F9690}" type="datetime1">
-              <a:rPr lang="de-DE" smtClean="0"/>
-              <a:t>28.06.12</a:t>
-            </a:fld>
-            <a:endParaRPr lang="en-US" dirty="0"/>
-          </a:p>
-        </p:txBody>
-      </p:sp>
-      <p:sp>
-        <p:nvSpPr>
-          <p:cNvPr id="5" name="Footer Placeholder 4"/>
-          <p:cNvSpPr>
-            <a:spLocks noGrp="1"/>
-          </p:cNvSpPr>
-          <p:nvPr>
-            <p:ph type="ftr" sz="quarter" idx="11"/>
-          </p:nvPr>
-        </p:nvSpPr>
-        <p:spPr/>
-        <p:txBody>
-          <a:bodyPr/>
-          <a:lstStyle/>
-          <a:p>
-            <a:pPr>
-              <a:defRPr/>
-            </a:pPr>
-            <a:r>
-              <a:rPr lang="en-US" b="0" smtClean="0"/>
-              <a:t>IPTA conference 2012</a:t>
-            </a:r>
-            <a:endParaRPr lang="en-US" b="0" dirty="0" smtClean="0"/>
-          </a:p>
-        </p:txBody>
-      </p:sp>
-      <p:sp>
-        <p:nvSpPr>
-          <p:cNvPr id="6" name="Slide Number Placeholder 5"/>
-          <p:cNvSpPr>
-            <a:spLocks noGrp="1"/>
-          </p:cNvSpPr>
-          <p:nvPr>
-            <p:ph type="sldNum" sz="quarter" idx="12"/>
-          </p:nvPr>
-        </p:nvSpPr>
-        <p:spPr/>
-        <p:txBody>
-          <a:bodyPr/>
-          <a:lstStyle/>
-          <a:p>
-            <a:fld id="{785805AC-A8A2-8640-B3CF-422F6C12D499}" type="slidenum">
-              <a:rPr lang="en-US" smtClean="0"/>
-              <a:pPr/>
-              <a:t>6</a:t>
-            </a:fld>
-            <a:endParaRPr lang="en-US" dirty="0"/>
-          </a:p>
-        </p:txBody>
-      </p:sp>
-    </p:spTree>
-    <p:extLst>
-      <p:ext uri="{BB962C8B-B14F-4D97-AF65-F5344CB8AC3E}">
-        <p14:creationId xmlns:p14="http://schemas.microsoft.com/office/powerpoint/2010/main" val="3456139173"/>
-      </p:ext>
-    </p:extLst>
-  </p:cSld>
-  <p:clrMapOvr>
-    <a:masterClrMapping/>
-  </p:clrMapOvr>
-</p:sld>
-</file>
-
-<file path=ppt/slides/slide7.xml><?xml version="1.0" encoding="utf-8"?>
-<p:sld xmlns:a="http://schemas.openxmlformats.org/drawingml/2006/main" xmlns:r="http://schemas.openxmlformats.org/officeDocument/2006/relationships" xmlns:p="http://schemas.openxmlformats.org/presentationml/2006/main">
-  <p:cSld>
-    <p:spTree>
-      <p:nvGrpSpPr>
-        <p:cNvPr id="1" name=""/>
-        <p:cNvGrpSpPr/>
-        <p:nvPr/>
-      </p:nvGrpSpPr>
-      <p:grpSpPr>
-        <a:xfrm>
-          <a:off x="0" y="0"/>
-          <a:ext cx="0" cy="0"/>
-          <a:chOff x="0" y="0"/>
-          <a:chExt cx="0" cy="0"/>
-        </a:xfrm>
-      </p:grpSpPr>
-      <p:sp>
-        <p:nvSpPr>
-          <p:cNvPr id="2" name="Title 1"/>
-          <p:cNvSpPr>
-            <a:spLocks noGrp="1"/>
-          </p:cNvSpPr>
-          <p:nvPr>
-            <p:ph type="title"/>
-          </p:nvPr>
-        </p:nvSpPr>
-        <p:spPr/>
-        <p:txBody>
-          <a:bodyPr/>
-          <a:lstStyle/>
-          <a:p>
-            <a:r>
-              <a:rPr lang="en-US" dirty="0" smtClean="0"/>
-              <a:t>Working as the IPTA</a:t>
-            </a:r>
-            <a:endParaRPr lang="en-US" dirty="0"/>
-          </a:p>
-        </p:txBody>
-      </p:sp>
-      <p:sp>
-        <p:nvSpPr>
-          <p:cNvPr id="3" name="Content Placeholder 2"/>
-          <p:cNvSpPr>
-            <a:spLocks noGrp="1"/>
-          </p:cNvSpPr>
-          <p:nvPr>
-            <p:ph idx="1"/>
-          </p:nvPr>
-        </p:nvSpPr>
-        <p:spPr/>
-        <p:txBody>
-          <a:bodyPr/>
-          <a:lstStyle/>
-          <a:p>
-            <a:r>
-              <a:rPr lang="en-US" dirty="0" err="1" smtClean="0"/>
-              <a:t>Optimising</a:t>
-            </a:r>
-            <a:r>
-              <a:rPr lang="en-US" dirty="0" smtClean="0"/>
-              <a:t> observing strategy over the whole IPTA rather than by PTA</a:t>
-            </a:r>
-          </a:p>
-          <a:p>
-            <a:pPr lvl="1"/>
-            <a:r>
-              <a:rPr lang="en-US" dirty="0" smtClean="0"/>
-              <a:t>Clearly dependent on model of pulsar and GW</a:t>
-            </a:r>
-          </a:p>
-          <a:p>
-            <a:pPr lvl="1"/>
-            <a:r>
-              <a:rPr lang="en-US" dirty="0" err="1" smtClean="0"/>
-              <a:t>Optimise</a:t>
-            </a:r>
-            <a:r>
-              <a:rPr lang="en-US" dirty="0" smtClean="0"/>
-              <a:t> for detection or limit, single source or background</a:t>
-            </a:r>
-          </a:p>
-          <a:p>
-            <a:pPr lvl="1"/>
-            <a:r>
-              <a:rPr lang="en-US" dirty="0" smtClean="0"/>
-              <a:t>Pulsar triage? (examples from Matthew)</a:t>
-            </a:r>
-          </a:p>
-          <a:p>
-            <a:pPr lvl="1"/>
-            <a:r>
-              <a:rPr lang="en-US" dirty="0" smtClean="0"/>
-              <a:t>Within the current framework there is a potential gain of 10 years</a:t>
-            </a:r>
-          </a:p>
-        </p:txBody>
-      </p:sp>
-      <p:sp>
-        <p:nvSpPr>
-          <p:cNvPr id="4" name="Footer Placeholder 3"/>
-          <p:cNvSpPr>
-            <a:spLocks noGrp="1"/>
-          </p:cNvSpPr>
-          <p:nvPr>
-            <p:ph type="ftr" sz="quarter" idx="11"/>
-          </p:nvPr>
-        </p:nvSpPr>
-        <p:spPr/>
-        <p:txBody>
-          <a:bodyPr/>
-          <a:lstStyle/>
-          <a:p>
-            <a:pPr>
-              <a:defRPr/>
-            </a:pPr>
-            <a:r>
-              <a:rPr lang="en-US" b="0" smtClean="0">
-                <a:solidFill>
-                  <a:srgbClr val="FFFFFF"/>
-                </a:solidFill>
-              </a:rPr>
-              <a:t>IPTA conference 2012</a:t>
-            </a:r>
-            <a:endParaRPr lang="en-US" b="0" dirty="0" smtClean="0">
-              <a:solidFill>
-                <a:srgbClr val="FFFFFF"/>
-              </a:solidFill>
-            </a:endParaRPr>
-          </a:p>
-        </p:txBody>
-      </p:sp>
-      <p:sp>
-        <p:nvSpPr>
-          <p:cNvPr id="5" name="Date Placeholder 4"/>
-          <p:cNvSpPr>
-            <a:spLocks noGrp="1"/>
-          </p:cNvSpPr>
-          <p:nvPr>
-            <p:ph type="dt" sz="half" idx="10"/>
-          </p:nvPr>
-        </p:nvSpPr>
-        <p:spPr/>
-        <p:txBody>
-          <a:bodyPr/>
-          <a:lstStyle/>
-          <a:p>
-            <a:fld id="{AEFFC700-88EA-274D-BB21-C8D3BB664238}" type="datetime1">
-              <a:rPr lang="de-DE" smtClean="0"/>
-              <a:t>28.06.12</a:t>
-            </a:fld>
-            <a:endParaRPr lang="en-US" dirty="0"/>
-          </a:p>
-        </p:txBody>
-      </p:sp>
-      <p:sp>
-        <p:nvSpPr>
-          <p:cNvPr id="6" name="Slide Number Placeholder 5"/>
-          <p:cNvSpPr>
-            <a:spLocks noGrp="1"/>
-          </p:cNvSpPr>
-          <p:nvPr>
-            <p:ph type="sldNum" sz="quarter" idx="12"/>
-          </p:nvPr>
-        </p:nvSpPr>
-        <p:spPr/>
-        <p:txBody>
-          <a:bodyPr/>
-          <a:lstStyle/>
-          <a:p>
-            <a:fld id="{785805AC-A8A2-8640-B3CF-422F6C12D499}" type="slidenum">
-              <a:rPr lang="en-US" smtClean="0"/>
-              <a:pPr/>
-              <a:t>7</a:t>
-            </a:fld>
-            <a:endParaRPr lang="en-US" dirty="0"/>
-          </a:p>
-        </p:txBody>
-      </p:sp>
-    </p:spTree>
-    <p:extLst>
-      <p:ext uri="{BB962C8B-B14F-4D97-AF65-F5344CB8AC3E}">
-        <p14:creationId xmlns:p14="http://schemas.microsoft.com/office/powerpoint/2010/main" val="4083466518"/>
-      </p:ext>
-    </p:extLst>
-  </p:cSld>
-  <p:clrMapOvr>
-    <a:masterClrMapping/>
-  </p:clrMapOvr>
-</p:sld>
-</file>
-
-<file path=ppt/slides/slide8.xml><?xml version="1.0" encoding="utf-8"?>
-<p:sld xmlns:a="http://schemas.openxmlformats.org/drawingml/2006/main" xmlns:r="http://schemas.openxmlformats.org/officeDocument/2006/relationships" xmlns:p="http://schemas.openxmlformats.org/presentationml/2006/main">
-  <p:cSld>
-    <p:spTree>
-      <p:nvGrpSpPr>
-        <p:cNvPr id="1" name=""/>
-        <p:cNvGrpSpPr/>
-        <p:nvPr/>
-      </p:nvGrpSpPr>
-      <p:grpSpPr>
-        <a:xfrm>
-          <a:off x="0" y="0"/>
-          <a:ext cx="0" cy="0"/>
-          <a:chOff x="0" y="0"/>
-          <a:chExt cx="0" cy="0"/>
-        </a:xfrm>
-      </p:grpSpPr>
-      <p:sp>
-        <p:nvSpPr>
-          <p:cNvPr id="2" name="Title 1"/>
-          <p:cNvSpPr>
-            <a:spLocks noGrp="1"/>
-          </p:cNvSpPr>
-          <p:nvPr>
-            <p:ph type="title"/>
-          </p:nvPr>
-        </p:nvSpPr>
-        <p:spPr/>
-        <p:txBody>
-          <a:bodyPr/>
-          <a:lstStyle/>
-          <a:p>
-            <a:r>
-              <a:rPr lang="en-US" dirty="0" smtClean="0"/>
-              <a:t>Working as the IPTA</a:t>
-            </a:r>
-            <a:endParaRPr lang="en-US" dirty="0"/>
-          </a:p>
-        </p:txBody>
-      </p:sp>
-      <p:sp>
-        <p:nvSpPr>
-          <p:cNvPr id="3" name="Content Placeholder 2"/>
-          <p:cNvSpPr>
-            <a:spLocks noGrp="1"/>
-          </p:cNvSpPr>
-          <p:nvPr>
-            <p:ph idx="1"/>
-          </p:nvPr>
-        </p:nvSpPr>
-        <p:spPr/>
-        <p:txBody>
-          <a:bodyPr>
-            <a:normAutofit fontScale="92500"/>
-          </a:bodyPr>
-          <a:lstStyle/>
-          <a:p>
-            <a:r>
-              <a:rPr lang="en-US" dirty="0" smtClean="0"/>
-              <a:t>Almost all PTA projects as IPTA</a:t>
-            </a:r>
-          </a:p>
-          <a:p>
-            <a:pPr lvl="1"/>
-            <a:r>
-              <a:rPr lang="en-US" dirty="0" smtClean="0"/>
-              <a:t>Working across 8 countries, 6 time zones</a:t>
-            </a:r>
-          </a:p>
-          <a:p>
-            <a:pPr lvl="1"/>
-            <a:r>
-              <a:rPr lang="en-US" dirty="0" smtClean="0"/>
-              <a:t>Committees, </a:t>
-            </a:r>
-            <a:r>
-              <a:rPr lang="en-US" dirty="0" err="1" smtClean="0"/>
-              <a:t>telecons</a:t>
-            </a:r>
-            <a:r>
-              <a:rPr lang="en-US" dirty="0" smtClean="0"/>
-              <a:t> </a:t>
-            </a:r>
-            <a:r>
-              <a:rPr lang="en-US" dirty="0" err="1" smtClean="0"/>
-              <a:t>etc</a:t>
-            </a:r>
-            <a:r>
-              <a:rPr lang="en-US" dirty="0" smtClean="0"/>
-              <a:t> are a necessary evil</a:t>
-            </a:r>
-          </a:p>
-          <a:p>
-            <a:r>
-              <a:rPr lang="en-US" dirty="0"/>
-              <a:t>Implication is interdependence not only for GW work</a:t>
-            </a:r>
-          </a:p>
-          <a:p>
-            <a:r>
-              <a:rPr lang="en-US" dirty="0" smtClean="0"/>
-              <a:t>Massive </a:t>
-            </a:r>
-            <a:r>
-              <a:rPr lang="en-US" dirty="0"/>
-              <a:t>change from competition to </a:t>
-            </a:r>
-            <a:r>
-              <a:rPr lang="en-US" dirty="0" smtClean="0"/>
-              <a:t>collaboration</a:t>
-            </a:r>
-          </a:p>
-          <a:p>
-            <a:pPr lvl="1"/>
-            <a:r>
-              <a:rPr lang="en-US" dirty="0" smtClean="0"/>
-              <a:t>Concern that a lack of competition will stifle progress</a:t>
-            </a:r>
-          </a:p>
-          <a:p>
-            <a:pPr lvl="1"/>
-            <a:r>
-              <a:rPr lang="en-US" dirty="0" smtClean="0"/>
-              <a:t>Concern from students needing protection</a:t>
-            </a:r>
-            <a:endParaRPr lang="en-US" dirty="0"/>
-          </a:p>
-          <a:p>
-            <a:pPr lvl="1"/>
-            <a:endParaRPr lang="en-US" dirty="0"/>
-          </a:p>
-        </p:txBody>
-      </p:sp>
-      <p:sp>
-        <p:nvSpPr>
-          <p:cNvPr id="4" name="Footer Placeholder 3"/>
-          <p:cNvSpPr>
-            <a:spLocks noGrp="1"/>
-          </p:cNvSpPr>
-          <p:nvPr>
-            <p:ph type="ftr" sz="quarter" idx="11"/>
-          </p:nvPr>
-        </p:nvSpPr>
-        <p:spPr/>
-        <p:txBody>
-          <a:bodyPr/>
-          <a:lstStyle/>
-          <a:p>
-            <a:pPr>
-              <a:defRPr/>
-            </a:pPr>
-            <a:r>
-              <a:rPr lang="en-US" b="0" smtClean="0">
-                <a:solidFill>
-                  <a:srgbClr val="FFFFFF"/>
-                </a:solidFill>
-              </a:rPr>
-              <a:t>IPTA conference 2012</a:t>
-            </a:r>
-            <a:endParaRPr lang="en-US" b="0" dirty="0" smtClean="0">
-              <a:solidFill>
-                <a:srgbClr val="FFFFFF"/>
-              </a:solidFill>
-            </a:endParaRPr>
-          </a:p>
-        </p:txBody>
-      </p:sp>
-      <p:sp>
-        <p:nvSpPr>
-          <p:cNvPr id="5" name="Date Placeholder 4"/>
-          <p:cNvSpPr>
-            <a:spLocks noGrp="1"/>
-          </p:cNvSpPr>
-          <p:nvPr>
-            <p:ph type="dt" sz="half" idx="10"/>
-          </p:nvPr>
-        </p:nvSpPr>
-        <p:spPr/>
-        <p:txBody>
-          <a:bodyPr/>
-          <a:lstStyle/>
-          <a:p>
-            <a:fld id="{AEFFC700-88EA-274D-BB21-C8D3BB664238}" type="datetime1">
-              <a:rPr lang="de-DE" smtClean="0"/>
-              <a:t>28.06.12</a:t>
-            </a:fld>
-            <a:endParaRPr lang="en-US" dirty="0"/>
-          </a:p>
-        </p:txBody>
-      </p:sp>
-      <p:sp>
-        <p:nvSpPr>
-          <p:cNvPr id="6" name="Slide Number Placeholder 5"/>
-          <p:cNvSpPr>
-            <a:spLocks noGrp="1"/>
-          </p:cNvSpPr>
-          <p:nvPr>
-            <p:ph type="sldNum" sz="quarter" idx="12"/>
-          </p:nvPr>
-        </p:nvSpPr>
-        <p:spPr/>
-        <p:txBody>
-          <a:bodyPr/>
-          <a:lstStyle/>
-          <a:p>
-            <a:fld id="{785805AC-A8A2-8640-B3CF-422F6C12D499}" type="slidenum">
-              <a:rPr lang="en-US" smtClean="0"/>
-              <a:pPr/>
-              <a:t>8</a:t>
-            </a:fld>
-            <a:endParaRPr lang="en-US" dirty="0"/>
-          </a:p>
-        </p:txBody>
-      </p:sp>
-    </p:spTree>
-    <p:extLst>
-      <p:ext uri="{BB962C8B-B14F-4D97-AF65-F5344CB8AC3E}">
-        <p14:creationId xmlns:p14="http://schemas.microsoft.com/office/powerpoint/2010/main" val="1590693688"/>
-      </p:ext>
-    </p:extLst>
-  </p:cSld>
-  <p:clrMapOvr>
-    <a:masterClrMapping/>
-  </p:clrMapOvr>
-</p:sld>
-</file>
-
-<file path=ppt/slides/slide9.xml><?xml version="1.0" encoding="utf-8"?>
-<p:sld xmlns:a="http://schemas.openxmlformats.org/drawingml/2006/main" xmlns:r="http://schemas.openxmlformats.org/officeDocument/2006/relationships" xmlns:p="http://schemas.openxmlformats.org/presentationml/2006/main">
-  <p:cSld>
-    <p:spTree>
-      <p:nvGrpSpPr>
-        <p:cNvPr id="1" name=""/>
-        <p:cNvGrpSpPr/>
-        <p:nvPr/>
-      </p:nvGrpSpPr>
-      <p:grpSpPr>
-        <a:xfrm>
-          <a:off x="0" y="0"/>
-          <a:ext cx="0" cy="0"/>
-          <a:chOff x="0" y="0"/>
-          <a:chExt cx="0" cy="0"/>
-        </a:xfrm>
-      </p:grpSpPr>
-      <p:sp>
-        <p:nvSpPr>
-          <p:cNvPr id="2" name="Title 1"/>
-          <p:cNvSpPr>
-            <a:spLocks noGrp="1"/>
-          </p:cNvSpPr>
-          <p:nvPr>
-            <p:ph type="title"/>
-          </p:nvPr>
-        </p:nvSpPr>
-        <p:spPr/>
-        <p:txBody>
-          <a:bodyPr/>
-          <a:lstStyle/>
-          <a:p>
-            <a:r>
-              <a:rPr lang="en-US" dirty="0"/>
-              <a:t>Public release of data</a:t>
-            </a:r>
-          </a:p>
-        </p:txBody>
-      </p:sp>
-      <p:sp>
-        <p:nvSpPr>
-          <p:cNvPr id="3" name="Content Placeholder 2"/>
-          <p:cNvSpPr>
-            <a:spLocks noGrp="1"/>
-          </p:cNvSpPr>
-          <p:nvPr>
-            <p:ph idx="1"/>
-          </p:nvPr>
-        </p:nvSpPr>
-        <p:spPr/>
-        <p:txBody>
-          <a:bodyPr>
-            <a:normAutofit lnSpcReduction="10000"/>
-          </a:bodyPr>
-          <a:lstStyle/>
-          <a:p>
-            <a:r>
-              <a:rPr lang="en-US" dirty="0" smtClean="0"/>
-              <a:t>Invite those outside the IPTA to search for GWs in our data</a:t>
-            </a:r>
-          </a:p>
-          <a:p>
-            <a:r>
-              <a:rPr lang="en-US" dirty="0" smtClean="0"/>
-              <a:t>Engage with the wider community</a:t>
-            </a:r>
-          </a:p>
-          <a:p>
-            <a:r>
-              <a:rPr lang="en-US" dirty="0" smtClean="0"/>
-              <a:t>Pulsar data is unusual:</a:t>
-            </a:r>
-          </a:p>
-          <a:p>
-            <a:pPr lvl="1"/>
-            <a:r>
-              <a:rPr lang="en-US" dirty="0" smtClean="0"/>
-              <a:t>“[The IPTA] is a very scary detector” </a:t>
-            </a:r>
-            <a:r>
-              <a:rPr lang="en-US" dirty="0" err="1" smtClean="0"/>
-              <a:t>Linqing</a:t>
-            </a:r>
-            <a:endParaRPr lang="en-US" dirty="0" smtClean="0"/>
-          </a:p>
-          <a:p>
-            <a:pPr lvl="1"/>
-            <a:r>
-              <a:rPr lang="en-US" dirty="0" smtClean="0"/>
-              <a:t>IPTA timing workshops</a:t>
-            </a:r>
-          </a:p>
-          <a:p>
-            <a:pPr lvl="1"/>
-            <a:r>
-              <a:rPr lang="en-US" dirty="0" smtClean="0"/>
-              <a:t>IPTA data challenges</a:t>
-            </a:r>
-          </a:p>
-          <a:p>
-            <a:pPr lvl="1"/>
-            <a:r>
-              <a:rPr lang="en-US" dirty="0" smtClean="0"/>
-              <a:t>Online simulator (KJ)</a:t>
-            </a:r>
-          </a:p>
-          <a:p>
-            <a:r>
-              <a:rPr lang="en-US" dirty="0" smtClean="0"/>
-              <a:t>Risk false alarms, gain novel techniques</a:t>
-            </a:r>
-            <a:endParaRPr lang="en-US" dirty="0"/>
-          </a:p>
-        </p:txBody>
-      </p:sp>
-      <p:sp>
-        <p:nvSpPr>
-          <p:cNvPr id="4" name="Footer Placeholder 3"/>
-          <p:cNvSpPr>
-            <a:spLocks noGrp="1"/>
-          </p:cNvSpPr>
-          <p:nvPr>
-            <p:ph type="ftr" sz="quarter" idx="11"/>
-          </p:nvPr>
-        </p:nvSpPr>
-        <p:spPr/>
-        <p:txBody>
-          <a:bodyPr/>
-          <a:lstStyle/>
-          <a:p>
-            <a:pPr>
-              <a:defRPr/>
-            </a:pPr>
-            <a:r>
-              <a:rPr lang="en-US" b="0" smtClean="0"/>
-              <a:t>IPTA conference 2012</a:t>
-            </a:r>
-            <a:endParaRPr lang="en-US" b="0" dirty="0" smtClean="0"/>
-          </a:p>
-        </p:txBody>
-      </p:sp>
-      <p:sp>
-        <p:nvSpPr>
-          <p:cNvPr id="5" name="Date Placeholder 4"/>
-          <p:cNvSpPr>
-            <a:spLocks noGrp="1"/>
-          </p:cNvSpPr>
-          <p:nvPr>
-            <p:ph type="dt" sz="half" idx="10"/>
-          </p:nvPr>
-        </p:nvSpPr>
-        <p:spPr/>
-        <p:txBody>
-          <a:bodyPr/>
-          <a:lstStyle/>
-          <a:p>
-            <a:fld id="{6ABBDB12-5DC7-C341-8126-512F1B884ACF}" type="datetime1">
-              <a:rPr lang="de-DE" smtClean="0"/>
-              <a:t>26.06.12</a:t>
+              <a:t>7/10/12</a:t>
             </a:fld>
             <a:endParaRPr lang="en-US" dirty="0"/>
           </a:p>
@@ -9516,7 +8982,7 @@
     </p:spTree>
     <p:extLst>
       <p:ext uri="{BB962C8B-B14F-4D97-AF65-F5344CB8AC3E}">
-        <p14:creationId xmlns:p14="http://schemas.microsoft.com/office/powerpoint/2010/main" val="2071229238"/>
+        <p14:creationId xmlns:p14="http://schemas.microsoft.com/office/powerpoint/2010/main" xmlns:p="http://schemas.openxmlformats.org/presentationml/2006/main" xmlns:r="http://schemas.openxmlformats.org/officeDocument/2006/relationships" xmlns:a="http://schemas.openxmlformats.org/drawingml/2006/main" xmlns="" val="860962665"/>
       </p:ext>
     </p:extLst>
   </p:cSld>

</xml_diff>